<commit_message>
Add slides on model sizes
</commit_message>
<xml_diff>
--- a/local_LLMs.pptx
+++ b/local_LLMs.pptx
@@ -6,7 +6,7 @@
     <p:sldMasterId id="2147483660" r:id="rId2"/>
   </p:sldMasterIdLst>
   <p:notesMasterIdLst>
-    <p:notesMasterId r:id="rId25"/>
+    <p:notesMasterId r:id="rId27"/>
   </p:notesMasterIdLst>
   <p:sldIdLst>
     <p:sldId id="268" r:id="rId3"/>
@@ -24,13 +24,15 @@
     <p:sldId id="266" r:id="rId15"/>
     <p:sldId id="794" r:id="rId16"/>
     <p:sldId id="785" r:id="rId17"/>
-    <p:sldId id="261" r:id="rId18"/>
-    <p:sldId id="786" r:id="rId19"/>
-    <p:sldId id="787" r:id="rId20"/>
-    <p:sldId id="788" r:id="rId21"/>
-    <p:sldId id="789" r:id="rId22"/>
-    <p:sldId id="790" r:id="rId23"/>
-    <p:sldId id="791" r:id="rId24"/>
+    <p:sldId id="795" r:id="rId18"/>
+    <p:sldId id="261" r:id="rId19"/>
+    <p:sldId id="786" r:id="rId20"/>
+    <p:sldId id="787" r:id="rId21"/>
+    <p:sldId id="788" r:id="rId22"/>
+    <p:sldId id="789" r:id="rId23"/>
+    <p:sldId id="790" r:id="rId24"/>
+    <p:sldId id="796" r:id="rId25"/>
+    <p:sldId id="791" r:id="rId26"/>
   </p:sldIdLst>
   <p:sldSz cx="12192000" cy="6858000"/>
   <p:notesSz cx="6858000" cy="9144000"/>
@@ -562,6 +564,114 @@
     <p:extLst>
       <p:ext uri="{BB962C8B-B14F-4D97-AF65-F5344CB8AC3E}">
         <p14:creationId xmlns:p14="http://schemas.microsoft.com/office/powerpoint/2010/main" val="328647328"/>
+      </p:ext>
+    </p:extLst>
+  </p:cSld>
+  <p:clrMapOvr>
+    <a:masterClrMapping/>
+  </p:clrMapOvr>
+</p:notes>
+</file>
+
+<file path=ppt/notesSlides/notesSlide2.xml><?xml version="1.0" encoding="utf-8"?>
+<p:notes xmlns:a="http://schemas.openxmlformats.org/drawingml/2006/main" xmlns:r="http://schemas.openxmlformats.org/officeDocument/2006/relationships" xmlns:p="http://schemas.openxmlformats.org/presentationml/2006/main">
+  <p:cSld>
+    <p:spTree>
+      <p:nvGrpSpPr>
+        <p:cNvPr id="1" name="">
+          <a:extLst>
+            <a:ext uri="{FF2B5EF4-FFF2-40B4-BE49-F238E27FC236}">
+              <a16:creationId xmlns:a16="http://schemas.microsoft.com/office/drawing/2014/main" id="{DA247BAE-5BCD-AFBA-56E7-ECA00F3472B2}"/>
+            </a:ext>
+          </a:extLst>
+        </p:cNvPr>
+        <p:cNvGrpSpPr/>
+        <p:nvPr/>
+      </p:nvGrpSpPr>
+      <p:grpSpPr>
+        <a:xfrm>
+          <a:off x="0" y="0"/>
+          <a:ext cx="0" cy="0"/>
+          <a:chOff x="0" y="0"/>
+          <a:chExt cx="0" cy="0"/>
+        </a:xfrm>
+      </p:grpSpPr>
+      <p:sp>
+        <p:nvSpPr>
+          <p:cNvPr id="2" name="Slide Image Placeholder 1">
+            <a:extLst>
+              <a:ext uri="{FF2B5EF4-FFF2-40B4-BE49-F238E27FC236}">
+                <a16:creationId xmlns:a16="http://schemas.microsoft.com/office/drawing/2014/main" id="{21D3D09D-8C23-AE37-63D1-8720132C8BB3}"/>
+              </a:ext>
+            </a:extLst>
+          </p:cNvPr>
+          <p:cNvSpPr>
+            <a:spLocks noGrp="1" noRot="1" noChangeAspect="1"/>
+          </p:cNvSpPr>
+          <p:nvPr>
+            <p:ph type="sldImg"/>
+          </p:nvPr>
+        </p:nvSpPr>
+        <p:spPr/>
+      </p:sp>
+      <p:sp>
+        <p:nvSpPr>
+          <p:cNvPr id="3" name="Notes Placeholder 2">
+            <a:extLst>
+              <a:ext uri="{FF2B5EF4-FFF2-40B4-BE49-F238E27FC236}">
+                <a16:creationId xmlns:a16="http://schemas.microsoft.com/office/drawing/2014/main" id="{048A3C95-AFB0-97B2-9905-663CAEF9A539}"/>
+              </a:ext>
+            </a:extLst>
+          </p:cNvPr>
+          <p:cNvSpPr>
+            <a:spLocks noGrp="1"/>
+          </p:cNvSpPr>
+          <p:nvPr>
+            <p:ph type="body" idx="1"/>
+          </p:nvPr>
+        </p:nvSpPr>
+        <p:spPr/>
+        <p:txBody>
+          <a:bodyPr/>
+          <a:lstStyle/>
+          <a:p>
+            <a:endParaRPr lang="LID4096" dirty="0"/>
+          </a:p>
+        </p:txBody>
+      </p:sp>
+      <p:sp>
+        <p:nvSpPr>
+          <p:cNvPr id="4" name="Slide Number Placeholder 3">
+            <a:extLst>
+              <a:ext uri="{FF2B5EF4-FFF2-40B4-BE49-F238E27FC236}">
+                <a16:creationId xmlns:a16="http://schemas.microsoft.com/office/drawing/2014/main" id="{EECD0160-1E8F-05A3-61BF-7502684D9837}"/>
+              </a:ext>
+            </a:extLst>
+          </p:cNvPr>
+          <p:cNvSpPr>
+            <a:spLocks noGrp="1"/>
+          </p:cNvSpPr>
+          <p:nvPr>
+            <p:ph type="sldNum" sz="quarter" idx="5"/>
+          </p:nvPr>
+        </p:nvSpPr>
+        <p:spPr/>
+        <p:txBody>
+          <a:bodyPr/>
+          <a:lstStyle/>
+          <a:p>
+            <a:fld id="{AD7CCFB3-7F5B-4C65-BBB5-73724EC28DC4}" type="slidenum">
+              <a:rPr lang="LID4096" smtClean="0"/>
+              <a:t>16</a:t>
+            </a:fld>
+            <a:endParaRPr lang="LID4096"/>
+          </a:p>
+        </p:txBody>
+      </p:sp>
+    </p:spTree>
+    <p:extLst>
+      <p:ext uri="{BB962C8B-B14F-4D97-AF65-F5344CB8AC3E}">
+        <p14:creationId xmlns:p14="http://schemas.microsoft.com/office/powerpoint/2010/main" val="2807842514"/>
       </p:ext>
     </p:extLst>
   </p:cSld>
@@ -9315,6 +9425,42 @@
           </a:p>
         </p:txBody>
       </p:sp>
+      <p:pic>
+        <p:nvPicPr>
+          <p:cNvPr id="9" name="Picture 8">
+            <a:extLst>
+              <a:ext uri="{FF2B5EF4-FFF2-40B4-BE49-F238E27FC236}">
+                <a16:creationId xmlns:a16="http://schemas.microsoft.com/office/drawing/2014/main" id="{386C1B31-23D9-DBF9-BAE1-CA0176577747}"/>
+              </a:ext>
+            </a:extLst>
+          </p:cNvPr>
+          <p:cNvPicPr>
+            <a:picLocks noChangeAspect="1"/>
+          </p:cNvPicPr>
+          <p:nvPr/>
+        </p:nvPicPr>
+        <p:blipFill>
+          <a:blip r:embed="rId2">
+            <a:extLst>
+              <a:ext uri="{28A0092B-C50C-407E-A947-70E740481C1C}">
+                <a14:useLocalDpi xmlns:a14="http://schemas.microsoft.com/office/drawing/2010/main" val="0"/>
+              </a:ext>
+            </a:extLst>
+          </a:blip>
+          <a:stretch>
+            <a:fillRect/>
+          </a:stretch>
+        </p:blipFill>
+        <p:spPr>
+          <a:xfrm>
+            <a:off x="6906986" y="2262370"/>
+            <a:ext cx="3568115" cy="700285"/>
+          </a:xfrm>
+          <a:prstGeom prst="rect">
+            <a:avLst/>
+          </a:prstGeom>
+        </p:spPr>
+      </p:pic>
     </p:spTree>
     <p:extLst>
       <p:ext uri="{BB962C8B-B14F-4D97-AF65-F5344CB8AC3E}">
@@ -11391,7 +11537,13 @@
   <p:cSld>
     <p:spTree>
       <p:nvGrpSpPr>
-        <p:cNvPr id="1" name=""/>
+        <p:cNvPr id="1" name="">
+          <a:extLst>
+            <a:ext uri="{FF2B5EF4-FFF2-40B4-BE49-F238E27FC236}">
+              <a16:creationId xmlns:a16="http://schemas.microsoft.com/office/drawing/2014/main" id="{3E6979EA-BE91-CFCB-B136-F060DB155D29}"/>
+            </a:ext>
+          </a:extLst>
+        </p:cNvPr>
         <p:cNvGrpSpPr/>
         <p:nvPr/>
       </p:nvGrpSpPr>
@@ -11408,7 +11560,7 @@
           <p:cNvPr id="2" name="Title 1">
             <a:extLst>
               <a:ext uri="{FF2B5EF4-FFF2-40B4-BE49-F238E27FC236}">
-                <a16:creationId xmlns:a16="http://schemas.microsoft.com/office/drawing/2014/main" id="{9B79AC04-2006-DFBE-35B0-75DEF1F303E0}"/>
+                <a16:creationId xmlns:a16="http://schemas.microsoft.com/office/drawing/2014/main" id="{E4A00A9D-2FF9-1758-DE3C-CE502D2F3BD3}"/>
               </a:ext>
             </a:extLst>
           </p:cNvPr>
@@ -11426,34 +11578,9 @@
           <a:p>
             <a:r>
               <a:rPr lang="en-US" dirty="0"/>
-              <a:t>Can I run an LLM on my laptop?</a:t>
+              <a:t>Querying code</a:t>
             </a:r>
             <a:endParaRPr lang="LID4096" dirty="0"/>
-          </a:p>
-        </p:txBody>
-      </p:sp>
-      <p:sp>
-        <p:nvSpPr>
-          <p:cNvPr id="3" name="Text Placeholder 2">
-            <a:extLst>
-              <a:ext uri="{FF2B5EF4-FFF2-40B4-BE49-F238E27FC236}">
-                <a16:creationId xmlns:a16="http://schemas.microsoft.com/office/drawing/2014/main" id="{44184DB0-1612-54D0-EB5C-F5AE96AD8597}"/>
-              </a:ext>
-            </a:extLst>
-          </p:cNvPr>
-          <p:cNvSpPr>
-            <a:spLocks noGrp="1"/>
-          </p:cNvSpPr>
-          <p:nvPr>
-            <p:ph type="body" idx="1"/>
-          </p:nvPr>
-        </p:nvSpPr>
-        <p:spPr/>
-        <p:txBody>
-          <a:bodyPr/>
-          <a:lstStyle/>
-          <a:p>
-            <a:endParaRPr lang="LID4096"/>
           </a:p>
         </p:txBody>
       </p:sp>
@@ -11462,7 +11589,7 @@
           <p:cNvPr id="4" name="Slide Number Placeholder 3">
             <a:extLst>
               <a:ext uri="{FF2B5EF4-FFF2-40B4-BE49-F238E27FC236}">
-                <a16:creationId xmlns:a16="http://schemas.microsoft.com/office/drawing/2014/main" id="{E026CBC6-37B7-B7B9-EF98-DA17BAEB822A}"/>
+                <a16:creationId xmlns:a16="http://schemas.microsoft.com/office/drawing/2014/main" id="{265D634B-C8DA-8122-854B-B17F4D4837FA}"/>
               </a:ext>
             </a:extLst>
           </p:cNvPr>
@@ -11486,10 +11613,574 @@
           </a:p>
         </p:txBody>
       </p:sp>
+      <p:grpSp>
+        <p:nvGrpSpPr>
+          <p:cNvPr id="5" name="Group 4">
+            <a:extLst>
+              <a:ext uri="{FF2B5EF4-FFF2-40B4-BE49-F238E27FC236}">
+                <a16:creationId xmlns:a16="http://schemas.microsoft.com/office/drawing/2014/main" id="{C001E883-2C10-5641-243D-382EFED65BE4}"/>
+              </a:ext>
+            </a:extLst>
+          </p:cNvPr>
+          <p:cNvGrpSpPr/>
+          <p:nvPr/>
+        </p:nvGrpSpPr>
+        <p:grpSpPr>
+          <a:xfrm>
+            <a:off x="471948" y="1708776"/>
+            <a:ext cx="8681195" cy="4247317"/>
+            <a:chOff x="1415845" y="2290917"/>
+            <a:chExt cx="8681195" cy="4247317"/>
+          </a:xfrm>
+        </p:grpSpPr>
+        <p:sp>
+          <p:nvSpPr>
+            <p:cNvPr id="6" name="TextBox 5">
+              <a:extLst>
+                <a:ext uri="{FF2B5EF4-FFF2-40B4-BE49-F238E27FC236}">
+                  <a16:creationId xmlns:a16="http://schemas.microsoft.com/office/drawing/2014/main" id="{D7E06E4D-9459-C729-5CEC-CD559D42B269}"/>
+                </a:ext>
+              </a:extLst>
+            </p:cNvPr>
+            <p:cNvSpPr txBox="1"/>
+            <p:nvPr/>
+          </p:nvSpPr>
+          <p:spPr>
+            <a:xfrm>
+              <a:off x="1415845" y="2290917"/>
+              <a:ext cx="8681195" cy="4247317"/>
+            </a:xfrm>
+            <a:prstGeom prst="rect">
+              <a:avLst/>
+            </a:prstGeom>
+            <a:solidFill>
+              <a:schemeClr val="bg1">
+                <a:lumMod val="85000"/>
+              </a:schemeClr>
+            </a:solidFill>
+            <a:ln>
+              <a:solidFill>
+                <a:schemeClr val="accent1"/>
+              </a:solidFill>
+            </a:ln>
+          </p:spPr>
+          <p:txBody>
+            <a:bodyPr wrap="square" rtlCol="0">
+              <a:spAutoFit/>
+            </a:bodyPr>
+            <a:lstStyle/>
+            <a:p>
+              <a:r>
+                <a:rPr lang="en-US" dirty="0"/>
+                <a:t>...</a:t>
+              </a:r>
+            </a:p>
+            <a:p>
+              <a:r>
+                <a:rPr lang="es-ES" dirty="0" err="1"/>
+                <a:t>from</a:t>
+              </a:r>
+              <a:r>
+                <a:rPr lang="es-ES" dirty="0"/>
+                <a:t> </a:t>
+              </a:r>
+              <a:r>
+                <a:rPr lang="es-ES" dirty="0" err="1"/>
+                <a:t>llama_index.llms.ollama</a:t>
+              </a:r>
+              <a:r>
+                <a:rPr lang="es-ES" dirty="0"/>
+                <a:t> </a:t>
+              </a:r>
+              <a:r>
+                <a:rPr lang="es-ES" dirty="0" err="1"/>
+                <a:t>import</a:t>
+              </a:r>
+              <a:r>
+                <a:rPr lang="es-ES" dirty="0"/>
+                <a:t> </a:t>
+              </a:r>
+              <a:r>
+                <a:rPr lang="es-ES" dirty="0" err="1"/>
+                <a:t>Ollama</a:t>
+              </a:r>
+              <a:endParaRPr lang="en-US" dirty="0"/>
+            </a:p>
+            <a:p>
+              <a:endParaRPr lang="en-US" dirty="0"/>
+            </a:p>
+            <a:p>
+              <a:r>
+                <a:rPr lang="it-IT" dirty="0"/>
+                <a:t># Language model</a:t>
+              </a:r>
+            </a:p>
+            <a:p>
+              <a:r>
+                <a:rPr lang="it-IT" dirty="0"/>
+                <a:t>Settings.llm = Ollama(model="llama3.2", request_timeout=360.0)</a:t>
+              </a:r>
+            </a:p>
+            <a:p>
+              <a:endParaRPr lang="it-IT" dirty="0"/>
+            </a:p>
+            <a:p>
+              <a:r>
+                <a:rPr lang="en-US" dirty="0"/>
+                <a:t># Create RAG query engine based on index</a:t>
+              </a:r>
+            </a:p>
+            <a:p>
+              <a:r>
+                <a:rPr lang="en-US" dirty="0" err="1"/>
+                <a:t>query_engine</a:t>
+              </a:r>
+              <a:r>
+                <a:rPr lang="en-US" dirty="0"/>
+                <a:t> = </a:t>
+              </a:r>
+              <a:r>
+                <a:rPr lang="en-US" dirty="0" err="1"/>
+                <a:t>index.as_query_engine</a:t>
+              </a:r>
+              <a:r>
+                <a:rPr lang="en-US" dirty="0"/>
+                <a:t>()</a:t>
+              </a:r>
+            </a:p>
+            <a:p>
+              <a:endParaRPr lang="en-US" dirty="0"/>
+            </a:p>
+            <a:p>
+              <a:r>
+                <a:rPr lang="en-US" dirty="0"/>
+                <a:t>...</a:t>
+              </a:r>
+            </a:p>
+            <a:p>
+              <a:endParaRPr lang="en-US" dirty="0"/>
+            </a:p>
+            <a:p>
+              <a:r>
+                <a:rPr lang="en-US" dirty="0"/>
+                <a:t># Perform a query</a:t>
+              </a:r>
+            </a:p>
+            <a:p>
+              <a:r>
+                <a:rPr lang="en-US" dirty="0"/>
+                <a:t>response = </a:t>
+              </a:r>
+              <a:r>
+                <a:rPr lang="en-US" dirty="0" err="1"/>
+                <a:t>query_engine.query</a:t>
+              </a:r>
+              <a:r>
+                <a:rPr lang="en-US" dirty="0"/>
+                <a:t>(</a:t>
+              </a:r>
+              <a:r>
+                <a:rPr lang="en-US" dirty="0" err="1"/>
+                <a:t>query_text</a:t>
+              </a:r>
+              <a:r>
+                <a:rPr lang="en-US" dirty="0"/>
+                <a:t>)</a:t>
+              </a:r>
+            </a:p>
+            <a:p>
+              <a:endParaRPr lang="en-US" dirty="0"/>
+            </a:p>
+            <a:p>
+              <a:r>
+                <a:rPr lang="en-US" dirty="0"/>
+                <a:t>...</a:t>
+              </a:r>
+            </a:p>
+          </p:txBody>
+        </p:sp>
+        <p:sp>
+          <p:nvSpPr>
+            <p:cNvPr id="7" name="TextBox 6">
+              <a:extLst>
+                <a:ext uri="{FF2B5EF4-FFF2-40B4-BE49-F238E27FC236}">
+                  <a16:creationId xmlns:a16="http://schemas.microsoft.com/office/drawing/2014/main" id="{4A6D716C-9460-2E58-3384-013C01F169C8}"/>
+                </a:ext>
+              </a:extLst>
+            </p:cNvPr>
+            <p:cNvSpPr txBox="1"/>
+            <p:nvPr/>
+          </p:nvSpPr>
+          <p:spPr>
+            <a:xfrm>
+              <a:off x="7706642" y="6154177"/>
+              <a:ext cx="2390398" cy="369332"/>
+            </a:xfrm>
+            <a:prstGeom prst="rect">
+              <a:avLst/>
+            </a:prstGeom>
+            <a:solidFill>
+              <a:schemeClr val="bg1"/>
+            </a:solidFill>
+            <a:ln>
+              <a:solidFill>
+                <a:schemeClr val="accent1"/>
+              </a:solidFill>
+            </a:ln>
+          </p:spPr>
+          <p:txBody>
+            <a:bodyPr wrap="none" rtlCol="0">
+              <a:spAutoFit/>
+            </a:bodyPr>
+            <a:lstStyle/>
+            <a:p>
+              <a:r>
+                <a:rPr lang="en-US" dirty="0" err="1">
+                  <a:latin typeface="Courier New" panose="02070309020205020404" pitchFamily="49" charset="0"/>
+                  <a:cs typeface="Courier New" panose="02070309020205020404" pitchFamily="49" charset="0"/>
+                </a:rPr>
+                <a:t>Modelfile-marvin</a:t>
+              </a:r>
+              <a:endParaRPr lang="LID4096" dirty="0">
+                <a:latin typeface="Courier New" panose="02070309020205020404" pitchFamily="49" charset="0"/>
+                <a:cs typeface="Courier New" panose="02070309020205020404" pitchFamily="49" charset="0"/>
+              </a:endParaRPr>
+            </a:p>
+          </p:txBody>
+        </p:sp>
+      </p:grpSp>
+      <p:grpSp>
+        <p:nvGrpSpPr>
+          <p:cNvPr id="11" name="Group 10">
+            <a:extLst>
+              <a:ext uri="{FF2B5EF4-FFF2-40B4-BE49-F238E27FC236}">
+                <a16:creationId xmlns:a16="http://schemas.microsoft.com/office/drawing/2014/main" id="{60D4BEB9-62CA-8258-800E-0F1DAEDE03EE}"/>
+              </a:ext>
+            </a:extLst>
+          </p:cNvPr>
+          <p:cNvGrpSpPr/>
+          <p:nvPr/>
+        </p:nvGrpSpPr>
+        <p:grpSpPr>
+          <a:xfrm>
+            <a:off x="6163830" y="2250320"/>
+            <a:ext cx="4967015" cy="609534"/>
+            <a:chOff x="6567948" y="2644943"/>
+            <a:chExt cx="4967015" cy="609534"/>
+          </a:xfrm>
+        </p:grpSpPr>
+        <p:sp>
+          <p:nvSpPr>
+            <p:cNvPr id="8" name="TextBox 7">
+              <a:extLst>
+                <a:ext uri="{FF2B5EF4-FFF2-40B4-BE49-F238E27FC236}">
+                  <a16:creationId xmlns:a16="http://schemas.microsoft.com/office/drawing/2014/main" id="{AB9623F5-DBD2-D6F6-5C4B-DC7B3A1E747F}"/>
+                </a:ext>
+              </a:extLst>
+            </p:cNvPr>
+            <p:cNvSpPr txBox="1"/>
+            <p:nvPr/>
+          </p:nvSpPr>
+          <p:spPr>
+            <a:xfrm>
+              <a:off x="9743767" y="2644943"/>
+              <a:ext cx="1791196" cy="400110"/>
+            </a:xfrm>
+            <a:prstGeom prst="rect">
+              <a:avLst/>
+            </a:prstGeom>
+            <a:noFill/>
+            <a:ln>
+              <a:solidFill>
+                <a:schemeClr val="tx1"/>
+              </a:solidFill>
+            </a:ln>
+          </p:spPr>
+          <p:txBody>
+            <a:bodyPr wrap="none" rtlCol="0">
+              <a:spAutoFit/>
+            </a:bodyPr>
+            <a:lstStyle/>
+            <a:p>
+              <a:r>
+                <a:rPr lang="en-US" sz="2000" dirty="0"/>
+                <a:t>Set LLM to use</a:t>
+              </a:r>
+              <a:endParaRPr lang="LID4096" sz="2000" dirty="0"/>
+            </a:p>
+          </p:txBody>
+        </p:sp>
+        <p:cxnSp>
+          <p:nvCxnSpPr>
+            <p:cNvPr id="10" name="Straight Arrow Connector 9">
+              <a:extLst>
+                <a:ext uri="{FF2B5EF4-FFF2-40B4-BE49-F238E27FC236}">
+                  <a16:creationId xmlns:a16="http://schemas.microsoft.com/office/drawing/2014/main" id="{4670880F-4F73-6262-2E63-DC90C789F1D5}"/>
+                </a:ext>
+              </a:extLst>
+            </p:cNvPr>
+            <p:cNvCxnSpPr>
+              <a:cxnSpLocks/>
+              <a:stCxn id="8" idx="1"/>
+            </p:cNvCxnSpPr>
+            <p:nvPr/>
+          </p:nvCxnSpPr>
+          <p:spPr>
+            <a:xfrm flipH="1">
+              <a:off x="6567948" y="2844998"/>
+              <a:ext cx="3175819" cy="409479"/>
+            </a:xfrm>
+            <a:prstGeom prst="straightConnector1">
+              <a:avLst/>
+            </a:prstGeom>
+            <a:ln w="12700">
+              <a:solidFill>
+                <a:schemeClr val="tx1"/>
+              </a:solidFill>
+              <a:tailEnd type="stealth" w="lg" len="lg"/>
+            </a:ln>
+          </p:spPr>
+          <p:style>
+            <a:lnRef idx="2">
+              <a:schemeClr val="accent1"/>
+            </a:lnRef>
+            <a:fillRef idx="0">
+              <a:schemeClr val="accent1"/>
+            </a:fillRef>
+            <a:effectRef idx="1">
+              <a:schemeClr val="accent1"/>
+            </a:effectRef>
+            <a:fontRef idx="minor">
+              <a:schemeClr val="tx1"/>
+            </a:fontRef>
+          </p:style>
+        </p:cxnSp>
+      </p:grpSp>
+      <p:grpSp>
+        <p:nvGrpSpPr>
+          <p:cNvPr id="12" name="Group 11">
+            <a:extLst>
+              <a:ext uri="{FF2B5EF4-FFF2-40B4-BE49-F238E27FC236}">
+                <a16:creationId xmlns:a16="http://schemas.microsoft.com/office/drawing/2014/main" id="{5EF8BBE1-0214-64BF-60C9-BCBA8B17E228}"/>
+              </a:ext>
+            </a:extLst>
+          </p:cNvPr>
+          <p:cNvGrpSpPr/>
+          <p:nvPr/>
+        </p:nvGrpSpPr>
+        <p:grpSpPr>
+          <a:xfrm>
+            <a:off x="4910328" y="2910705"/>
+            <a:ext cx="7163619" cy="921729"/>
+            <a:chOff x="5289672" y="2644943"/>
+            <a:chExt cx="7163619" cy="921729"/>
+          </a:xfrm>
+        </p:grpSpPr>
+        <p:sp>
+          <p:nvSpPr>
+            <p:cNvPr id="13" name="TextBox 12">
+              <a:extLst>
+                <a:ext uri="{FF2B5EF4-FFF2-40B4-BE49-F238E27FC236}">
+                  <a16:creationId xmlns:a16="http://schemas.microsoft.com/office/drawing/2014/main" id="{34B63594-A36E-4F5F-925A-D9BA6381B2EE}"/>
+                </a:ext>
+              </a:extLst>
+            </p:cNvPr>
+            <p:cNvSpPr txBox="1"/>
+            <p:nvPr/>
+          </p:nvSpPr>
+          <p:spPr>
+            <a:xfrm>
+              <a:off x="9743767" y="2644943"/>
+              <a:ext cx="2709524" cy="707886"/>
+            </a:xfrm>
+            <a:prstGeom prst="rect">
+              <a:avLst/>
+            </a:prstGeom>
+            <a:noFill/>
+            <a:ln>
+              <a:solidFill>
+                <a:schemeClr val="tx1"/>
+              </a:solidFill>
+            </a:ln>
+          </p:spPr>
+          <p:txBody>
+            <a:bodyPr wrap="none" rtlCol="0">
+              <a:spAutoFit/>
+            </a:bodyPr>
+            <a:lstStyle/>
+            <a:p>
+              <a:r>
+                <a:rPr lang="en-US" sz="2000" dirty="0"/>
+                <a:t>Create query engine</a:t>
+              </a:r>
+              <a:br>
+                <a:rPr lang="en-US" sz="2000" dirty="0"/>
+              </a:br>
+              <a:r>
+                <a:rPr lang="en-US" sz="2000" dirty="0"/>
+                <a:t>from vector store index</a:t>
+              </a:r>
+              <a:endParaRPr lang="LID4096" sz="2000" dirty="0"/>
+            </a:p>
+          </p:txBody>
+        </p:sp>
+        <p:cxnSp>
+          <p:nvCxnSpPr>
+            <p:cNvPr id="14" name="Straight Arrow Connector 13">
+              <a:extLst>
+                <a:ext uri="{FF2B5EF4-FFF2-40B4-BE49-F238E27FC236}">
+                  <a16:creationId xmlns:a16="http://schemas.microsoft.com/office/drawing/2014/main" id="{D4C276BC-40B3-346A-D7C6-FBEA2584E70A}"/>
+                </a:ext>
+              </a:extLst>
+            </p:cNvPr>
+            <p:cNvCxnSpPr>
+              <a:cxnSpLocks/>
+              <a:stCxn id="13" idx="1"/>
+            </p:cNvCxnSpPr>
+            <p:nvPr/>
+          </p:nvCxnSpPr>
+          <p:spPr>
+            <a:xfrm flipH="1">
+              <a:off x="5289672" y="2998886"/>
+              <a:ext cx="4454095" cy="567786"/>
+            </a:xfrm>
+            <a:prstGeom prst="straightConnector1">
+              <a:avLst/>
+            </a:prstGeom>
+            <a:ln w="12700">
+              <a:solidFill>
+                <a:schemeClr val="tx1"/>
+              </a:solidFill>
+              <a:tailEnd type="stealth" w="lg" len="lg"/>
+            </a:ln>
+          </p:spPr>
+          <p:style>
+            <a:lnRef idx="2">
+              <a:schemeClr val="accent1"/>
+            </a:lnRef>
+            <a:fillRef idx="0">
+              <a:schemeClr val="accent1"/>
+            </a:fillRef>
+            <a:effectRef idx="1">
+              <a:schemeClr val="accent1"/>
+            </a:effectRef>
+            <a:fontRef idx="minor">
+              <a:schemeClr val="tx1"/>
+            </a:fontRef>
+          </p:style>
+        </p:cxnSp>
+      </p:grpSp>
+      <p:grpSp>
+        <p:nvGrpSpPr>
+          <p:cNvPr id="17" name="Group 16">
+            <a:extLst>
+              <a:ext uri="{FF2B5EF4-FFF2-40B4-BE49-F238E27FC236}">
+                <a16:creationId xmlns:a16="http://schemas.microsoft.com/office/drawing/2014/main" id="{093CD9F1-A74F-49E6-6936-777DE3F99B94}"/>
+              </a:ext>
+            </a:extLst>
+          </p:cNvPr>
+          <p:cNvGrpSpPr/>
+          <p:nvPr/>
+        </p:nvGrpSpPr>
+        <p:grpSpPr>
+          <a:xfrm>
+            <a:off x="5001768" y="4148267"/>
+            <a:ext cx="7048838" cy="983543"/>
+            <a:chOff x="5353029" y="2644943"/>
+            <a:chExt cx="7048838" cy="983543"/>
+          </a:xfrm>
+        </p:grpSpPr>
+        <p:sp>
+          <p:nvSpPr>
+            <p:cNvPr id="18" name="TextBox 17">
+              <a:extLst>
+                <a:ext uri="{FF2B5EF4-FFF2-40B4-BE49-F238E27FC236}">
+                  <a16:creationId xmlns:a16="http://schemas.microsoft.com/office/drawing/2014/main" id="{9F738427-1B95-821B-2C1F-20B10901668D}"/>
+                </a:ext>
+              </a:extLst>
+            </p:cNvPr>
+            <p:cNvSpPr txBox="1"/>
+            <p:nvPr/>
+          </p:nvSpPr>
+          <p:spPr>
+            <a:xfrm>
+              <a:off x="9743767" y="2644943"/>
+              <a:ext cx="2658100" cy="400110"/>
+            </a:xfrm>
+            <a:prstGeom prst="rect">
+              <a:avLst/>
+            </a:prstGeom>
+            <a:noFill/>
+            <a:ln>
+              <a:solidFill>
+                <a:schemeClr val="tx1"/>
+              </a:solidFill>
+            </a:ln>
+          </p:spPr>
+          <p:txBody>
+            <a:bodyPr wrap="none" rtlCol="0">
+              <a:spAutoFit/>
+            </a:bodyPr>
+            <a:lstStyle/>
+            <a:p>
+              <a:r>
+                <a:rPr lang="en-US" sz="2000" dirty="0"/>
+                <a:t>Query LLM using index</a:t>
+              </a:r>
+              <a:endParaRPr lang="LID4096" sz="2000" dirty="0"/>
+            </a:p>
+          </p:txBody>
+        </p:sp>
+        <p:cxnSp>
+          <p:nvCxnSpPr>
+            <p:cNvPr id="19" name="Straight Arrow Connector 18">
+              <a:extLst>
+                <a:ext uri="{FF2B5EF4-FFF2-40B4-BE49-F238E27FC236}">
+                  <a16:creationId xmlns:a16="http://schemas.microsoft.com/office/drawing/2014/main" id="{5A4F4AE7-BD56-E21E-0A55-9068E5EE912C}"/>
+                </a:ext>
+              </a:extLst>
+            </p:cNvPr>
+            <p:cNvCxnSpPr>
+              <a:cxnSpLocks/>
+              <a:stCxn id="18" idx="1"/>
+            </p:cNvCxnSpPr>
+            <p:nvPr/>
+          </p:nvCxnSpPr>
+          <p:spPr>
+            <a:xfrm flipH="1">
+              <a:off x="5353029" y="2844998"/>
+              <a:ext cx="4390738" cy="783488"/>
+            </a:xfrm>
+            <a:prstGeom prst="straightConnector1">
+              <a:avLst/>
+            </a:prstGeom>
+            <a:ln w="12700">
+              <a:solidFill>
+                <a:schemeClr val="tx1"/>
+              </a:solidFill>
+              <a:tailEnd type="stealth" w="lg" len="lg"/>
+            </a:ln>
+          </p:spPr>
+          <p:style>
+            <a:lnRef idx="2">
+              <a:schemeClr val="accent1"/>
+            </a:lnRef>
+            <a:fillRef idx="0">
+              <a:schemeClr val="accent1"/>
+            </a:fillRef>
+            <a:effectRef idx="1">
+              <a:schemeClr val="accent1"/>
+            </a:effectRef>
+            <a:fontRef idx="minor">
+              <a:schemeClr val="tx1"/>
+            </a:fontRef>
+          </p:style>
+        </p:cxnSp>
+      </p:grpSp>
     </p:spTree>
     <p:extLst>
       <p:ext uri="{BB962C8B-B14F-4D97-AF65-F5344CB8AC3E}">
-        <p14:creationId xmlns:p14="http://schemas.microsoft.com/office/powerpoint/2010/main" val="701822836"/>
+        <p14:creationId xmlns:p14="http://schemas.microsoft.com/office/powerpoint/2010/main" val="2289992205"/>
       </p:ext>
     </p:extLst>
   </p:cSld>
@@ -11518,10 +12209,10 @@
       </p:grpSpPr>
       <p:sp>
         <p:nvSpPr>
-          <p:cNvPr id="5" name="Title 4">
+          <p:cNvPr id="2" name="Title 1">
             <a:extLst>
               <a:ext uri="{FF2B5EF4-FFF2-40B4-BE49-F238E27FC236}">
-                <a16:creationId xmlns:a16="http://schemas.microsoft.com/office/drawing/2014/main" id="{B382CAAC-408F-C8F3-7F14-549F40BBAE9D}"/>
+                <a16:creationId xmlns:a16="http://schemas.microsoft.com/office/drawing/2014/main" id="{9B79AC04-2006-DFBE-35B0-75DEF1F303E0}"/>
               </a:ext>
             </a:extLst>
           </p:cNvPr>
@@ -11539,7 +12230,7 @@
           <a:p>
             <a:r>
               <a:rPr lang="en-US" dirty="0"/>
-              <a:t>Yes... well, maybe</a:t>
+              <a:t>Can I run an LLM on my laptop?</a:t>
             </a:r>
             <a:endParaRPr lang="LID4096" dirty="0"/>
           </a:p>
@@ -11547,10 +12238,10 @@
       </p:sp>
       <p:sp>
         <p:nvSpPr>
-          <p:cNvPr id="6" name="Content Placeholder 5">
+          <p:cNvPr id="3" name="Text Placeholder 2">
             <a:extLst>
               <a:ext uri="{FF2B5EF4-FFF2-40B4-BE49-F238E27FC236}">
-                <a16:creationId xmlns:a16="http://schemas.microsoft.com/office/drawing/2014/main" id="{CD6B1D44-1ECA-76AE-F841-E950FBC9EA91}"/>
+                <a16:creationId xmlns:a16="http://schemas.microsoft.com/office/drawing/2014/main" id="{44184DB0-1612-54D0-EB5C-F5AE96AD8597}"/>
               </a:ext>
             </a:extLst>
           </p:cNvPr>
@@ -11558,7 +12249,7 @@
             <a:spLocks noGrp="1"/>
           </p:cNvSpPr>
           <p:nvPr>
-            <p:ph idx="1"/>
+            <p:ph type="body" idx="1"/>
           </p:nvPr>
         </p:nvSpPr>
         <p:spPr/>
@@ -11566,66 +12257,7 @@
           <a:bodyPr/>
           <a:lstStyle/>
           <a:p>
-            <a:r>
-              <a:rPr lang="en-US" dirty="0"/>
-              <a:t>Depends on</a:t>
-            </a:r>
-          </a:p>
-          <a:p>
-            <a:pPr lvl="1"/>
-            <a:r>
-              <a:rPr lang="en-US" dirty="0"/>
-              <a:t>Hardware?</a:t>
-            </a:r>
-          </a:p>
-          <a:p>
-            <a:pPr lvl="2"/>
-            <a:r>
-              <a:rPr lang="en-US" dirty="0"/>
-              <a:t>CPU</a:t>
-            </a:r>
-          </a:p>
-          <a:p>
-            <a:pPr lvl="2"/>
-            <a:r>
-              <a:rPr lang="en-US" dirty="0"/>
-              <a:t>RAM</a:t>
-            </a:r>
-          </a:p>
-          <a:p>
-            <a:pPr lvl="2"/>
-            <a:r>
-              <a:rPr lang="en-US" dirty="0"/>
-              <a:t>GPU</a:t>
-            </a:r>
-          </a:p>
-          <a:p>
-            <a:pPr lvl="1"/>
-            <a:r>
-              <a:rPr lang="en-US" dirty="0"/>
-              <a:t>Task?</a:t>
-            </a:r>
-          </a:p>
-          <a:p>
-            <a:pPr lvl="2"/>
-            <a:r>
-              <a:rPr lang="en-US" dirty="0"/>
-              <a:t>Inference</a:t>
-            </a:r>
-          </a:p>
-          <a:p>
-            <a:pPr lvl="2"/>
-            <a:r>
-              <a:rPr lang="en-US" dirty="0"/>
-              <a:t>Training</a:t>
-            </a:r>
-          </a:p>
-          <a:p>
-            <a:r>
-              <a:rPr lang="en-US" dirty="0"/>
-              <a:t>For serious work, use HPC system</a:t>
-            </a:r>
-            <a:endParaRPr lang="LID4096" dirty="0"/>
+            <a:endParaRPr lang="LID4096"/>
           </a:p>
         </p:txBody>
       </p:sp>
@@ -11634,7 +12266,7 @@
           <p:cNvPr id="4" name="Slide Number Placeholder 3">
             <a:extLst>
               <a:ext uri="{FF2B5EF4-FFF2-40B4-BE49-F238E27FC236}">
-                <a16:creationId xmlns:a16="http://schemas.microsoft.com/office/drawing/2014/main" id="{503D7D71-6BB5-DC87-A366-E6F981ED3CCD}"/>
+                <a16:creationId xmlns:a16="http://schemas.microsoft.com/office/drawing/2014/main" id="{E026CBC6-37B7-B7B9-EF98-DA17BAEB822A}"/>
               </a:ext>
             </a:extLst>
           </p:cNvPr>
@@ -11661,7 +12293,7 @@
     </p:spTree>
     <p:extLst>
       <p:ext uri="{BB962C8B-B14F-4D97-AF65-F5344CB8AC3E}">
-        <p14:creationId xmlns:p14="http://schemas.microsoft.com/office/powerpoint/2010/main" val="1055966218"/>
+        <p14:creationId xmlns:p14="http://schemas.microsoft.com/office/powerpoint/2010/main" val="701822836"/>
       </p:ext>
     </p:extLst>
   </p:cSld>
@@ -11690,6 +12322,178 @@
       </p:grpSpPr>
       <p:sp>
         <p:nvSpPr>
+          <p:cNvPr id="5" name="Title 4">
+            <a:extLst>
+              <a:ext uri="{FF2B5EF4-FFF2-40B4-BE49-F238E27FC236}">
+                <a16:creationId xmlns:a16="http://schemas.microsoft.com/office/drawing/2014/main" id="{B382CAAC-408F-C8F3-7F14-549F40BBAE9D}"/>
+              </a:ext>
+            </a:extLst>
+          </p:cNvPr>
+          <p:cNvSpPr>
+            <a:spLocks noGrp="1"/>
+          </p:cNvSpPr>
+          <p:nvPr>
+            <p:ph type="title"/>
+          </p:nvPr>
+        </p:nvSpPr>
+        <p:spPr/>
+        <p:txBody>
+          <a:bodyPr/>
+          <a:lstStyle/>
+          <a:p>
+            <a:r>
+              <a:rPr lang="en-US" dirty="0"/>
+              <a:t>Yes... well, maybe</a:t>
+            </a:r>
+            <a:endParaRPr lang="LID4096" dirty="0"/>
+          </a:p>
+        </p:txBody>
+      </p:sp>
+      <p:sp>
+        <p:nvSpPr>
+          <p:cNvPr id="6" name="Content Placeholder 5">
+            <a:extLst>
+              <a:ext uri="{FF2B5EF4-FFF2-40B4-BE49-F238E27FC236}">
+                <a16:creationId xmlns:a16="http://schemas.microsoft.com/office/drawing/2014/main" id="{CD6B1D44-1ECA-76AE-F841-E950FBC9EA91}"/>
+              </a:ext>
+            </a:extLst>
+          </p:cNvPr>
+          <p:cNvSpPr>
+            <a:spLocks noGrp="1"/>
+          </p:cNvSpPr>
+          <p:nvPr>
+            <p:ph idx="1"/>
+          </p:nvPr>
+        </p:nvSpPr>
+        <p:spPr/>
+        <p:txBody>
+          <a:bodyPr/>
+          <a:lstStyle/>
+          <a:p>
+            <a:r>
+              <a:rPr lang="en-US" dirty="0"/>
+              <a:t>Depends on</a:t>
+            </a:r>
+          </a:p>
+          <a:p>
+            <a:pPr lvl="1"/>
+            <a:r>
+              <a:rPr lang="en-US" dirty="0"/>
+              <a:t>Hardware?</a:t>
+            </a:r>
+          </a:p>
+          <a:p>
+            <a:pPr lvl="2"/>
+            <a:r>
+              <a:rPr lang="en-US" dirty="0"/>
+              <a:t>CPU</a:t>
+            </a:r>
+          </a:p>
+          <a:p>
+            <a:pPr lvl="2"/>
+            <a:r>
+              <a:rPr lang="en-US" dirty="0"/>
+              <a:t>RAM</a:t>
+            </a:r>
+          </a:p>
+          <a:p>
+            <a:pPr lvl="2"/>
+            <a:r>
+              <a:rPr lang="en-US" dirty="0"/>
+              <a:t>GPU</a:t>
+            </a:r>
+          </a:p>
+          <a:p>
+            <a:pPr lvl="1"/>
+            <a:r>
+              <a:rPr lang="en-US" dirty="0"/>
+              <a:t>Task?</a:t>
+            </a:r>
+          </a:p>
+          <a:p>
+            <a:pPr lvl="2"/>
+            <a:r>
+              <a:rPr lang="en-US" dirty="0"/>
+              <a:t>Inference</a:t>
+            </a:r>
+          </a:p>
+          <a:p>
+            <a:pPr lvl="2"/>
+            <a:r>
+              <a:rPr lang="en-US" dirty="0"/>
+              <a:t>Training</a:t>
+            </a:r>
+          </a:p>
+          <a:p>
+            <a:r>
+              <a:rPr lang="en-US" dirty="0"/>
+              <a:t>For serious work, use HPC system</a:t>
+            </a:r>
+            <a:endParaRPr lang="LID4096" dirty="0"/>
+          </a:p>
+        </p:txBody>
+      </p:sp>
+      <p:sp>
+        <p:nvSpPr>
+          <p:cNvPr id="4" name="Slide Number Placeholder 3">
+            <a:extLst>
+              <a:ext uri="{FF2B5EF4-FFF2-40B4-BE49-F238E27FC236}">
+                <a16:creationId xmlns:a16="http://schemas.microsoft.com/office/drawing/2014/main" id="{503D7D71-6BB5-DC87-A366-E6F981ED3CCD}"/>
+              </a:ext>
+            </a:extLst>
+          </p:cNvPr>
+          <p:cNvSpPr>
+            <a:spLocks noGrp="1"/>
+          </p:cNvSpPr>
+          <p:nvPr>
+            <p:ph type="sldNum" sz="quarter" idx="12"/>
+          </p:nvPr>
+        </p:nvSpPr>
+        <p:spPr/>
+        <p:txBody>
+          <a:bodyPr/>
+          <a:lstStyle/>
+          <a:p>
+            <a:fld id="{6A9C7FA6-5826-4EA5-8536-11A903012ABC}" type="slidenum">
+              <a:rPr lang="LID4096" smtClean="0"/>
+              <a:t>18</a:t>
+            </a:fld>
+            <a:endParaRPr lang="LID4096"/>
+          </a:p>
+        </p:txBody>
+      </p:sp>
+    </p:spTree>
+    <p:extLst>
+      <p:ext uri="{BB962C8B-B14F-4D97-AF65-F5344CB8AC3E}">
+        <p14:creationId xmlns:p14="http://schemas.microsoft.com/office/powerpoint/2010/main" val="1055966218"/>
+      </p:ext>
+    </p:extLst>
+  </p:cSld>
+  <p:clrMapOvr>
+    <a:masterClrMapping/>
+  </p:clrMapOvr>
+</p:sld>
+</file>
+
+<file path=ppt/slides/slide19.xml><?xml version="1.0" encoding="utf-8"?>
+<p:sld xmlns:a="http://schemas.openxmlformats.org/drawingml/2006/main" xmlns:r="http://schemas.openxmlformats.org/officeDocument/2006/relationships" xmlns:p="http://schemas.openxmlformats.org/presentationml/2006/main">
+  <p:cSld>
+    <p:spTree>
+      <p:nvGrpSpPr>
+        <p:cNvPr id="1" name=""/>
+        <p:cNvGrpSpPr/>
+        <p:nvPr/>
+      </p:nvGrpSpPr>
+      <p:grpSpPr>
+        <a:xfrm>
+          <a:off x="0" y="0"/>
+          <a:ext cx="0" cy="0"/>
+          <a:chOff x="0" y="0"/>
+          <a:chExt cx="0" cy="0"/>
+        </a:xfrm>
+      </p:grpSpPr>
+      <p:sp>
+        <p:nvSpPr>
           <p:cNvPr id="2" name="Title 1">
             <a:extLst>
               <a:ext uri="{FF2B5EF4-FFF2-40B4-BE49-F238E27FC236}">
@@ -11811,7 +12615,7 @@
           <a:p>
             <a:fld id="{6A9C7FA6-5826-4EA5-8536-11A903012ABC}" type="slidenum">
               <a:rPr lang="LID4096" smtClean="0"/>
-              <a:t>18</a:t>
+              <a:t>19</a:t>
             </a:fld>
             <a:endParaRPr lang="LID4096"/>
           </a:p>
@@ -11928,309 +12732,6 @@
 </p:sld>
 </file>
 
-<file path=ppt/slides/slide19.xml><?xml version="1.0" encoding="utf-8"?>
-<p:sld xmlns:a="http://schemas.openxmlformats.org/drawingml/2006/main" xmlns:r="http://schemas.openxmlformats.org/officeDocument/2006/relationships" xmlns:p="http://schemas.openxmlformats.org/presentationml/2006/main">
-  <p:cSld>
-    <p:spTree>
-      <p:nvGrpSpPr>
-        <p:cNvPr id="1" name=""/>
-        <p:cNvGrpSpPr/>
-        <p:nvPr/>
-      </p:nvGrpSpPr>
-      <p:grpSpPr>
-        <a:xfrm>
-          <a:off x="0" y="0"/>
-          <a:ext cx="0" cy="0"/>
-          <a:chOff x="0" y="0"/>
-          <a:chExt cx="0" cy="0"/>
-        </a:xfrm>
-      </p:grpSpPr>
-      <p:sp>
-        <p:nvSpPr>
-          <p:cNvPr id="2" name="Title 1">
-            <a:extLst>
-              <a:ext uri="{FF2B5EF4-FFF2-40B4-BE49-F238E27FC236}">
-                <a16:creationId xmlns:a16="http://schemas.microsoft.com/office/drawing/2014/main" id="{CE97B5D7-BAA1-FBB8-6184-533B51712098}"/>
-              </a:ext>
-            </a:extLst>
-          </p:cNvPr>
-          <p:cNvSpPr>
-            <a:spLocks noGrp="1"/>
-          </p:cNvSpPr>
-          <p:nvPr>
-            <p:ph type="title"/>
-          </p:nvPr>
-        </p:nvSpPr>
-        <p:spPr/>
-        <p:txBody>
-          <a:bodyPr/>
-          <a:lstStyle/>
-          <a:p>
-            <a:r>
-              <a:rPr lang="en-US" dirty="0"/>
-              <a:t>How to chat with </a:t>
-            </a:r>
-            <a:r>
-              <a:rPr lang="en-US" dirty="0" err="1"/>
-              <a:t>Ollama</a:t>
-            </a:r>
-            <a:r>
-              <a:rPr lang="en-US" dirty="0"/>
-              <a:t> models</a:t>
-            </a:r>
-            <a:endParaRPr lang="LID4096" dirty="0"/>
-          </a:p>
-        </p:txBody>
-      </p:sp>
-      <p:sp>
-        <p:nvSpPr>
-          <p:cNvPr id="3" name="Content Placeholder 2">
-            <a:extLst>
-              <a:ext uri="{FF2B5EF4-FFF2-40B4-BE49-F238E27FC236}">
-                <a16:creationId xmlns:a16="http://schemas.microsoft.com/office/drawing/2014/main" id="{CEECEEE3-F8DC-024B-7402-BE693A3E8D90}"/>
-              </a:ext>
-            </a:extLst>
-          </p:cNvPr>
-          <p:cNvSpPr>
-            <a:spLocks noGrp="1"/>
-          </p:cNvSpPr>
-          <p:nvPr>
-            <p:ph idx="1"/>
-          </p:nvPr>
-        </p:nvSpPr>
-        <p:spPr/>
-        <p:txBody>
-          <a:bodyPr/>
-          <a:lstStyle/>
-          <a:p>
-            <a:r>
-              <a:rPr lang="en-US" dirty="0"/>
-              <a:t>Start server</a:t>
-            </a:r>
-          </a:p>
-          <a:p>
-            <a:endParaRPr lang="en-US" dirty="0"/>
-          </a:p>
-          <a:p>
-            <a:endParaRPr lang="en-US" dirty="0"/>
-          </a:p>
-          <a:p>
-            <a:endParaRPr lang="en-US" dirty="0"/>
-          </a:p>
-          <a:p>
-            <a:r>
-              <a:rPr lang="en-US" dirty="0"/>
-              <a:t>(Pull,) launch model, e.g., </a:t>
-            </a:r>
-            <a:r>
-              <a:rPr lang="en-US" dirty="0">
-                <a:latin typeface="Courier New" panose="02070309020205020404" pitchFamily="49" charset="0"/>
-                <a:cs typeface="Courier New" panose="02070309020205020404" pitchFamily="49" charset="0"/>
-              </a:rPr>
-              <a:t>llama3.2</a:t>
-            </a:r>
-            <a:r>
-              <a:rPr lang="en-US" dirty="0"/>
-              <a:t> &amp; start client</a:t>
-            </a:r>
-            <a:endParaRPr lang="LID4096" dirty="0"/>
-          </a:p>
-        </p:txBody>
-      </p:sp>
-      <p:sp>
-        <p:nvSpPr>
-          <p:cNvPr id="4" name="Slide Number Placeholder 3">
-            <a:extLst>
-              <a:ext uri="{FF2B5EF4-FFF2-40B4-BE49-F238E27FC236}">
-                <a16:creationId xmlns:a16="http://schemas.microsoft.com/office/drawing/2014/main" id="{0BDD5D7D-5708-B578-CE7C-09581000B37F}"/>
-              </a:ext>
-            </a:extLst>
-          </p:cNvPr>
-          <p:cNvSpPr>
-            <a:spLocks noGrp="1"/>
-          </p:cNvSpPr>
-          <p:nvPr>
-            <p:ph type="sldNum" sz="quarter" idx="12"/>
-          </p:nvPr>
-        </p:nvSpPr>
-        <p:spPr/>
-        <p:txBody>
-          <a:bodyPr/>
-          <a:lstStyle/>
-          <a:p>
-            <a:fld id="{6A9C7FA6-5826-4EA5-8536-11A903012ABC}" type="slidenum">
-              <a:rPr lang="LID4096" smtClean="0"/>
-              <a:t>19</a:t>
-            </a:fld>
-            <a:endParaRPr lang="LID4096"/>
-          </a:p>
-        </p:txBody>
-      </p:sp>
-      <p:sp>
-        <p:nvSpPr>
-          <p:cNvPr id="5" name="TextBox 4">
-            <a:extLst>
-              <a:ext uri="{FF2B5EF4-FFF2-40B4-BE49-F238E27FC236}">
-                <a16:creationId xmlns:a16="http://schemas.microsoft.com/office/drawing/2014/main" id="{ACB18532-9D05-EC41-37C4-B104E78FC723}"/>
-              </a:ext>
-            </a:extLst>
-          </p:cNvPr>
-          <p:cNvSpPr txBox="1"/>
-          <p:nvPr/>
-        </p:nvSpPr>
-        <p:spPr>
-          <a:xfrm>
-            <a:off x="1779637" y="2659559"/>
-            <a:ext cx="4424609" cy="584775"/>
-          </a:xfrm>
-          <a:prstGeom prst="rect">
-            <a:avLst/>
-          </a:prstGeom>
-          <a:solidFill>
-            <a:schemeClr val="tx1"/>
-          </a:solidFill>
-        </p:spPr>
-        <p:txBody>
-          <a:bodyPr wrap="square" rtlCol="0">
-            <a:spAutoFit/>
-          </a:bodyPr>
-          <a:lstStyle/>
-          <a:p>
-            <a:r>
-              <a:rPr lang="en-US" sz="3200" dirty="0">
-                <a:solidFill>
-                  <a:schemeClr val="bg1"/>
-                </a:solidFill>
-                <a:latin typeface="Courier New" panose="02070309020205020404" pitchFamily="49" charset="0"/>
-                <a:cs typeface="Courier New" panose="02070309020205020404" pitchFamily="49" charset="0"/>
-              </a:rPr>
-              <a:t>$ </a:t>
-            </a:r>
-            <a:r>
-              <a:rPr lang="en-US" sz="2400" dirty="0" err="1">
-                <a:solidFill>
-                  <a:schemeClr val="bg1"/>
-                </a:solidFill>
-                <a:latin typeface="Courier New" panose="02070309020205020404" pitchFamily="49" charset="0"/>
-                <a:cs typeface="Courier New" panose="02070309020205020404" pitchFamily="49" charset="0"/>
-              </a:rPr>
-              <a:t>ollama</a:t>
-            </a:r>
-            <a:r>
-              <a:rPr lang="en-US" sz="3200" dirty="0">
-                <a:solidFill>
-                  <a:schemeClr val="bg1"/>
-                </a:solidFill>
-                <a:latin typeface="Courier New" panose="02070309020205020404" pitchFamily="49" charset="0"/>
-                <a:cs typeface="Courier New" panose="02070309020205020404" pitchFamily="49" charset="0"/>
-              </a:rPr>
-              <a:t>  serve</a:t>
-            </a:r>
-            <a:endParaRPr lang="LID4096" sz="3200" dirty="0">
-              <a:solidFill>
-                <a:schemeClr val="bg1"/>
-              </a:solidFill>
-              <a:latin typeface="Courier New" panose="02070309020205020404" pitchFamily="49" charset="0"/>
-              <a:cs typeface="Courier New" panose="02070309020205020404" pitchFamily="49" charset="0"/>
-            </a:endParaRPr>
-          </a:p>
-        </p:txBody>
-      </p:sp>
-      <p:sp>
-        <p:nvSpPr>
-          <p:cNvPr id="6" name="TextBox 5">
-            <a:extLst>
-              <a:ext uri="{FF2B5EF4-FFF2-40B4-BE49-F238E27FC236}">
-                <a16:creationId xmlns:a16="http://schemas.microsoft.com/office/drawing/2014/main" id="{AE3BAEAB-78C7-7EBB-8415-95C321BBD007}"/>
-              </a:ext>
-            </a:extLst>
-          </p:cNvPr>
-          <p:cNvSpPr txBox="1"/>
-          <p:nvPr/>
-        </p:nvSpPr>
-        <p:spPr>
-          <a:xfrm>
-            <a:off x="1779638" y="4689921"/>
-            <a:ext cx="4424609" cy="830997"/>
-          </a:xfrm>
-          <a:prstGeom prst="rect">
-            <a:avLst/>
-          </a:prstGeom>
-          <a:solidFill>
-            <a:schemeClr val="tx1"/>
-          </a:solidFill>
-        </p:spPr>
-        <p:txBody>
-          <a:bodyPr wrap="none" rtlCol="0">
-            <a:spAutoFit/>
-          </a:bodyPr>
-          <a:lstStyle/>
-          <a:p>
-            <a:r>
-              <a:rPr lang="en-US" sz="2400" dirty="0">
-                <a:solidFill>
-                  <a:schemeClr val="bg1"/>
-                </a:solidFill>
-                <a:latin typeface="Courier New" panose="02070309020205020404" pitchFamily="49" charset="0"/>
-                <a:cs typeface="Courier New" panose="02070309020205020404" pitchFamily="49" charset="0"/>
-              </a:rPr>
-              <a:t>$ </a:t>
-            </a:r>
-            <a:r>
-              <a:rPr lang="en-US" sz="2400" dirty="0" err="1">
-                <a:solidFill>
-                  <a:schemeClr val="bg1"/>
-                </a:solidFill>
-                <a:latin typeface="Courier New" panose="02070309020205020404" pitchFamily="49" charset="0"/>
-                <a:cs typeface="Courier New" panose="02070309020205020404" pitchFamily="49" charset="0"/>
-              </a:rPr>
-              <a:t>ollama</a:t>
-            </a:r>
-            <a:r>
-              <a:rPr lang="en-US" sz="2400" dirty="0">
-                <a:solidFill>
-                  <a:schemeClr val="bg1"/>
-                </a:solidFill>
-                <a:latin typeface="Courier New" panose="02070309020205020404" pitchFamily="49" charset="0"/>
-                <a:cs typeface="Courier New" panose="02070309020205020404" pitchFamily="49" charset="0"/>
-              </a:rPr>
-              <a:t>  run  llama3.2</a:t>
-            </a:r>
-          </a:p>
-          <a:p>
-            <a:r>
-              <a:rPr lang="en-US" sz="2400" dirty="0">
-                <a:solidFill>
-                  <a:schemeClr val="bg1"/>
-                </a:solidFill>
-                <a:latin typeface="Courier New" panose="02070309020205020404" pitchFamily="49" charset="0"/>
-                <a:cs typeface="Courier New" panose="02070309020205020404" pitchFamily="49" charset="0"/>
-              </a:rPr>
-              <a:t>&gt;&gt;&gt;</a:t>
-            </a:r>
-            <a:endParaRPr lang="LID4096" sz="2400" dirty="0">
-              <a:solidFill>
-                <a:schemeClr val="bg1"/>
-              </a:solidFill>
-              <a:latin typeface="Courier New" panose="02070309020205020404" pitchFamily="49" charset="0"/>
-              <a:cs typeface="Courier New" panose="02070309020205020404" pitchFamily="49" charset="0"/>
-            </a:endParaRPr>
-          </a:p>
-        </p:txBody>
-      </p:sp>
-    </p:spTree>
-    <p:extLst>
-      <p:ext uri="{BB962C8B-B14F-4D97-AF65-F5344CB8AC3E}">
-        <p14:creationId xmlns:p14="http://schemas.microsoft.com/office/powerpoint/2010/main" val="3447296397"/>
-      </p:ext>
-    </p:extLst>
-  </p:cSld>
-  <p:clrMapOvr>
-    <a:masterClrMapping/>
-  </p:clrMapOvr>
-</p:sld>
-</file>
-
 <file path=ppt/slides/slide2.xml><?xml version="1.0" encoding="utf-8"?>
 <p:sld xmlns:a="http://schemas.openxmlformats.org/drawingml/2006/main" xmlns:r="http://schemas.openxmlformats.org/officeDocument/2006/relationships" xmlns:p="http://schemas.openxmlformats.org/presentationml/2006/main">
   <p:cSld>
@@ -12348,7 +12849,7 @@
           <p:cNvPr id="2" name="Title 1">
             <a:extLst>
               <a:ext uri="{FF2B5EF4-FFF2-40B4-BE49-F238E27FC236}">
-                <a16:creationId xmlns:a16="http://schemas.microsoft.com/office/drawing/2014/main" id="{DDB1FCA8-2989-F35C-4EF0-13094E44E02D}"/>
+                <a16:creationId xmlns:a16="http://schemas.microsoft.com/office/drawing/2014/main" id="{CE97B5D7-BAA1-FBB8-6184-533B51712098}"/>
               </a:ext>
             </a:extLst>
           </p:cNvPr>
@@ -12366,7 +12867,15 @@
           <a:p>
             <a:r>
               <a:rPr lang="en-US" dirty="0"/>
-              <a:t>How to manage models</a:t>
+              <a:t>How to chat with </a:t>
+            </a:r>
+            <a:r>
+              <a:rPr lang="en-US" dirty="0" err="1"/>
+              <a:t>Ollama</a:t>
+            </a:r>
+            <a:r>
+              <a:rPr lang="en-US" dirty="0"/>
+              <a:t> models</a:t>
             </a:r>
             <a:endParaRPr lang="LID4096" dirty="0"/>
           </a:p>
@@ -12377,7 +12886,7 @@
           <p:cNvPr id="3" name="Content Placeholder 2">
             <a:extLst>
               <a:ext uri="{FF2B5EF4-FFF2-40B4-BE49-F238E27FC236}">
-                <a16:creationId xmlns:a16="http://schemas.microsoft.com/office/drawing/2014/main" id="{B46BAE5A-671C-7525-5A0C-BAD6499EC12F}"/>
+                <a16:creationId xmlns:a16="http://schemas.microsoft.com/office/drawing/2014/main" id="{CEECEEE3-F8DC-024B-7402-BE693A3E8D90}"/>
               </a:ext>
             </a:extLst>
           </p:cNvPr>
@@ -12390,14 +12899,12 @@
         </p:nvSpPr>
         <p:spPr/>
         <p:txBody>
-          <a:bodyPr>
-            <a:normAutofit fontScale="92500" lnSpcReduction="20000"/>
-          </a:bodyPr>
+          <a:bodyPr/>
           <a:lstStyle/>
           <a:p>
             <a:r>
               <a:rPr lang="en-US" dirty="0"/>
-              <a:t>List installed models</a:t>
+              <a:t>Start server</a:t>
             </a:r>
           </a:p>
           <a:p>
@@ -12407,75 +12914,25 @@
             <a:endParaRPr lang="en-US" dirty="0"/>
           </a:p>
           <a:p>
+            <a:endParaRPr lang="en-US" dirty="0"/>
+          </a:p>
+          <a:p>
             <a:r>
               <a:rPr lang="en-US" dirty="0"/>
-              <a:t>Install model, e.g., </a:t>
-            </a:r>
-            <a:r>
-              <a:rPr lang="en-US" dirty="0" err="1">
+              <a:t>(Pull,) launch model, e.g., </a:t>
+            </a:r>
+            <a:r>
+              <a:rPr lang="en-US" dirty="0">
                 <a:latin typeface="Courier New" panose="02070309020205020404" pitchFamily="49" charset="0"/>
                 <a:cs typeface="Courier New" panose="02070309020205020404" pitchFamily="49" charset="0"/>
               </a:rPr>
-              <a:t>codellama</a:t>
-            </a:r>
-            <a:endParaRPr lang="en-US" dirty="0">
-              <a:latin typeface="Courier New" panose="02070309020205020404" pitchFamily="49" charset="0"/>
-              <a:cs typeface="Courier New" panose="02070309020205020404" pitchFamily="49" charset="0"/>
-            </a:endParaRPr>
-          </a:p>
-          <a:p>
-            <a:endParaRPr lang="en-US" dirty="0">
-              <a:latin typeface="Courier New" panose="02070309020205020404" pitchFamily="49" charset="0"/>
-              <a:cs typeface="Courier New" panose="02070309020205020404" pitchFamily="49" charset="0"/>
-            </a:endParaRPr>
-          </a:p>
-          <a:p>
-            <a:endParaRPr lang="en-US" dirty="0">
-              <a:latin typeface="Courier New" panose="02070309020205020404" pitchFamily="49" charset="0"/>
-              <a:cs typeface="Courier New" panose="02070309020205020404" pitchFamily="49" charset="0"/>
-            </a:endParaRPr>
-          </a:p>
-          <a:p>
-            <a:r>
-              <a:rPr lang="en-US" dirty="0">
-                <a:cs typeface="Courier New" panose="02070309020205020404" pitchFamily="49" charset="0"/>
-              </a:rPr>
-              <a:t>Show information about model, e.g., </a:t>
-            </a:r>
-            <a:r>
-              <a:rPr lang="en-US" dirty="0" err="1">
-                <a:latin typeface="Courier New" panose="02070309020205020404" pitchFamily="49" charset="0"/>
-                <a:cs typeface="Courier New" panose="02070309020205020404" pitchFamily="49" charset="0"/>
-              </a:rPr>
-              <a:t>codellama</a:t>
-            </a:r>
-            <a:endParaRPr lang="en-US" dirty="0">
-              <a:latin typeface="Courier New" panose="02070309020205020404" pitchFamily="49" charset="0"/>
-              <a:cs typeface="Courier New" panose="02070309020205020404" pitchFamily="49" charset="0"/>
-            </a:endParaRPr>
-          </a:p>
-          <a:p>
-            <a:endParaRPr lang="en-US" dirty="0"/>
-          </a:p>
-          <a:p>
-            <a:endParaRPr lang="en-US" dirty="0"/>
-          </a:p>
-          <a:p>
+              <a:t>llama3.2</a:t>
+            </a:r>
             <a:r>
               <a:rPr lang="en-US" dirty="0"/>
-              <a:t>Remove model, e.g., </a:t>
-            </a:r>
-            <a:r>
-              <a:rPr lang="en-US" dirty="0" err="1">
-                <a:latin typeface="Courier New" panose="02070309020205020404" pitchFamily="49" charset="0"/>
-                <a:cs typeface="Courier New" panose="02070309020205020404" pitchFamily="49" charset="0"/>
-              </a:rPr>
-              <a:t>codellama</a:t>
-            </a:r>
-            <a:endParaRPr lang="en-US" dirty="0">
-              <a:latin typeface="Courier New" panose="02070309020205020404" pitchFamily="49" charset="0"/>
-              <a:cs typeface="Courier New" panose="02070309020205020404" pitchFamily="49" charset="0"/>
-            </a:endParaRPr>
+              <a:t> &amp; start client</a:t>
+            </a:r>
+            <a:endParaRPr lang="LID4096" dirty="0"/>
           </a:p>
         </p:txBody>
       </p:sp>
@@ -12484,7 +12941,7 @@
           <p:cNvPr id="4" name="Slide Number Placeholder 3">
             <a:extLst>
               <a:ext uri="{FF2B5EF4-FFF2-40B4-BE49-F238E27FC236}">
-                <a16:creationId xmlns:a16="http://schemas.microsoft.com/office/drawing/2014/main" id="{B2465C57-3677-7E21-76E0-DEAEE4B9E5A3}"/>
+                <a16:creationId xmlns:a16="http://schemas.microsoft.com/office/drawing/2014/main" id="{0BDD5D7D-5708-B578-CE7C-09581000B37F}"/>
               </a:ext>
             </a:extLst>
           </p:cNvPr>
@@ -12513,7 +12970,7 @@
           <p:cNvPr id="5" name="TextBox 4">
             <a:extLst>
               <a:ext uri="{FF2B5EF4-FFF2-40B4-BE49-F238E27FC236}">
-                <a16:creationId xmlns:a16="http://schemas.microsoft.com/office/drawing/2014/main" id="{E689A2F1-DD2D-A183-7915-E91C3C1A6B5B}"/>
+                <a16:creationId xmlns:a16="http://schemas.microsoft.com/office/drawing/2014/main" id="{ACB18532-9D05-EC41-37C4-B104E78FC723}"/>
               </a:ext>
             </a:extLst>
           </p:cNvPr>
@@ -12522,8 +12979,8 @@
         </p:nvSpPr>
         <p:spPr>
           <a:xfrm>
-            <a:off x="1445341" y="2266272"/>
-            <a:ext cx="6184491" cy="461665"/>
+            <a:off x="1779637" y="2659559"/>
+            <a:ext cx="4424609" cy="584775"/>
           </a:xfrm>
           <a:prstGeom prst="rect">
             <a:avLst/>
@@ -12539,6 +12996,76 @@
           <a:lstStyle/>
           <a:p>
             <a:r>
+              <a:rPr lang="en-US" sz="3200" dirty="0">
+                <a:solidFill>
+                  <a:schemeClr val="bg1"/>
+                </a:solidFill>
+                <a:latin typeface="Courier New" panose="02070309020205020404" pitchFamily="49" charset="0"/>
+                <a:cs typeface="Courier New" panose="02070309020205020404" pitchFamily="49" charset="0"/>
+              </a:rPr>
+              <a:t>$ </a:t>
+            </a:r>
+            <a:r>
+              <a:rPr lang="en-US" sz="2400" dirty="0" err="1">
+                <a:solidFill>
+                  <a:schemeClr val="bg1"/>
+                </a:solidFill>
+                <a:latin typeface="Courier New" panose="02070309020205020404" pitchFamily="49" charset="0"/>
+                <a:cs typeface="Courier New" panose="02070309020205020404" pitchFamily="49" charset="0"/>
+              </a:rPr>
+              <a:t>ollama</a:t>
+            </a:r>
+            <a:r>
+              <a:rPr lang="en-US" sz="3200" dirty="0">
+                <a:solidFill>
+                  <a:schemeClr val="bg1"/>
+                </a:solidFill>
+                <a:latin typeface="Courier New" panose="02070309020205020404" pitchFamily="49" charset="0"/>
+                <a:cs typeface="Courier New" panose="02070309020205020404" pitchFamily="49" charset="0"/>
+              </a:rPr>
+              <a:t>  serve</a:t>
+            </a:r>
+            <a:endParaRPr lang="LID4096" sz="3200" dirty="0">
+              <a:solidFill>
+                <a:schemeClr val="bg1"/>
+              </a:solidFill>
+              <a:latin typeface="Courier New" panose="02070309020205020404" pitchFamily="49" charset="0"/>
+              <a:cs typeface="Courier New" panose="02070309020205020404" pitchFamily="49" charset="0"/>
+            </a:endParaRPr>
+          </a:p>
+        </p:txBody>
+      </p:sp>
+      <p:sp>
+        <p:nvSpPr>
+          <p:cNvPr id="6" name="TextBox 5">
+            <a:extLst>
+              <a:ext uri="{FF2B5EF4-FFF2-40B4-BE49-F238E27FC236}">
+                <a16:creationId xmlns:a16="http://schemas.microsoft.com/office/drawing/2014/main" id="{AE3BAEAB-78C7-7EBB-8415-95C321BBD007}"/>
+              </a:ext>
+            </a:extLst>
+          </p:cNvPr>
+          <p:cNvSpPr txBox="1"/>
+          <p:nvPr/>
+        </p:nvSpPr>
+        <p:spPr>
+          <a:xfrm>
+            <a:off x="1779638" y="4689921"/>
+            <a:ext cx="4424609" cy="830997"/>
+          </a:xfrm>
+          <a:prstGeom prst="rect">
+            <a:avLst/>
+          </a:prstGeom>
+          <a:solidFill>
+            <a:schemeClr val="tx1"/>
+          </a:solidFill>
+        </p:spPr>
+        <p:txBody>
+          <a:bodyPr wrap="none" rtlCol="0">
+            <a:spAutoFit/>
+          </a:bodyPr>
+          <a:lstStyle/>
+          <a:p>
+            <a:r>
               <a:rPr lang="en-US" sz="2400" dirty="0">
                 <a:solidFill>
                   <a:schemeClr val="bg1"/>
@@ -12566,7 +13093,19 @@
                 <a:latin typeface="Courier New" panose="02070309020205020404" pitchFamily="49" charset="0"/>
                 <a:cs typeface="Courier New" panose="02070309020205020404" pitchFamily="49" charset="0"/>
               </a:rPr>
-              <a:t>  list</a:t>
+              <a:t>  run  llama3.2</a:t>
+            </a:r>
+          </a:p>
+          <a:p>
+            <a:r>
+              <a:rPr lang="en-US" sz="2400" dirty="0">
+                <a:solidFill>
+                  <a:schemeClr val="bg1"/>
+                </a:solidFill>
+                <a:latin typeface="Courier New" panose="02070309020205020404" pitchFamily="49" charset="0"/>
+                <a:cs typeface="Courier New" panose="02070309020205020404" pitchFamily="49" charset="0"/>
+              </a:rPr>
+              <a:t>&gt;&gt;&gt;</a:t>
             </a:r>
             <a:endParaRPr lang="LID4096" sz="2400" dirty="0">
               <a:solidFill>
@@ -12578,250 +13117,10 @@
           </a:p>
         </p:txBody>
       </p:sp>
-      <p:sp>
-        <p:nvSpPr>
-          <p:cNvPr id="6" name="TextBox 5">
-            <a:extLst>
-              <a:ext uri="{FF2B5EF4-FFF2-40B4-BE49-F238E27FC236}">
-                <a16:creationId xmlns:a16="http://schemas.microsoft.com/office/drawing/2014/main" id="{EB501F3E-D6BB-B95C-D22F-443B10104707}"/>
-              </a:ext>
-            </a:extLst>
-          </p:cNvPr>
-          <p:cNvSpPr txBox="1"/>
-          <p:nvPr/>
-        </p:nvSpPr>
-        <p:spPr>
-          <a:xfrm>
-            <a:off x="1445341" y="3439365"/>
-            <a:ext cx="6184491" cy="461665"/>
-          </a:xfrm>
-          <a:prstGeom prst="rect">
-            <a:avLst/>
-          </a:prstGeom>
-          <a:solidFill>
-            <a:schemeClr val="tx1"/>
-          </a:solidFill>
-        </p:spPr>
-        <p:txBody>
-          <a:bodyPr wrap="square" rtlCol="0">
-            <a:spAutoFit/>
-          </a:bodyPr>
-          <a:lstStyle/>
-          <a:p>
-            <a:r>
-              <a:rPr lang="en-US" sz="2400" dirty="0">
-                <a:solidFill>
-                  <a:schemeClr val="bg1"/>
-                </a:solidFill>
-                <a:latin typeface="Courier New" panose="02070309020205020404" pitchFamily="49" charset="0"/>
-                <a:cs typeface="Courier New" panose="02070309020205020404" pitchFamily="49" charset="0"/>
-              </a:rPr>
-              <a:t>$ </a:t>
-            </a:r>
-            <a:r>
-              <a:rPr lang="en-US" sz="2400" dirty="0" err="1">
-                <a:solidFill>
-                  <a:schemeClr val="bg1"/>
-                </a:solidFill>
-                <a:latin typeface="Courier New" panose="02070309020205020404" pitchFamily="49" charset="0"/>
-                <a:cs typeface="Courier New" panose="02070309020205020404" pitchFamily="49" charset="0"/>
-              </a:rPr>
-              <a:t>ollama</a:t>
-            </a:r>
-            <a:r>
-              <a:rPr lang="en-US" sz="2400" dirty="0">
-                <a:solidFill>
-                  <a:schemeClr val="bg1"/>
-                </a:solidFill>
-                <a:latin typeface="Courier New" panose="02070309020205020404" pitchFamily="49" charset="0"/>
-                <a:cs typeface="Courier New" panose="02070309020205020404" pitchFamily="49" charset="0"/>
-              </a:rPr>
-              <a:t>  pull </a:t>
-            </a:r>
-            <a:r>
-              <a:rPr lang="en-US" sz="2400" dirty="0" err="1">
-                <a:solidFill>
-                  <a:schemeClr val="bg1"/>
-                </a:solidFill>
-                <a:latin typeface="Courier New" panose="02070309020205020404" pitchFamily="49" charset="0"/>
-                <a:cs typeface="Courier New" panose="02070309020205020404" pitchFamily="49" charset="0"/>
-              </a:rPr>
-              <a:t>codellama</a:t>
-            </a:r>
-            <a:endParaRPr lang="LID4096" sz="2400" dirty="0">
-              <a:solidFill>
-                <a:schemeClr val="bg1"/>
-              </a:solidFill>
-              <a:latin typeface="Courier New" panose="02070309020205020404" pitchFamily="49" charset="0"/>
-              <a:cs typeface="Courier New" panose="02070309020205020404" pitchFamily="49" charset="0"/>
-            </a:endParaRPr>
-          </a:p>
-        </p:txBody>
-      </p:sp>
-      <p:sp>
-        <p:nvSpPr>
-          <p:cNvPr id="7" name="TextBox 6">
-            <a:extLst>
-              <a:ext uri="{FF2B5EF4-FFF2-40B4-BE49-F238E27FC236}">
-                <a16:creationId xmlns:a16="http://schemas.microsoft.com/office/drawing/2014/main" id="{5794C266-63A0-229B-7F3E-F67CD06A9009}"/>
-              </a:ext>
-            </a:extLst>
-          </p:cNvPr>
-          <p:cNvSpPr txBox="1"/>
-          <p:nvPr/>
-        </p:nvSpPr>
-        <p:spPr>
-          <a:xfrm>
-            <a:off x="1445341" y="5943983"/>
-            <a:ext cx="6184491" cy="461665"/>
-          </a:xfrm>
-          <a:prstGeom prst="rect">
-            <a:avLst/>
-          </a:prstGeom>
-          <a:solidFill>
-            <a:schemeClr val="tx1"/>
-          </a:solidFill>
-        </p:spPr>
-        <p:txBody>
-          <a:bodyPr wrap="square" rtlCol="0">
-            <a:spAutoFit/>
-          </a:bodyPr>
-          <a:lstStyle/>
-          <a:p>
-            <a:r>
-              <a:rPr lang="en-US" sz="2400" dirty="0">
-                <a:solidFill>
-                  <a:schemeClr val="bg1"/>
-                </a:solidFill>
-                <a:latin typeface="Courier New" panose="02070309020205020404" pitchFamily="49" charset="0"/>
-                <a:cs typeface="Courier New" panose="02070309020205020404" pitchFamily="49" charset="0"/>
-              </a:rPr>
-              <a:t>$ </a:t>
-            </a:r>
-            <a:r>
-              <a:rPr lang="en-US" sz="2400" dirty="0" err="1">
-                <a:solidFill>
-                  <a:schemeClr val="bg1"/>
-                </a:solidFill>
-                <a:latin typeface="Courier New" panose="02070309020205020404" pitchFamily="49" charset="0"/>
-                <a:cs typeface="Courier New" panose="02070309020205020404" pitchFamily="49" charset="0"/>
-              </a:rPr>
-              <a:t>ollama</a:t>
-            </a:r>
-            <a:r>
-              <a:rPr lang="en-US" sz="2400" dirty="0">
-                <a:solidFill>
-                  <a:schemeClr val="bg1"/>
-                </a:solidFill>
-                <a:latin typeface="Courier New" panose="02070309020205020404" pitchFamily="49" charset="0"/>
-                <a:cs typeface="Courier New" panose="02070309020205020404" pitchFamily="49" charset="0"/>
-              </a:rPr>
-              <a:t>  rm </a:t>
-            </a:r>
-            <a:r>
-              <a:rPr lang="en-US" sz="2400" dirty="0" err="1">
-                <a:solidFill>
-                  <a:schemeClr val="bg1"/>
-                </a:solidFill>
-                <a:latin typeface="Courier New" panose="02070309020205020404" pitchFamily="49" charset="0"/>
-                <a:cs typeface="Courier New" panose="02070309020205020404" pitchFamily="49" charset="0"/>
-              </a:rPr>
-              <a:t>codellama</a:t>
-            </a:r>
-            <a:endParaRPr lang="LID4096" sz="2400" dirty="0">
-              <a:solidFill>
-                <a:schemeClr val="bg1"/>
-              </a:solidFill>
-              <a:latin typeface="Courier New" panose="02070309020205020404" pitchFamily="49" charset="0"/>
-              <a:cs typeface="Courier New" panose="02070309020205020404" pitchFamily="49" charset="0"/>
-            </a:endParaRPr>
-          </a:p>
-        </p:txBody>
-      </p:sp>
-      <p:sp>
-        <p:nvSpPr>
-          <p:cNvPr id="9" name="TextBox 8">
-            <a:extLst>
-              <a:ext uri="{FF2B5EF4-FFF2-40B4-BE49-F238E27FC236}">
-                <a16:creationId xmlns:a16="http://schemas.microsoft.com/office/drawing/2014/main" id="{BFEDB41E-2354-0843-B50A-D1E57F405A3B}"/>
-              </a:ext>
-            </a:extLst>
-          </p:cNvPr>
-          <p:cNvSpPr txBox="1"/>
-          <p:nvPr/>
-        </p:nvSpPr>
-        <p:spPr>
-          <a:xfrm>
-            <a:off x="1445340" y="4691674"/>
-            <a:ext cx="6184491" cy="461665"/>
-          </a:xfrm>
-          <a:prstGeom prst="rect">
-            <a:avLst/>
-          </a:prstGeom>
-          <a:solidFill>
-            <a:schemeClr val="tx1"/>
-          </a:solidFill>
-        </p:spPr>
-        <p:txBody>
-          <a:bodyPr wrap="square" rtlCol="0">
-            <a:spAutoFit/>
-          </a:bodyPr>
-          <a:lstStyle/>
-          <a:p>
-            <a:r>
-              <a:rPr lang="en-US" sz="2400" dirty="0">
-                <a:solidFill>
-                  <a:schemeClr val="bg1"/>
-                </a:solidFill>
-                <a:latin typeface="Courier New" panose="02070309020205020404" pitchFamily="49" charset="0"/>
-                <a:cs typeface="Courier New" panose="02070309020205020404" pitchFamily="49" charset="0"/>
-              </a:rPr>
-              <a:t>$ </a:t>
-            </a:r>
-            <a:r>
-              <a:rPr lang="en-US" sz="2400" dirty="0" err="1">
-                <a:solidFill>
-                  <a:schemeClr val="bg1"/>
-                </a:solidFill>
-                <a:latin typeface="Courier New" panose="02070309020205020404" pitchFamily="49" charset="0"/>
-                <a:cs typeface="Courier New" panose="02070309020205020404" pitchFamily="49" charset="0"/>
-              </a:rPr>
-              <a:t>ollama</a:t>
-            </a:r>
-            <a:r>
-              <a:rPr lang="en-US" sz="2400" dirty="0">
-                <a:solidFill>
-                  <a:schemeClr val="bg1"/>
-                </a:solidFill>
-                <a:latin typeface="Courier New" panose="02070309020205020404" pitchFamily="49" charset="0"/>
-                <a:cs typeface="Courier New" panose="02070309020205020404" pitchFamily="49" charset="0"/>
-              </a:rPr>
-              <a:t>  show </a:t>
-            </a:r>
-            <a:r>
-              <a:rPr lang="en-US" sz="2400" dirty="0" err="1">
-                <a:solidFill>
-                  <a:schemeClr val="bg1"/>
-                </a:solidFill>
-                <a:latin typeface="Courier New" panose="02070309020205020404" pitchFamily="49" charset="0"/>
-                <a:cs typeface="Courier New" panose="02070309020205020404" pitchFamily="49" charset="0"/>
-              </a:rPr>
-              <a:t>codellama</a:t>
-            </a:r>
-            <a:endParaRPr lang="LID4096" sz="2400" dirty="0">
-              <a:solidFill>
-                <a:schemeClr val="bg1"/>
-              </a:solidFill>
-              <a:latin typeface="Courier New" panose="02070309020205020404" pitchFamily="49" charset="0"/>
-              <a:cs typeface="Courier New" panose="02070309020205020404" pitchFamily="49" charset="0"/>
-            </a:endParaRPr>
-          </a:p>
-        </p:txBody>
-      </p:sp>
     </p:spTree>
     <p:extLst>
       <p:ext uri="{BB962C8B-B14F-4D97-AF65-F5344CB8AC3E}">
-        <p14:creationId xmlns:p14="http://schemas.microsoft.com/office/powerpoint/2010/main" val="981488399"/>
+        <p14:creationId xmlns:p14="http://schemas.microsoft.com/office/powerpoint/2010/main" val="3447296397"/>
       </p:ext>
     </p:extLst>
   </p:cSld>
@@ -12853,7 +13152,7 @@
           <p:cNvPr id="2" name="Title 1">
             <a:extLst>
               <a:ext uri="{FF2B5EF4-FFF2-40B4-BE49-F238E27FC236}">
-                <a16:creationId xmlns:a16="http://schemas.microsoft.com/office/drawing/2014/main" id="{E37287EB-A12B-9D35-9E03-29D10505A1D0}"/>
+                <a16:creationId xmlns:a16="http://schemas.microsoft.com/office/drawing/2014/main" id="{DDB1FCA8-2989-F35C-4EF0-13094E44E02D}"/>
               </a:ext>
             </a:extLst>
           </p:cNvPr>
@@ -12871,15 +13170,7 @@
           <a:p>
             <a:r>
               <a:rPr lang="en-US" dirty="0"/>
-              <a:t>How to run </a:t>
-            </a:r>
-            <a:r>
-              <a:rPr lang="en-US" dirty="0" err="1"/>
-              <a:t>Ollama</a:t>
-            </a:r>
-            <a:r>
-              <a:rPr lang="en-US" dirty="0"/>
-              <a:t> models</a:t>
+              <a:t>How to manage models</a:t>
             </a:r>
             <a:endParaRPr lang="LID4096" dirty="0"/>
           </a:p>
@@ -12890,7 +13181,7 @@
           <p:cNvPr id="3" name="Content Placeholder 2">
             <a:extLst>
               <a:ext uri="{FF2B5EF4-FFF2-40B4-BE49-F238E27FC236}">
-                <a16:creationId xmlns:a16="http://schemas.microsoft.com/office/drawing/2014/main" id="{74330967-A59B-BDE0-C11C-9C1C8B5FB916}"/>
+                <a16:creationId xmlns:a16="http://schemas.microsoft.com/office/drawing/2014/main" id="{B46BAE5A-671C-7525-5A0C-BAD6499EC12F}"/>
               </a:ext>
             </a:extLst>
           </p:cNvPr>
@@ -12903,56 +13194,93 @@
         </p:nvSpPr>
         <p:spPr/>
         <p:txBody>
-          <a:bodyPr/>
+          <a:bodyPr>
+            <a:normAutofit fontScale="92500" lnSpcReduction="20000"/>
+          </a:bodyPr>
           <a:lstStyle/>
           <a:p>
             <a:r>
               <a:rPr lang="en-US" dirty="0"/>
-              <a:t>Start a model, e.g., </a:t>
-            </a:r>
-            <a:r>
-              <a:rPr lang="en-US" dirty="0">
+              <a:t>List installed models</a:t>
+            </a:r>
+          </a:p>
+          <a:p>
+            <a:endParaRPr lang="en-US" dirty="0"/>
+          </a:p>
+          <a:p>
+            <a:endParaRPr lang="en-US" dirty="0"/>
+          </a:p>
+          <a:p>
+            <a:r>
+              <a:rPr lang="en-US" dirty="0"/>
+              <a:t>Install model, e.g., </a:t>
+            </a:r>
+            <a:r>
+              <a:rPr lang="en-US" dirty="0" err="1">
                 <a:latin typeface="Courier New" panose="02070309020205020404" pitchFamily="49" charset="0"/>
                 <a:cs typeface="Courier New" panose="02070309020205020404" pitchFamily="49" charset="0"/>
               </a:rPr>
-              <a:t>llama3.2</a:t>
-            </a:r>
-          </a:p>
-          <a:p>
-            <a:endParaRPr lang="en-US" dirty="0"/>
-          </a:p>
-          <a:p>
-            <a:endParaRPr lang="en-US" dirty="0"/>
-          </a:p>
-          <a:p>
-            <a:r>
-              <a:rPr lang="en-US" dirty="0"/>
-              <a:t>List all running models</a:t>
-            </a:r>
-          </a:p>
-          <a:p>
-            <a:endParaRPr lang="en-US" dirty="0"/>
-          </a:p>
-          <a:p>
-            <a:endParaRPr lang="en-US" dirty="0"/>
-          </a:p>
-          <a:p>
-            <a:r>
-              <a:rPr lang="en-US" dirty="0"/>
-              <a:t>Stop a running model, e.g., </a:t>
-            </a:r>
+              <a:t>codellama</a:t>
+            </a:r>
+            <a:endParaRPr lang="en-US" dirty="0">
+              <a:latin typeface="Courier New" panose="02070309020205020404" pitchFamily="49" charset="0"/>
+              <a:cs typeface="Courier New" panose="02070309020205020404" pitchFamily="49" charset="0"/>
+            </a:endParaRPr>
+          </a:p>
+          <a:p>
+            <a:endParaRPr lang="en-US" dirty="0">
+              <a:latin typeface="Courier New" panose="02070309020205020404" pitchFamily="49" charset="0"/>
+              <a:cs typeface="Courier New" panose="02070309020205020404" pitchFamily="49" charset="0"/>
+            </a:endParaRPr>
+          </a:p>
+          <a:p>
+            <a:endParaRPr lang="en-US" dirty="0">
+              <a:latin typeface="Courier New" panose="02070309020205020404" pitchFamily="49" charset="0"/>
+              <a:cs typeface="Courier New" panose="02070309020205020404" pitchFamily="49" charset="0"/>
+            </a:endParaRPr>
+          </a:p>
+          <a:p>
             <a:r>
               <a:rPr lang="en-US" dirty="0">
+                <a:cs typeface="Courier New" panose="02070309020205020404" pitchFamily="49" charset="0"/>
+              </a:rPr>
+              <a:t>Show information about model, e.g., </a:t>
+            </a:r>
+            <a:r>
+              <a:rPr lang="en-US" dirty="0" err="1">
                 <a:latin typeface="Courier New" panose="02070309020205020404" pitchFamily="49" charset="0"/>
                 <a:cs typeface="Courier New" panose="02070309020205020404" pitchFamily="49" charset="0"/>
               </a:rPr>
-              <a:t>llama3.2</a:t>
-            </a:r>
-            <a:endParaRPr lang="LID4096" dirty="0">
+              <a:t>codellama</a:t>
+            </a:r>
+            <a:endParaRPr lang="en-US" dirty="0">
               <a:latin typeface="Courier New" panose="02070309020205020404" pitchFamily="49" charset="0"/>
               <a:cs typeface="Courier New" panose="02070309020205020404" pitchFamily="49" charset="0"/>
             </a:endParaRPr>
           </a:p>
+          <a:p>
+            <a:endParaRPr lang="en-US" dirty="0"/>
+          </a:p>
+          <a:p>
+            <a:endParaRPr lang="en-US" dirty="0"/>
+          </a:p>
+          <a:p>
+            <a:r>
+              <a:rPr lang="en-US" dirty="0"/>
+              <a:t>Remove model, e.g., </a:t>
+            </a:r>
+            <a:r>
+              <a:rPr lang="en-US" dirty="0" err="1">
+                <a:latin typeface="Courier New" panose="02070309020205020404" pitchFamily="49" charset="0"/>
+                <a:cs typeface="Courier New" panose="02070309020205020404" pitchFamily="49" charset="0"/>
+              </a:rPr>
+              <a:t>codellama</a:t>
+            </a:r>
+            <a:endParaRPr lang="en-US" dirty="0">
+              <a:latin typeface="Courier New" panose="02070309020205020404" pitchFamily="49" charset="0"/>
+              <a:cs typeface="Courier New" panose="02070309020205020404" pitchFamily="49" charset="0"/>
+            </a:endParaRPr>
+          </a:p>
         </p:txBody>
       </p:sp>
       <p:sp>
@@ -12960,7 +13288,7 @@
           <p:cNvPr id="4" name="Slide Number Placeholder 3">
             <a:extLst>
               <a:ext uri="{FF2B5EF4-FFF2-40B4-BE49-F238E27FC236}">
-                <a16:creationId xmlns:a16="http://schemas.microsoft.com/office/drawing/2014/main" id="{F406012A-D403-B12A-EACB-BCE41268CC63}"/>
+                <a16:creationId xmlns:a16="http://schemas.microsoft.com/office/drawing/2014/main" id="{B2465C57-3677-7E21-76E0-DEAEE4B9E5A3}"/>
               </a:ext>
             </a:extLst>
           </p:cNvPr>
@@ -12989,7 +13317,7 @@
           <p:cNvPr id="5" name="TextBox 4">
             <a:extLst>
               <a:ext uri="{FF2B5EF4-FFF2-40B4-BE49-F238E27FC236}">
-                <a16:creationId xmlns:a16="http://schemas.microsoft.com/office/drawing/2014/main" id="{1B09A0E3-CBA8-F40D-EE13-E8970D98FE93}"/>
+                <a16:creationId xmlns:a16="http://schemas.microsoft.com/office/drawing/2014/main" id="{E689A2F1-DD2D-A183-7915-E91C3C1A6B5B}"/>
               </a:ext>
             </a:extLst>
           </p:cNvPr>
@@ -12998,7 +13326,7 @@
         </p:nvSpPr>
         <p:spPr>
           <a:xfrm>
-            <a:off x="1445341" y="2482581"/>
+            <a:off x="1445341" y="2266272"/>
             <a:ext cx="6184491" cy="461665"/>
           </a:xfrm>
           <a:prstGeom prst="rect">
@@ -13042,7 +13370,7 @@
                 <a:latin typeface="Courier New" panose="02070309020205020404" pitchFamily="49" charset="0"/>
                 <a:cs typeface="Courier New" panose="02070309020205020404" pitchFamily="49" charset="0"/>
               </a:rPr>
-              <a:t>  run llama3.2</a:t>
+              <a:t>  list</a:t>
             </a:r>
             <a:endParaRPr lang="LID4096" sz="2400" dirty="0">
               <a:solidFill>
@@ -13059,7 +13387,7 @@
           <p:cNvPr id="6" name="TextBox 5">
             <a:extLst>
               <a:ext uri="{FF2B5EF4-FFF2-40B4-BE49-F238E27FC236}">
-                <a16:creationId xmlns:a16="http://schemas.microsoft.com/office/drawing/2014/main" id="{C39C9BB0-93DB-0F2C-82F8-C726008345A7}"/>
+                <a16:creationId xmlns:a16="http://schemas.microsoft.com/office/drawing/2014/main" id="{EB501F3E-D6BB-B95C-D22F-443B10104707}"/>
               </a:ext>
             </a:extLst>
           </p:cNvPr>
@@ -13068,7 +13396,7 @@
         </p:nvSpPr>
         <p:spPr>
           <a:xfrm>
-            <a:off x="1445340" y="3913755"/>
+            <a:off x="1445341" y="3439365"/>
             <a:ext cx="6184491" cy="461665"/>
           </a:xfrm>
           <a:prstGeom prst="rect">
@@ -13112,7 +13440,7 @@
                 <a:latin typeface="Courier New" panose="02070309020205020404" pitchFamily="49" charset="0"/>
                 <a:cs typeface="Courier New" panose="02070309020205020404" pitchFamily="49" charset="0"/>
               </a:rPr>
-              <a:t>  </a:t>
+              <a:t>  pull </a:t>
             </a:r>
             <a:r>
               <a:rPr lang="en-US" sz="2400" dirty="0" err="1">
@@ -13122,7 +13450,7 @@
                 <a:latin typeface="Courier New" panose="02070309020205020404" pitchFamily="49" charset="0"/>
                 <a:cs typeface="Courier New" panose="02070309020205020404" pitchFamily="49" charset="0"/>
               </a:rPr>
-              <a:t>ps</a:t>
+              <a:t>codellama</a:t>
             </a:r>
             <a:endParaRPr lang="LID4096" sz="2400" dirty="0">
               <a:solidFill>
@@ -13139,7 +13467,7 @@
           <p:cNvPr id="7" name="TextBox 6">
             <a:extLst>
               <a:ext uri="{FF2B5EF4-FFF2-40B4-BE49-F238E27FC236}">
-                <a16:creationId xmlns:a16="http://schemas.microsoft.com/office/drawing/2014/main" id="{80623597-EF3B-AE74-F8B3-CD9CD99D1CE9}"/>
+                <a16:creationId xmlns:a16="http://schemas.microsoft.com/office/drawing/2014/main" id="{5794C266-63A0-229B-7F3E-F67CD06A9009}"/>
               </a:ext>
             </a:extLst>
           </p:cNvPr>
@@ -13148,7 +13476,7 @@
         </p:nvSpPr>
         <p:spPr>
           <a:xfrm>
-            <a:off x="1445339" y="5574159"/>
+            <a:off x="1445341" y="5943983"/>
             <a:ext cx="6184491" cy="461665"/>
           </a:xfrm>
           <a:prstGeom prst="rect">
@@ -13192,7 +13520,17 @@
                 <a:latin typeface="Courier New" panose="02070309020205020404" pitchFamily="49" charset="0"/>
                 <a:cs typeface="Courier New" panose="02070309020205020404" pitchFamily="49" charset="0"/>
               </a:rPr>
-              <a:t>  stop llama3.2</a:t>
+              <a:t>  rm </a:t>
+            </a:r>
+            <a:r>
+              <a:rPr lang="en-US" sz="2400" dirty="0" err="1">
+                <a:solidFill>
+                  <a:schemeClr val="bg1"/>
+                </a:solidFill>
+                <a:latin typeface="Courier New" panose="02070309020205020404" pitchFamily="49" charset="0"/>
+                <a:cs typeface="Courier New" panose="02070309020205020404" pitchFamily="49" charset="0"/>
+              </a:rPr>
+              <a:t>codellama</a:t>
             </a:r>
             <a:endParaRPr lang="LID4096" sz="2400" dirty="0">
               <a:solidFill>
@@ -13204,10 +13542,90 @@
           </a:p>
         </p:txBody>
       </p:sp>
+      <p:sp>
+        <p:nvSpPr>
+          <p:cNvPr id="9" name="TextBox 8">
+            <a:extLst>
+              <a:ext uri="{FF2B5EF4-FFF2-40B4-BE49-F238E27FC236}">
+                <a16:creationId xmlns:a16="http://schemas.microsoft.com/office/drawing/2014/main" id="{BFEDB41E-2354-0843-B50A-D1E57F405A3B}"/>
+              </a:ext>
+            </a:extLst>
+          </p:cNvPr>
+          <p:cNvSpPr txBox="1"/>
+          <p:nvPr/>
+        </p:nvSpPr>
+        <p:spPr>
+          <a:xfrm>
+            <a:off x="1445340" y="4691674"/>
+            <a:ext cx="6184491" cy="461665"/>
+          </a:xfrm>
+          <a:prstGeom prst="rect">
+            <a:avLst/>
+          </a:prstGeom>
+          <a:solidFill>
+            <a:schemeClr val="tx1"/>
+          </a:solidFill>
+        </p:spPr>
+        <p:txBody>
+          <a:bodyPr wrap="square" rtlCol="0">
+            <a:spAutoFit/>
+          </a:bodyPr>
+          <a:lstStyle/>
+          <a:p>
+            <a:r>
+              <a:rPr lang="en-US" sz="2400" dirty="0">
+                <a:solidFill>
+                  <a:schemeClr val="bg1"/>
+                </a:solidFill>
+                <a:latin typeface="Courier New" panose="02070309020205020404" pitchFamily="49" charset="0"/>
+                <a:cs typeface="Courier New" panose="02070309020205020404" pitchFamily="49" charset="0"/>
+              </a:rPr>
+              <a:t>$ </a:t>
+            </a:r>
+            <a:r>
+              <a:rPr lang="en-US" sz="2400" dirty="0" err="1">
+                <a:solidFill>
+                  <a:schemeClr val="bg1"/>
+                </a:solidFill>
+                <a:latin typeface="Courier New" panose="02070309020205020404" pitchFamily="49" charset="0"/>
+                <a:cs typeface="Courier New" panose="02070309020205020404" pitchFamily="49" charset="0"/>
+              </a:rPr>
+              <a:t>ollama</a:t>
+            </a:r>
+            <a:r>
+              <a:rPr lang="en-US" sz="2400" dirty="0">
+                <a:solidFill>
+                  <a:schemeClr val="bg1"/>
+                </a:solidFill>
+                <a:latin typeface="Courier New" panose="02070309020205020404" pitchFamily="49" charset="0"/>
+                <a:cs typeface="Courier New" panose="02070309020205020404" pitchFamily="49" charset="0"/>
+              </a:rPr>
+              <a:t>  show </a:t>
+            </a:r>
+            <a:r>
+              <a:rPr lang="en-US" sz="2400" dirty="0" err="1">
+                <a:solidFill>
+                  <a:schemeClr val="bg1"/>
+                </a:solidFill>
+                <a:latin typeface="Courier New" panose="02070309020205020404" pitchFamily="49" charset="0"/>
+                <a:cs typeface="Courier New" panose="02070309020205020404" pitchFamily="49" charset="0"/>
+              </a:rPr>
+              <a:t>codellama</a:t>
+            </a:r>
+            <a:endParaRPr lang="LID4096" sz="2400" dirty="0">
+              <a:solidFill>
+                <a:schemeClr val="bg1"/>
+              </a:solidFill>
+              <a:latin typeface="Courier New" panose="02070309020205020404" pitchFamily="49" charset="0"/>
+              <a:cs typeface="Courier New" panose="02070309020205020404" pitchFamily="49" charset="0"/>
+            </a:endParaRPr>
+          </a:p>
+        </p:txBody>
+      </p:sp>
     </p:spTree>
     <p:extLst>
       <p:ext uri="{BB962C8B-B14F-4D97-AF65-F5344CB8AC3E}">
-        <p14:creationId xmlns:p14="http://schemas.microsoft.com/office/powerpoint/2010/main" val="2210719273"/>
+        <p14:creationId xmlns:p14="http://schemas.microsoft.com/office/powerpoint/2010/main" val="981488399"/>
       </p:ext>
     </p:extLst>
   </p:cSld>
@@ -13239,6 +13657,970 @@
           <p:cNvPr id="2" name="Title 1">
             <a:extLst>
               <a:ext uri="{FF2B5EF4-FFF2-40B4-BE49-F238E27FC236}">
+                <a16:creationId xmlns:a16="http://schemas.microsoft.com/office/drawing/2014/main" id="{E37287EB-A12B-9D35-9E03-29D10505A1D0}"/>
+              </a:ext>
+            </a:extLst>
+          </p:cNvPr>
+          <p:cNvSpPr>
+            <a:spLocks noGrp="1"/>
+          </p:cNvSpPr>
+          <p:nvPr>
+            <p:ph type="title"/>
+          </p:nvPr>
+        </p:nvSpPr>
+        <p:spPr/>
+        <p:txBody>
+          <a:bodyPr/>
+          <a:lstStyle/>
+          <a:p>
+            <a:r>
+              <a:rPr lang="en-US" dirty="0"/>
+              <a:t>How to run </a:t>
+            </a:r>
+            <a:r>
+              <a:rPr lang="en-US" dirty="0" err="1"/>
+              <a:t>Ollama</a:t>
+            </a:r>
+            <a:r>
+              <a:rPr lang="en-US" dirty="0"/>
+              <a:t> models</a:t>
+            </a:r>
+            <a:endParaRPr lang="LID4096" dirty="0"/>
+          </a:p>
+        </p:txBody>
+      </p:sp>
+      <p:sp>
+        <p:nvSpPr>
+          <p:cNvPr id="3" name="Content Placeholder 2">
+            <a:extLst>
+              <a:ext uri="{FF2B5EF4-FFF2-40B4-BE49-F238E27FC236}">
+                <a16:creationId xmlns:a16="http://schemas.microsoft.com/office/drawing/2014/main" id="{74330967-A59B-BDE0-C11C-9C1C8B5FB916}"/>
+              </a:ext>
+            </a:extLst>
+          </p:cNvPr>
+          <p:cNvSpPr>
+            <a:spLocks noGrp="1"/>
+          </p:cNvSpPr>
+          <p:nvPr>
+            <p:ph idx="1"/>
+          </p:nvPr>
+        </p:nvSpPr>
+        <p:spPr/>
+        <p:txBody>
+          <a:bodyPr/>
+          <a:lstStyle/>
+          <a:p>
+            <a:r>
+              <a:rPr lang="en-US" dirty="0"/>
+              <a:t>Start a model, e.g., </a:t>
+            </a:r>
+            <a:r>
+              <a:rPr lang="en-US" dirty="0">
+                <a:latin typeface="Courier New" panose="02070309020205020404" pitchFamily="49" charset="0"/>
+                <a:cs typeface="Courier New" panose="02070309020205020404" pitchFamily="49" charset="0"/>
+              </a:rPr>
+              <a:t>llama3.2</a:t>
+            </a:r>
+          </a:p>
+          <a:p>
+            <a:endParaRPr lang="en-US" dirty="0"/>
+          </a:p>
+          <a:p>
+            <a:endParaRPr lang="en-US" dirty="0"/>
+          </a:p>
+          <a:p>
+            <a:r>
+              <a:rPr lang="en-US" dirty="0"/>
+              <a:t>List all running models</a:t>
+            </a:r>
+          </a:p>
+          <a:p>
+            <a:endParaRPr lang="en-US" dirty="0"/>
+          </a:p>
+          <a:p>
+            <a:endParaRPr lang="en-US" dirty="0"/>
+          </a:p>
+          <a:p>
+            <a:r>
+              <a:rPr lang="en-US" dirty="0"/>
+              <a:t>Stop a running model, e.g., </a:t>
+            </a:r>
+            <a:r>
+              <a:rPr lang="en-US" dirty="0">
+                <a:latin typeface="Courier New" panose="02070309020205020404" pitchFamily="49" charset="0"/>
+                <a:cs typeface="Courier New" panose="02070309020205020404" pitchFamily="49" charset="0"/>
+              </a:rPr>
+              <a:t>llama3.2</a:t>
+            </a:r>
+            <a:endParaRPr lang="LID4096" dirty="0">
+              <a:latin typeface="Courier New" panose="02070309020205020404" pitchFamily="49" charset="0"/>
+              <a:cs typeface="Courier New" panose="02070309020205020404" pitchFamily="49" charset="0"/>
+            </a:endParaRPr>
+          </a:p>
+        </p:txBody>
+      </p:sp>
+      <p:sp>
+        <p:nvSpPr>
+          <p:cNvPr id="4" name="Slide Number Placeholder 3">
+            <a:extLst>
+              <a:ext uri="{FF2B5EF4-FFF2-40B4-BE49-F238E27FC236}">
+                <a16:creationId xmlns:a16="http://schemas.microsoft.com/office/drawing/2014/main" id="{F406012A-D403-B12A-EACB-BCE41268CC63}"/>
+              </a:ext>
+            </a:extLst>
+          </p:cNvPr>
+          <p:cNvSpPr>
+            <a:spLocks noGrp="1"/>
+          </p:cNvSpPr>
+          <p:nvPr>
+            <p:ph type="sldNum" sz="quarter" idx="12"/>
+          </p:nvPr>
+        </p:nvSpPr>
+        <p:spPr/>
+        <p:txBody>
+          <a:bodyPr/>
+          <a:lstStyle/>
+          <a:p>
+            <a:fld id="{6A9C7FA6-5826-4EA5-8536-11A903012ABC}" type="slidenum">
+              <a:rPr lang="LID4096" smtClean="0"/>
+              <a:t>22</a:t>
+            </a:fld>
+            <a:endParaRPr lang="LID4096"/>
+          </a:p>
+        </p:txBody>
+      </p:sp>
+      <p:sp>
+        <p:nvSpPr>
+          <p:cNvPr id="5" name="TextBox 4">
+            <a:extLst>
+              <a:ext uri="{FF2B5EF4-FFF2-40B4-BE49-F238E27FC236}">
+                <a16:creationId xmlns:a16="http://schemas.microsoft.com/office/drawing/2014/main" id="{1B09A0E3-CBA8-F40D-EE13-E8970D98FE93}"/>
+              </a:ext>
+            </a:extLst>
+          </p:cNvPr>
+          <p:cNvSpPr txBox="1"/>
+          <p:nvPr/>
+        </p:nvSpPr>
+        <p:spPr>
+          <a:xfrm>
+            <a:off x="1445341" y="2482581"/>
+            <a:ext cx="6184491" cy="461665"/>
+          </a:xfrm>
+          <a:prstGeom prst="rect">
+            <a:avLst/>
+          </a:prstGeom>
+          <a:solidFill>
+            <a:schemeClr val="tx1"/>
+          </a:solidFill>
+        </p:spPr>
+        <p:txBody>
+          <a:bodyPr wrap="square" rtlCol="0">
+            <a:spAutoFit/>
+          </a:bodyPr>
+          <a:lstStyle/>
+          <a:p>
+            <a:r>
+              <a:rPr lang="en-US" sz="2400" dirty="0">
+                <a:solidFill>
+                  <a:schemeClr val="bg1"/>
+                </a:solidFill>
+                <a:latin typeface="Courier New" panose="02070309020205020404" pitchFamily="49" charset="0"/>
+                <a:cs typeface="Courier New" panose="02070309020205020404" pitchFamily="49" charset="0"/>
+              </a:rPr>
+              <a:t>$ </a:t>
+            </a:r>
+            <a:r>
+              <a:rPr lang="en-US" sz="2400" dirty="0" err="1">
+                <a:solidFill>
+                  <a:schemeClr val="bg1"/>
+                </a:solidFill>
+                <a:latin typeface="Courier New" panose="02070309020205020404" pitchFamily="49" charset="0"/>
+                <a:cs typeface="Courier New" panose="02070309020205020404" pitchFamily="49" charset="0"/>
+              </a:rPr>
+              <a:t>ollama</a:t>
+            </a:r>
+            <a:r>
+              <a:rPr lang="en-US" sz="2400" dirty="0">
+                <a:solidFill>
+                  <a:schemeClr val="bg1"/>
+                </a:solidFill>
+                <a:latin typeface="Courier New" panose="02070309020205020404" pitchFamily="49" charset="0"/>
+                <a:cs typeface="Courier New" panose="02070309020205020404" pitchFamily="49" charset="0"/>
+              </a:rPr>
+              <a:t>  run llama3.2</a:t>
+            </a:r>
+            <a:endParaRPr lang="LID4096" sz="2400" dirty="0">
+              <a:solidFill>
+                <a:schemeClr val="bg1"/>
+              </a:solidFill>
+              <a:latin typeface="Courier New" panose="02070309020205020404" pitchFamily="49" charset="0"/>
+              <a:cs typeface="Courier New" panose="02070309020205020404" pitchFamily="49" charset="0"/>
+            </a:endParaRPr>
+          </a:p>
+        </p:txBody>
+      </p:sp>
+      <p:sp>
+        <p:nvSpPr>
+          <p:cNvPr id="6" name="TextBox 5">
+            <a:extLst>
+              <a:ext uri="{FF2B5EF4-FFF2-40B4-BE49-F238E27FC236}">
+                <a16:creationId xmlns:a16="http://schemas.microsoft.com/office/drawing/2014/main" id="{C39C9BB0-93DB-0F2C-82F8-C726008345A7}"/>
+              </a:ext>
+            </a:extLst>
+          </p:cNvPr>
+          <p:cNvSpPr txBox="1"/>
+          <p:nvPr/>
+        </p:nvSpPr>
+        <p:spPr>
+          <a:xfrm>
+            <a:off x="1445340" y="3913755"/>
+            <a:ext cx="6184491" cy="461665"/>
+          </a:xfrm>
+          <a:prstGeom prst="rect">
+            <a:avLst/>
+          </a:prstGeom>
+          <a:solidFill>
+            <a:schemeClr val="tx1"/>
+          </a:solidFill>
+        </p:spPr>
+        <p:txBody>
+          <a:bodyPr wrap="square" rtlCol="0">
+            <a:spAutoFit/>
+          </a:bodyPr>
+          <a:lstStyle/>
+          <a:p>
+            <a:r>
+              <a:rPr lang="en-US" sz="2400" dirty="0">
+                <a:solidFill>
+                  <a:schemeClr val="bg1"/>
+                </a:solidFill>
+                <a:latin typeface="Courier New" panose="02070309020205020404" pitchFamily="49" charset="0"/>
+                <a:cs typeface="Courier New" panose="02070309020205020404" pitchFamily="49" charset="0"/>
+              </a:rPr>
+              <a:t>$ </a:t>
+            </a:r>
+            <a:r>
+              <a:rPr lang="en-US" sz="2400" dirty="0" err="1">
+                <a:solidFill>
+                  <a:schemeClr val="bg1"/>
+                </a:solidFill>
+                <a:latin typeface="Courier New" panose="02070309020205020404" pitchFamily="49" charset="0"/>
+                <a:cs typeface="Courier New" panose="02070309020205020404" pitchFamily="49" charset="0"/>
+              </a:rPr>
+              <a:t>ollama</a:t>
+            </a:r>
+            <a:r>
+              <a:rPr lang="en-US" sz="2400" dirty="0">
+                <a:solidFill>
+                  <a:schemeClr val="bg1"/>
+                </a:solidFill>
+                <a:latin typeface="Courier New" panose="02070309020205020404" pitchFamily="49" charset="0"/>
+                <a:cs typeface="Courier New" panose="02070309020205020404" pitchFamily="49" charset="0"/>
+              </a:rPr>
+              <a:t>  </a:t>
+            </a:r>
+            <a:r>
+              <a:rPr lang="en-US" sz="2400" dirty="0" err="1">
+                <a:solidFill>
+                  <a:schemeClr val="bg1"/>
+                </a:solidFill>
+                <a:latin typeface="Courier New" panose="02070309020205020404" pitchFamily="49" charset="0"/>
+                <a:cs typeface="Courier New" panose="02070309020205020404" pitchFamily="49" charset="0"/>
+              </a:rPr>
+              <a:t>ps</a:t>
+            </a:r>
+            <a:endParaRPr lang="LID4096" sz="2400" dirty="0">
+              <a:solidFill>
+                <a:schemeClr val="bg1"/>
+              </a:solidFill>
+              <a:latin typeface="Courier New" panose="02070309020205020404" pitchFamily="49" charset="0"/>
+              <a:cs typeface="Courier New" panose="02070309020205020404" pitchFamily="49" charset="0"/>
+            </a:endParaRPr>
+          </a:p>
+        </p:txBody>
+      </p:sp>
+      <p:sp>
+        <p:nvSpPr>
+          <p:cNvPr id="7" name="TextBox 6">
+            <a:extLst>
+              <a:ext uri="{FF2B5EF4-FFF2-40B4-BE49-F238E27FC236}">
+                <a16:creationId xmlns:a16="http://schemas.microsoft.com/office/drawing/2014/main" id="{80623597-EF3B-AE74-F8B3-CD9CD99D1CE9}"/>
+              </a:ext>
+            </a:extLst>
+          </p:cNvPr>
+          <p:cNvSpPr txBox="1"/>
+          <p:nvPr/>
+        </p:nvSpPr>
+        <p:spPr>
+          <a:xfrm>
+            <a:off x="1445339" y="5574159"/>
+            <a:ext cx="6184491" cy="461665"/>
+          </a:xfrm>
+          <a:prstGeom prst="rect">
+            <a:avLst/>
+          </a:prstGeom>
+          <a:solidFill>
+            <a:schemeClr val="tx1"/>
+          </a:solidFill>
+        </p:spPr>
+        <p:txBody>
+          <a:bodyPr wrap="square" rtlCol="0">
+            <a:spAutoFit/>
+          </a:bodyPr>
+          <a:lstStyle/>
+          <a:p>
+            <a:r>
+              <a:rPr lang="en-US" sz="2400" dirty="0">
+                <a:solidFill>
+                  <a:schemeClr val="bg1"/>
+                </a:solidFill>
+                <a:latin typeface="Courier New" panose="02070309020205020404" pitchFamily="49" charset="0"/>
+                <a:cs typeface="Courier New" panose="02070309020205020404" pitchFamily="49" charset="0"/>
+              </a:rPr>
+              <a:t>$ </a:t>
+            </a:r>
+            <a:r>
+              <a:rPr lang="en-US" sz="2400" dirty="0" err="1">
+                <a:solidFill>
+                  <a:schemeClr val="bg1"/>
+                </a:solidFill>
+                <a:latin typeface="Courier New" panose="02070309020205020404" pitchFamily="49" charset="0"/>
+                <a:cs typeface="Courier New" panose="02070309020205020404" pitchFamily="49" charset="0"/>
+              </a:rPr>
+              <a:t>ollama</a:t>
+            </a:r>
+            <a:r>
+              <a:rPr lang="en-US" sz="2400" dirty="0">
+                <a:solidFill>
+                  <a:schemeClr val="bg1"/>
+                </a:solidFill>
+                <a:latin typeface="Courier New" panose="02070309020205020404" pitchFamily="49" charset="0"/>
+                <a:cs typeface="Courier New" panose="02070309020205020404" pitchFamily="49" charset="0"/>
+              </a:rPr>
+              <a:t>  stop llama3.2</a:t>
+            </a:r>
+            <a:endParaRPr lang="LID4096" sz="2400" dirty="0">
+              <a:solidFill>
+                <a:schemeClr val="bg1"/>
+              </a:solidFill>
+              <a:latin typeface="Courier New" panose="02070309020205020404" pitchFamily="49" charset="0"/>
+              <a:cs typeface="Courier New" panose="02070309020205020404" pitchFamily="49" charset="0"/>
+            </a:endParaRPr>
+          </a:p>
+        </p:txBody>
+      </p:sp>
+    </p:spTree>
+    <p:extLst>
+      <p:ext uri="{BB962C8B-B14F-4D97-AF65-F5344CB8AC3E}">
+        <p14:creationId xmlns:p14="http://schemas.microsoft.com/office/powerpoint/2010/main" val="2210719273"/>
+      </p:ext>
+    </p:extLst>
+  </p:cSld>
+  <p:clrMapOvr>
+    <a:masterClrMapping/>
+  </p:clrMapOvr>
+</p:sld>
+</file>
+
+<file path=ppt/slides/slide23.xml><?xml version="1.0" encoding="utf-8"?>
+<p:sld xmlns:a="http://schemas.openxmlformats.org/drawingml/2006/main" xmlns:r="http://schemas.openxmlformats.org/officeDocument/2006/relationships" xmlns:p="http://schemas.openxmlformats.org/presentationml/2006/main">
+  <p:cSld>
+    <p:spTree>
+      <p:nvGrpSpPr>
+        <p:cNvPr id="1" name=""/>
+        <p:cNvGrpSpPr/>
+        <p:nvPr/>
+      </p:nvGrpSpPr>
+      <p:grpSpPr>
+        <a:xfrm>
+          <a:off x="0" y="0"/>
+          <a:ext cx="0" cy="0"/>
+          <a:chOff x="0" y="0"/>
+          <a:chExt cx="0" cy="0"/>
+        </a:xfrm>
+      </p:grpSpPr>
+      <p:sp>
+        <p:nvSpPr>
+          <p:cNvPr id="2" name="Title 1">
+            <a:extLst>
+              <a:ext uri="{FF2B5EF4-FFF2-40B4-BE49-F238E27FC236}">
+                <a16:creationId xmlns:a16="http://schemas.microsoft.com/office/drawing/2014/main" id="{4127518B-CE16-748D-6AFE-7B4476EA287A}"/>
+              </a:ext>
+            </a:extLst>
+          </p:cNvPr>
+          <p:cNvSpPr>
+            <a:spLocks noGrp="1"/>
+          </p:cNvSpPr>
+          <p:nvPr>
+            <p:ph type="title"/>
+          </p:nvPr>
+        </p:nvSpPr>
+        <p:spPr/>
+        <p:txBody>
+          <a:bodyPr/>
+          <a:lstStyle/>
+          <a:p>
+            <a:r>
+              <a:rPr lang="en-US" dirty="0"/>
+              <a:t>Don't byte of more than you can chew</a:t>
+            </a:r>
+            <a:endParaRPr lang="LID4096" dirty="0"/>
+          </a:p>
+        </p:txBody>
+      </p:sp>
+      <p:graphicFrame>
+        <p:nvGraphicFramePr>
+          <p:cNvPr id="5" name="Content Placeholder 4">
+            <a:extLst>
+              <a:ext uri="{FF2B5EF4-FFF2-40B4-BE49-F238E27FC236}">
+                <a16:creationId xmlns:a16="http://schemas.microsoft.com/office/drawing/2014/main" id="{6E404C90-1234-CD42-AE77-6323AFFF508F}"/>
+              </a:ext>
+            </a:extLst>
+          </p:cNvPr>
+          <p:cNvGraphicFramePr>
+            <a:graphicFrameLocks noGrp="1"/>
+          </p:cNvGraphicFramePr>
+          <p:nvPr>
+            <p:ph idx="1"/>
+            <p:extLst>
+              <p:ext uri="{D42A27DB-BD31-4B8C-83A1-F6EECF244321}">
+                <p14:modId xmlns:p14="http://schemas.microsoft.com/office/powerpoint/2010/main" val="1454034636"/>
+              </p:ext>
+            </p:extLst>
+          </p:nvPr>
+        </p:nvGraphicFramePr>
+        <p:xfrm>
+          <a:off x="838200" y="1825625"/>
+          <a:ext cx="10515600" cy="2225040"/>
+        </p:xfrm>
+        <a:graphic>
+          <a:graphicData uri="http://schemas.openxmlformats.org/drawingml/2006/table">
+            <a:tbl>
+              <a:tblPr firstRow="1" bandRow="1">
+                <a:tableStyleId>{5C22544A-7EE6-4342-B048-85BDC9FD1C3A}</a:tableStyleId>
+              </a:tblPr>
+              <a:tblGrid>
+                <a:gridCol w="2628900">
+                  <a:extLst>
+                    <a:ext uri="{9D8B030D-6E8A-4147-A177-3AD203B41FA5}">
+                      <a16:colId xmlns:a16="http://schemas.microsoft.com/office/drawing/2014/main" val="1878342620"/>
+                    </a:ext>
+                  </a:extLst>
+                </a:gridCol>
+                <a:gridCol w="2628900">
+                  <a:extLst>
+                    <a:ext uri="{9D8B030D-6E8A-4147-A177-3AD203B41FA5}">
+                      <a16:colId xmlns:a16="http://schemas.microsoft.com/office/drawing/2014/main" val="1427867823"/>
+                    </a:ext>
+                  </a:extLst>
+                </a:gridCol>
+                <a:gridCol w="2628900">
+                  <a:extLst>
+                    <a:ext uri="{9D8B030D-6E8A-4147-A177-3AD203B41FA5}">
+                      <a16:colId xmlns:a16="http://schemas.microsoft.com/office/drawing/2014/main" val="2794209462"/>
+                    </a:ext>
+                  </a:extLst>
+                </a:gridCol>
+                <a:gridCol w="2628900">
+                  <a:extLst>
+                    <a:ext uri="{9D8B030D-6E8A-4147-A177-3AD203B41FA5}">
+                      <a16:colId xmlns:a16="http://schemas.microsoft.com/office/drawing/2014/main" val="3607063530"/>
+                    </a:ext>
+                  </a:extLst>
+                </a:gridCol>
+              </a:tblGrid>
+              <a:tr h="370840">
+                <a:tc>
+                  <a:txBody>
+                    <a:bodyPr/>
+                    <a:lstStyle/>
+                    <a:p>
+                      <a:r>
+                        <a:rPr lang="en-US" dirty="0"/>
+                        <a:t>Model</a:t>
+                      </a:r>
+                      <a:endParaRPr lang="LID4096" dirty="0"/>
+                    </a:p>
+                  </a:txBody>
+                  <a:tcPr/>
+                </a:tc>
+                <a:tc>
+                  <a:txBody>
+                    <a:bodyPr/>
+                    <a:lstStyle/>
+                    <a:p>
+                      <a:r>
+                        <a:rPr lang="en-US" dirty="0"/>
+                        <a:t>Nr. Parameters (B)</a:t>
+                      </a:r>
+                      <a:endParaRPr lang="LID4096" dirty="0"/>
+                    </a:p>
+                  </a:txBody>
+                  <a:tcPr/>
+                </a:tc>
+                <a:tc>
+                  <a:txBody>
+                    <a:bodyPr/>
+                    <a:lstStyle/>
+                    <a:p>
+                      <a:r>
+                        <a:rPr lang="en-US" dirty="0"/>
+                        <a:t>Download size (GB)</a:t>
+                      </a:r>
+                      <a:endParaRPr lang="LID4096" dirty="0"/>
+                    </a:p>
+                  </a:txBody>
+                  <a:tcPr/>
+                </a:tc>
+                <a:tc>
+                  <a:txBody>
+                    <a:bodyPr/>
+                    <a:lstStyle/>
+                    <a:p>
+                      <a:r>
+                        <a:rPr lang="en-US" dirty="0"/>
+                        <a:t>Memory size (GB)</a:t>
+                      </a:r>
+                      <a:endParaRPr lang="LID4096" dirty="0"/>
+                    </a:p>
+                  </a:txBody>
+                  <a:tcPr/>
+                </a:tc>
+                <a:extLst>
+                  <a:ext uri="{0D108BD9-81ED-4DB2-BD59-A6C34878D82A}">
+                    <a16:rowId xmlns:a16="http://schemas.microsoft.com/office/drawing/2014/main" val="1879330598"/>
+                  </a:ext>
+                </a:extLst>
+              </a:tr>
+              <a:tr h="370840">
+                <a:tc>
+                  <a:txBody>
+                    <a:bodyPr/>
+                    <a:lstStyle/>
+                    <a:p>
+                      <a:r>
+                        <a:rPr lang="en-US" dirty="0"/>
+                        <a:t>Llama 3.2</a:t>
+                      </a:r>
+                      <a:endParaRPr lang="LID4096" dirty="0"/>
+                    </a:p>
+                  </a:txBody>
+                  <a:tcPr/>
+                </a:tc>
+                <a:tc>
+                  <a:txBody>
+                    <a:bodyPr/>
+                    <a:lstStyle/>
+                    <a:p>
+                      <a:pPr algn="r"/>
+                      <a:r>
+                        <a:rPr lang="en-US" dirty="0"/>
+                        <a:t>3</a:t>
+                      </a:r>
+                      <a:endParaRPr lang="LID4096" dirty="0"/>
+                    </a:p>
+                  </a:txBody>
+                  <a:tcPr/>
+                </a:tc>
+                <a:tc>
+                  <a:txBody>
+                    <a:bodyPr/>
+                    <a:lstStyle/>
+                    <a:p>
+                      <a:pPr algn="r"/>
+                      <a:r>
+                        <a:rPr lang="en-US" dirty="0"/>
+                        <a:t>2.0</a:t>
+                      </a:r>
+                      <a:endParaRPr lang="LID4096" dirty="0"/>
+                    </a:p>
+                  </a:txBody>
+                  <a:tcPr/>
+                </a:tc>
+                <a:tc>
+                  <a:txBody>
+                    <a:bodyPr/>
+                    <a:lstStyle/>
+                    <a:p>
+                      <a:pPr algn="r"/>
+                      <a:r>
+                        <a:rPr lang="en-US" dirty="0"/>
+                        <a:t>4.0</a:t>
+                      </a:r>
+                      <a:endParaRPr lang="LID4096" dirty="0"/>
+                    </a:p>
+                  </a:txBody>
+                  <a:tcPr/>
+                </a:tc>
+                <a:extLst>
+                  <a:ext uri="{0D108BD9-81ED-4DB2-BD59-A6C34878D82A}">
+                    <a16:rowId xmlns:a16="http://schemas.microsoft.com/office/drawing/2014/main" val="516090875"/>
+                  </a:ext>
+                </a:extLst>
+              </a:tr>
+              <a:tr h="370840">
+                <a:tc>
+                  <a:txBody>
+                    <a:bodyPr/>
+                    <a:lstStyle/>
+                    <a:p>
+                      <a:r>
+                        <a:rPr lang="en-US" dirty="0"/>
+                        <a:t>Llama 3.2</a:t>
+                      </a:r>
+                      <a:endParaRPr lang="LID4096" dirty="0"/>
+                    </a:p>
+                  </a:txBody>
+                  <a:tcPr/>
+                </a:tc>
+                <a:tc>
+                  <a:txBody>
+                    <a:bodyPr/>
+                    <a:lstStyle/>
+                    <a:p>
+                      <a:pPr algn="r"/>
+                      <a:r>
+                        <a:rPr lang="en-US" dirty="0"/>
+                        <a:t>1</a:t>
+                      </a:r>
+                      <a:endParaRPr lang="LID4096" dirty="0"/>
+                    </a:p>
+                  </a:txBody>
+                  <a:tcPr/>
+                </a:tc>
+                <a:tc>
+                  <a:txBody>
+                    <a:bodyPr/>
+                    <a:lstStyle/>
+                    <a:p>
+                      <a:pPr algn="r"/>
+                      <a:r>
+                        <a:rPr lang="en-US" dirty="0"/>
+                        <a:t>1.3</a:t>
+                      </a:r>
+                      <a:endParaRPr lang="LID4096" dirty="0"/>
+                    </a:p>
+                  </a:txBody>
+                  <a:tcPr/>
+                </a:tc>
+                <a:tc>
+                  <a:txBody>
+                    <a:bodyPr/>
+                    <a:lstStyle/>
+                    <a:p>
+                      <a:pPr algn="r"/>
+                      <a:r>
+                        <a:rPr lang="en-US" dirty="0"/>
+                        <a:t>2.7</a:t>
+                      </a:r>
+                      <a:endParaRPr lang="LID4096" dirty="0"/>
+                    </a:p>
+                  </a:txBody>
+                  <a:tcPr/>
+                </a:tc>
+                <a:extLst>
+                  <a:ext uri="{0D108BD9-81ED-4DB2-BD59-A6C34878D82A}">
+                    <a16:rowId xmlns:a16="http://schemas.microsoft.com/office/drawing/2014/main" val="409470053"/>
+                  </a:ext>
+                </a:extLst>
+              </a:tr>
+              <a:tr h="370840">
+                <a:tc>
+                  <a:txBody>
+                    <a:bodyPr/>
+                    <a:lstStyle/>
+                    <a:p>
+                      <a:r>
+                        <a:rPr lang="en-US" dirty="0"/>
+                        <a:t>Code Llama</a:t>
+                      </a:r>
+                      <a:endParaRPr lang="LID4096" dirty="0"/>
+                    </a:p>
+                  </a:txBody>
+                  <a:tcPr/>
+                </a:tc>
+                <a:tc>
+                  <a:txBody>
+                    <a:bodyPr/>
+                    <a:lstStyle/>
+                    <a:p>
+                      <a:pPr algn="r"/>
+                      <a:r>
+                        <a:rPr lang="en-US" dirty="0"/>
+                        <a:t>7</a:t>
+                      </a:r>
+                      <a:endParaRPr lang="LID4096" dirty="0"/>
+                    </a:p>
+                  </a:txBody>
+                  <a:tcPr/>
+                </a:tc>
+                <a:tc>
+                  <a:txBody>
+                    <a:bodyPr/>
+                    <a:lstStyle/>
+                    <a:p>
+                      <a:pPr algn="r"/>
+                      <a:r>
+                        <a:rPr lang="en-US" dirty="0"/>
+                        <a:t>3.8</a:t>
+                      </a:r>
+                      <a:endParaRPr lang="LID4096" dirty="0"/>
+                    </a:p>
+                  </a:txBody>
+                  <a:tcPr/>
+                </a:tc>
+                <a:tc>
+                  <a:txBody>
+                    <a:bodyPr/>
+                    <a:lstStyle/>
+                    <a:p>
+                      <a:pPr algn="r"/>
+                      <a:r>
+                        <a:rPr lang="en-US" dirty="0"/>
+                        <a:t>5.7</a:t>
+                      </a:r>
+                      <a:endParaRPr lang="LID4096" dirty="0"/>
+                    </a:p>
+                  </a:txBody>
+                  <a:tcPr/>
+                </a:tc>
+                <a:extLst>
+                  <a:ext uri="{0D108BD9-81ED-4DB2-BD59-A6C34878D82A}">
+                    <a16:rowId xmlns:a16="http://schemas.microsoft.com/office/drawing/2014/main" val="434714921"/>
+                  </a:ext>
+                </a:extLst>
+              </a:tr>
+              <a:tr h="370840">
+                <a:tc>
+                  <a:txBody>
+                    <a:bodyPr/>
+                    <a:lstStyle/>
+                    <a:p>
+                      <a:r>
+                        <a:rPr lang="en-US" dirty="0" err="1"/>
+                        <a:t>LLaVa</a:t>
+                      </a:r>
+                      <a:endParaRPr lang="LID4096" dirty="0"/>
+                    </a:p>
+                  </a:txBody>
+                  <a:tcPr/>
+                </a:tc>
+                <a:tc>
+                  <a:txBody>
+                    <a:bodyPr/>
+                    <a:lstStyle/>
+                    <a:p>
+                      <a:pPr algn="r"/>
+                      <a:r>
+                        <a:rPr lang="en-US" dirty="0"/>
+                        <a:t>7</a:t>
+                      </a:r>
+                      <a:endParaRPr lang="LID4096" dirty="0"/>
+                    </a:p>
+                  </a:txBody>
+                  <a:tcPr/>
+                </a:tc>
+                <a:tc>
+                  <a:txBody>
+                    <a:bodyPr/>
+                    <a:lstStyle/>
+                    <a:p>
+                      <a:pPr algn="r"/>
+                      <a:r>
+                        <a:rPr lang="en-US"/>
+                        <a:t>4.5</a:t>
+                      </a:r>
+                      <a:endParaRPr lang="LID4096" dirty="0"/>
+                    </a:p>
+                  </a:txBody>
+                  <a:tcPr/>
+                </a:tc>
+                <a:tc>
+                  <a:txBody>
+                    <a:bodyPr/>
+                    <a:lstStyle/>
+                    <a:p>
+                      <a:pPr algn="r"/>
+                      <a:endParaRPr lang="LID4096" dirty="0"/>
+                    </a:p>
+                  </a:txBody>
+                  <a:tcPr/>
+                </a:tc>
+                <a:extLst>
+                  <a:ext uri="{0D108BD9-81ED-4DB2-BD59-A6C34878D82A}">
+                    <a16:rowId xmlns:a16="http://schemas.microsoft.com/office/drawing/2014/main" val="1486538003"/>
+                  </a:ext>
+                </a:extLst>
+              </a:tr>
+              <a:tr h="370840">
+                <a:tc>
+                  <a:txBody>
+                    <a:bodyPr/>
+                    <a:lstStyle/>
+                    <a:p>
+                      <a:endParaRPr lang="LID4096"/>
+                    </a:p>
+                  </a:txBody>
+                  <a:tcPr/>
+                </a:tc>
+                <a:tc>
+                  <a:txBody>
+                    <a:bodyPr/>
+                    <a:lstStyle/>
+                    <a:p>
+                      <a:pPr algn="r"/>
+                      <a:endParaRPr lang="LID4096" dirty="0"/>
+                    </a:p>
+                  </a:txBody>
+                  <a:tcPr/>
+                </a:tc>
+                <a:tc>
+                  <a:txBody>
+                    <a:bodyPr/>
+                    <a:lstStyle/>
+                    <a:p>
+                      <a:pPr algn="r"/>
+                      <a:endParaRPr lang="LID4096"/>
+                    </a:p>
+                  </a:txBody>
+                  <a:tcPr/>
+                </a:tc>
+                <a:tc>
+                  <a:txBody>
+                    <a:bodyPr/>
+                    <a:lstStyle/>
+                    <a:p>
+                      <a:pPr algn="r"/>
+                      <a:endParaRPr lang="LID4096" dirty="0"/>
+                    </a:p>
+                  </a:txBody>
+                  <a:tcPr/>
+                </a:tc>
+                <a:extLst>
+                  <a:ext uri="{0D108BD9-81ED-4DB2-BD59-A6C34878D82A}">
+                    <a16:rowId xmlns:a16="http://schemas.microsoft.com/office/drawing/2014/main" val="351441262"/>
+                  </a:ext>
+                </a:extLst>
+              </a:tr>
+            </a:tbl>
+          </a:graphicData>
+        </a:graphic>
+      </p:graphicFrame>
+      <p:sp>
+        <p:nvSpPr>
+          <p:cNvPr id="4" name="Slide Number Placeholder 3">
+            <a:extLst>
+              <a:ext uri="{FF2B5EF4-FFF2-40B4-BE49-F238E27FC236}">
+                <a16:creationId xmlns:a16="http://schemas.microsoft.com/office/drawing/2014/main" id="{67024579-D127-745B-6A26-A3A976384831}"/>
+              </a:ext>
+            </a:extLst>
+          </p:cNvPr>
+          <p:cNvSpPr>
+            <a:spLocks noGrp="1"/>
+          </p:cNvSpPr>
+          <p:nvPr>
+            <p:ph type="sldNum" sz="quarter" idx="12"/>
+          </p:nvPr>
+        </p:nvSpPr>
+        <p:spPr/>
+        <p:txBody>
+          <a:bodyPr/>
+          <a:lstStyle/>
+          <a:p>
+            <a:fld id="{6A9C7FA6-5826-4EA5-8536-11A903012ABC}" type="slidenum">
+              <a:rPr lang="LID4096" smtClean="0"/>
+              <a:t>23</a:t>
+            </a:fld>
+            <a:endParaRPr lang="LID4096"/>
+          </a:p>
+        </p:txBody>
+      </p:sp>
+      <p:sp>
+        <p:nvSpPr>
+          <p:cNvPr id="6" name="Oval 5">
+            <a:extLst>
+              <a:ext uri="{FF2B5EF4-FFF2-40B4-BE49-F238E27FC236}">
+                <a16:creationId xmlns:a16="http://schemas.microsoft.com/office/drawing/2014/main" id="{643423F9-7D5B-4349-49C3-5DC266363D9E}"/>
+              </a:ext>
+            </a:extLst>
+          </p:cNvPr>
+          <p:cNvSpPr/>
+          <p:nvPr/>
+        </p:nvSpPr>
+        <p:spPr>
+          <a:xfrm>
+            <a:off x="10671048" y="1825625"/>
+            <a:ext cx="941832" cy="2359152"/>
+          </a:xfrm>
+          <a:prstGeom prst="ellipse">
+            <a:avLst/>
+          </a:prstGeom>
+          <a:noFill/>
+          <a:ln w="57150">
+            <a:solidFill>
+              <a:srgbClr val="C00000"/>
+            </a:solidFill>
+          </a:ln>
+        </p:spPr>
+        <p:style>
+          <a:lnRef idx="2">
+            <a:schemeClr val="accent1">
+              <a:shade val="15000"/>
+            </a:schemeClr>
+          </a:lnRef>
+          <a:fillRef idx="1">
+            <a:schemeClr val="accent1"/>
+          </a:fillRef>
+          <a:effectRef idx="0">
+            <a:schemeClr val="accent1"/>
+          </a:effectRef>
+          <a:fontRef idx="minor">
+            <a:schemeClr val="lt1"/>
+          </a:fontRef>
+        </p:style>
+        <p:txBody>
+          <a:bodyPr rtlCol="0" anchor="ctr"/>
+          <a:lstStyle/>
+          <a:p>
+            <a:pPr algn="ctr"/>
+            <a:endParaRPr lang="LID4096"/>
+          </a:p>
+        </p:txBody>
+      </p:sp>
+    </p:spTree>
+    <p:extLst>
+      <p:ext uri="{BB962C8B-B14F-4D97-AF65-F5344CB8AC3E}">
+        <p14:creationId xmlns:p14="http://schemas.microsoft.com/office/powerpoint/2010/main" val="664903547"/>
+      </p:ext>
+    </p:extLst>
+  </p:cSld>
+  <p:clrMapOvr>
+    <a:masterClrMapping/>
+  </p:clrMapOvr>
+</p:sld>
+</file>
+
+<file path=ppt/slides/slide24.xml><?xml version="1.0" encoding="utf-8"?>
+<p:sld xmlns:a="http://schemas.openxmlformats.org/drawingml/2006/main" xmlns:r="http://schemas.openxmlformats.org/officeDocument/2006/relationships" xmlns:p="http://schemas.openxmlformats.org/presentationml/2006/main">
+  <p:cSld>
+    <p:spTree>
+      <p:nvGrpSpPr>
+        <p:cNvPr id="1" name=""/>
+        <p:cNvGrpSpPr/>
+        <p:nvPr/>
+      </p:nvGrpSpPr>
+      <p:grpSpPr>
+        <a:xfrm>
+          <a:off x="0" y="0"/>
+          <a:ext cx="0" cy="0"/>
+          <a:chOff x="0" y="0"/>
+          <a:chExt cx="0" cy="0"/>
+        </a:xfrm>
+      </p:grpSpPr>
+      <p:sp>
+        <p:nvSpPr>
+          <p:cNvPr id="2" name="Title 1">
+            <a:extLst>
+              <a:ext uri="{FF2B5EF4-FFF2-40B4-BE49-F238E27FC236}">
                 <a16:creationId xmlns:a16="http://schemas.microsoft.com/office/drawing/2014/main" id="{AEAAB3CB-B877-1D8B-F4C3-D1629394BC4F}"/>
               </a:ext>
             </a:extLst>
@@ -13349,7 +14731,7 @@
           <a:p>
             <a:fld id="{6A9C7FA6-5826-4EA5-8536-11A903012ABC}" type="slidenum">
               <a:rPr lang="LID4096" smtClean="0"/>
-              <a:t>22</a:t>
+              <a:t>24</a:t>
             </a:fld>
             <a:endParaRPr lang="LID4096"/>
           </a:p>

</xml_diff>

<commit_message>
Add quantization methods slide
</commit_message>
<xml_diff>
--- a/local_LLMs.pptx
+++ b/local_LLMs.pptx
@@ -6,7 +6,7 @@
     <p:sldMasterId id="2147483660" r:id="rId2"/>
   </p:sldMasterIdLst>
   <p:notesMasterIdLst>
-    <p:notesMasterId r:id="rId50"/>
+    <p:notesMasterId r:id="rId52"/>
   </p:notesMasterIdLst>
   <p:sldIdLst>
     <p:sldId id="268" r:id="rId3"/>
@@ -55,7 +55,9 @@
     <p:sldId id="818" r:id="rId46"/>
     <p:sldId id="819" r:id="rId47"/>
     <p:sldId id="820" r:id="rId48"/>
-    <p:sldId id="821" r:id="rId49"/>
+    <p:sldId id="822" r:id="rId49"/>
+    <p:sldId id="823" r:id="rId50"/>
+    <p:sldId id="821" r:id="rId51"/>
   </p:sldIdLst>
   <p:sldSz cx="12192000" cy="6858000"/>
   <p:notesSz cx="6858000" cy="9144000"/>
@@ -229,6 +231,8 @@
             <p14:sldId id="818"/>
             <p14:sldId id="819"/>
             <p14:sldId id="820"/>
+            <p14:sldId id="822"/>
+            <p14:sldId id="823"/>
             <p14:sldId id="821"/>
           </p14:sldIdLst>
         </p14:section>
@@ -26020,6 +26024,298 @@
           <p:cNvPr id="2" name="Title 1">
             <a:extLst>
               <a:ext uri="{FF2B5EF4-FFF2-40B4-BE49-F238E27FC236}">
+                <a16:creationId xmlns:a16="http://schemas.microsoft.com/office/drawing/2014/main" id="{973159B6-151E-930D-374D-6AD5A6AD710A}"/>
+              </a:ext>
+            </a:extLst>
+          </p:cNvPr>
+          <p:cNvSpPr>
+            <a:spLocks noGrp="1"/>
+          </p:cNvSpPr>
+          <p:nvPr>
+            <p:ph type="title"/>
+          </p:nvPr>
+        </p:nvSpPr>
+        <p:spPr/>
+        <p:txBody>
+          <a:bodyPr/>
+          <a:lstStyle/>
+          <a:p>
+            <a:r>
+              <a:rPr lang="en-US" dirty="0"/>
+              <a:t>Quantization methods</a:t>
+            </a:r>
+            <a:endParaRPr lang="LID4096" dirty="0"/>
+          </a:p>
+        </p:txBody>
+      </p:sp>
+      <p:sp>
+        <p:nvSpPr>
+          <p:cNvPr id="3" name="Content Placeholder 2">
+            <a:extLst>
+              <a:ext uri="{FF2B5EF4-FFF2-40B4-BE49-F238E27FC236}">
+                <a16:creationId xmlns:a16="http://schemas.microsoft.com/office/drawing/2014/main" id="{78E49FE6-0B24-9E1E-6917-7B722DA1E374}"/>
+              </a:ext>
+            </a:extLst>
+          </p:cNvPr>
+          <p:cNvSpPr>
+            <a:spLocks noGrp="1"/>
+          </p:cNvSpPr>
+          <p:nvPr>
+            <p:ph idx="1"/>
+          </p:nvPr>
+        </p:nvSpPr>
+        <p:spPr/>
+        <p:txBody>
+          <a:bodyPr/>
+          <a:lstStyle/>
+          <a:p>
+            <a:r>
+              <a:rPr lang="en-US" dirty="0"/>
+              <a:t>Post-Training Quantization (PTQ)</a:t>
+            </a:r>
+          </a:p>
+          <a:p>
+            <a:pPr lvl="1"/>
+            <a:r>
+              <a:rPr lang="en-US" dirty="0"/>
+              <a:t>Can be applied to any model</a:t>
+            </a:r>
+          </a:p>
+          <a:p>
+            <a:pPr lvl="1"/>
+            <a:r>
+              <a:rPr lang="en-US" dirty="0"/>
+              <a:t>Potentially higher loss of accuracy</a:t>
+            </a:r>
+          </a:p>
+          <a:p>
+            <a:r>
+              <a:rPr lang="en-US" dirty="0"/>
+              <a:t>Quantization-aware training</a:t>
+            </a:r>
+          </a:p>
+          <a:p>
+            <a:pPr lvl="1"/>
+            <a:r>
+              <a:rPr lang="en-US" dirty="0"/>
+              <a:t>Only for your own models</a:t>
+            </a:r>
+          </a:p>
+          <a:p>
+            <a:pPr lvl="1"/>
+            <a:r>
+              <a:rPr lang="en-US" dirty="0"/>
+              <a:t>Better accuracy</a:t>
+            </a:r>
+          </a:p>
+          <a:p>
+            <a:r>
+              <a:rPr lang="en-US" dirty="0"/>
+              <a:t>... (very active area of research)</a:t>
+            </a:r>
+            <a:endParaRPr lang="LID4096" dirty="0"/>
+          </a:p>
+        </p:txBody>
+      </p:sp>
+      <p:sp>
+        <p:nvSpPr>
+          <p:cNvPr id="4" name="Slide Number Placeholder 3">
+            <a:extLst>
+              <a:ext uri="{FF2B5EF4-FFF2-40B4-BE49-F238E27FC236}">
+                <a16:creationId xmlns:a16="http://schemas.microsoft.com/office/drawing/2014/main" id="{DA7DD188-C764-32D0-AC0F-E233C7E2F1EF}"/>
+              </a:ext>
+            </a:extLst>
+          </p:cNvPr>
+          <p:cNvSpPr>
+            <a:spLocks noGrp="1"/>
+          </p:cNvSpPr>
+          <p:nvPr>
+            <p:ph type="sldNum" sz="quarter" idx="12"/>
+          </p:nvPr>
+        </p:nvSpPr>
+        <p:spPr/>
+        <p:txBody>
+          <a:bodyPr/>
+          <a:lstStyle/>
+          <a:p>
+            <a:fld id="{6A9C7FA6-5826-4EA5-8536-11A903012ABC}" type="slidenum">
+              <a:rPr lang="LID4096" smtClean="0"/>
+              <a:t>47</a:t>
+            </a:fld>
+            <a:endParaRPr lang="LID4096"/>
+          </a:p>
+        </p:txBody>
+      </p:sp>
+    </p:spTree>
+    <p:extLst>
+      <p:ext uri="{BB962C8B-B14F-4D97-AF65-F5344CB8AC3E}">
+        <p14:creationId xmlns:p14="http://schemas.microsoft.com/office/powerpoint/2010/main" val="3693844959"/>
+      </p:ext>
+    </p:extLst>
+  </p:cSld>
+  <p:clrMapOvr>
+    <a:masterClrMapping/>
+  </p:clrMapOvr>
+</p:sld>
+</file>
+
+<file path=ppt/slides/slide48.xml><?xml version="1.0" encoding="utf-8"?>
+<p:sld xmlns:a="http://schemas.openxmlformats.org/drawingml/2006/main" xmlns:r="http://schemas.openxmlformats.org/officeDocument/2006/relationships" xmlns:p="http://schemas.openxmlformats.org/presentationml/2006/main">
+  <p:cSld>
+    <p:spTree>
+      <p:nvGrpSpPr>
+        <p:cNvPr id="1" name=""/>
+        <p:cNvGrpSpPr/>
+        <p:nvPr/>
+      </p:nvGrpSpPr>
+      <p:grpSpPr>
+        <a:xfrm>
+          <a:off x="0" y="0"/>
+          <a:ext cx="0" cy="0"/>
+          <a:chOff x="0" y="0"/>
+          <a:chExt cx="0" cy="0"/>
+        </a:xfrm>
+      </p:grpSpPr>
+      <p:sp>
+        <p:nvSpPr>
+          <p:cNvPr id="5" name="Title 4">
+            <a:extLst>
+              <a:ext uri="{FF2B5EF4-FFF2-40B4-BE49-F238E27FC236}">
+                <a16:creationId xmlns:a16="http://schemas.microsoft.com/office/drawing/2014/main" id="{BF265DA9-45EE-8580-3833-900A2BC0DE04}"/>
+              </a:ext>
+            </a:extLst>
+          </p:cNvPr>
+          <p:cNvSpPr>
+            <a:spLocks noGrp="1"/>
+          </p:cNvSpPr>
+          <p:nvPr>
+            <p:ph type="title"/>
+          </p:nvPr>
+        </p:nvSpPr>
+        <p:spPr/>
+        <p:txBody>
+          <a:bodyPr/>
+          <a:lstStyle/>
+          <a:p>
+            <a:r>
+              <a:rPr lang="en-US" dirty="0"/>
+              <a:t>Quantization-aware training</a:t>
+            </a:r>
+            <a:endParaRPr lang="LID4096" dirty="0"/>
+          </a:p>
+        </p:txBody>
+      </p:sp>
+      <p:sp>
+        <p:nvSpPr>
+          <p:cNvPr id="4" name="Slide Number Placeholder 3">
+            <a:extLst>
+              <a:ext uri="{FF2B5EF4-FFF2-40B4-BE49-F238E27FC236}">
+                <a16:creationId xmlns:a16="http://schemas.microsoft.com/office/drawing/2014/main" id="{DC06CD15-4822-D900-196F-C3922B68462B}"/>
+              </a:ext>
+            </a:extLst>
+          </p:cNvPr>
+          <p:cNvSpPr>
+            <a:spLocks noGrp="1"/>
+          </p:cNvSpPr>
+          <p:nvPr>
+            <p:ph type="sldNum" sz="quarter" idx="12"/>
+          </p:nvPr>
+        </p:nvSpPr>
+        <p:spPr/>
+        <p:txBody>
+          <a:bodyPr/>
+          <a:lstStyle/>
+          <a:p>
+            <a:fld id="{6A9C7FA6-5826-4EA5-8536-11A903012ABC}" type="slidenum">
+              <a:rPr lang="LID4096" smtClean="0"/>
+              <a:t>48</a:t>
+            </a:fld>
+            <a:endParaRPr lang="LID4096"/>
+          </a:p>
+        </p:txBody>
+      </p:sp>
+      <p:pic>
+        <p:nvPicPr>
+          <p:cNvPr id="1026" name="Picture 2" descr="Flow chart of quantization-aware training. ">
+            <a:extLst>
+              <a:ext uri="{FF2B5EF4-FFF2-40B4-BE49-F238E27FC236}">
+                <a16:creationId xmlns:a16="http://schemas.microsoft.com/office/drawing/2014/main" id="{D9016BFA-AFCB-7C0A-4BC4-01BBBB58E89A}"/>
+              </a:ext>
+            </a:extLst>
+          </p:cNvPr>
+          <p:cNvPicPr>
+            <a:picLocks noChangeAspect="1" noChangeArrowheads="1"/>
+          </p:cNvPicPr>
+          <p:nvPr/>
+        </p:nvPicPr>
+        <p:blipFill>
+          <a:blip r:embed="rId2">
+            <a:extLst>
+              <a:ext uri="{28A0092B-C50C-407E-A947-70E740481C1C}">
+                <a14:useLocalDpi xmlns:a14="http://schemas.microsoft.com/office/drawing/2010/main" val="0"/>
+              </a:ext>
+            </a:extLst>
+          </a:blip>
+          <a:srcRect/>
+          <a:stretch>
+            <a:fillRect/>
+          </a:stretch>
+        </p:blipFill>
+        <p:spPr bwMode="auto">
+          <a:xfrm>
+            <a:off x="2201811" y="1870075"/>
+            <a:ext cx="6667500" cy="4171950"/>
+          </a:xfrm>
+          <a:prstGeom prst="rect">
+            <a:avLst/>
+          </a:prstGeom>
+          <a:noFill/>
+          <a:extLst>
+            <a:ext uri="{909E8E84-426E-40DD-AFC4-6F175D3DCCD1}">
+              <a14:hiddenFill xmlns:a14="http://schemas.microsoft.com/office/drawing/2010/main">
+                <a:solidFill>
+                  <a:srgbClr val="FFFFFF"/>
+                </a:solidFill>
+              </a14:hiddenFill>
+            </a:ext>
+          </a:extLst>
+        </p:spPr>
+      </p:pic>
+    </p:spTree>
+    <p:extLst>
+      <p:ext uri="{BB962C8B-B14F-4D97-AF65-F5344CB8AC3E}">
+        <p14:creationId xmlns:p14="http://schemas.microsoft.com/office/powerpoint/2010/main" val="816546011"/>
+      </p:ext>
+    </p:extLst>
+  </p:cSld>
+  <p:clrMapOvr>
+    <a:masterClrMapping/>
+  </p:clrMapOvr>
+</p:sld>
+</file>
+
+<file path=ppt/slides/slide49.xml><?xml version="1.0" encoding="utf-8"?>
+<p:sld xmlns:a="http://schemas.openxmlformats.org/drawingml/2006/main" xmlns:r="http://schemas.openxmlformats.org/officeDocument/2006/relationships" xmlns:p="http://schemas.openxmlformats.org/presentationml/2006/main">
+  <p:cSld>
+    <p:spTree>
+      <p:nvGrpSpPr>
+        <p:cNvPr id="1" name=""/>
+        <p:cNvGrpSpPr/>
+        <p:nvPr/>
+      </p:nvGrpSpPr>
+      <p:grpSpPr>
+        <a:xfrm>
+          <a:off x="0" y="0"/>
+          <a:ext cx="0" cy="0"/>
+          <a:chOff x="0" y="0"/>
+          <a:chExt cx="0" cy="0"/>
+        </a:xfrm>
+      </p:grpSpPr>
+      <p:sp>
+        <p:nvSpPr>
+          <p:cNvPr id="2" name="Title 1">
+            <a:extLst>
+              <a:ext uri="{FF2B5EF4-FFF2-40B4-BE49-F238E27FC236}">
                 <a16:creationId xmlns:a16="http://schemas.microsoft.com/office/drawing/2014/main" id="{72028046-D717-4D03-68B6-24F62F8E8C66}"/>
               </a:ext>
             </a:extLst>
@@ -26107,7 +26403,7 @@
           <a:p>
             <a:fld id="{6A9C7FA6-5826-4EA5-8536-11A903012ABC}" type="slidenum">
               <a:rPr lang="LID4096" smtClean="0"/>
-              <a:t>47</a:t>
+              <a:t>49</a:t>
             </a:fld>
             <a:endParaRPr lang="LID4096"/>
           </a:p>

</xml_diff>

<commit_message>
Add sizes for Gemma 2
</commit_message>
<xml_diff>
--- a/local_LLMs.pptx
+++ b/local_LLMs.pptx
@@ -13597,7 +13597,7 @@
             <p:ph idx="1"/>
             <p:extLst>
               <p:ext uri="{D42A27DB-BD31-4B8C-83A1-F6EECF244321}">
-                <p14:modId xmlns:p14="http://schemas.microsoft.com/office/powerpoint/2010/main" val="3990308038"/>
+                <p14:modId xmlns:p14="http://schemas.microsoft.com/office/powerpoint/2010/main" val="2255514407"/>
               </p:ext>
             </p:extLst>
           </p:nvPr>
@@ -14007,7 +14007,7 @@
                       <a:pPr algn="r"/>
                       <a:r>
                         <a:rPr lang="en-US" dirty="0"/>
-                        <a:t>16.0</a:t>
+                        <a:t>15.0</a:t>
                       </a:r>
                       <a:endParaRPr lang="LID4096" dirty="0"/>
                     </a:p>
@@ -14022,7 +14022,7 @@
                       <a:pPr algn="r"/>
                       <a:r>
                         <a:rPr lang="en-US" dirty="0"/>
-                        <a:t>17.6</a:t>
+                        <a:t>18.0</a:t>
                       </a:r>
                       <a:endParaRPr lang="LID4096" dirty="0"/>
                     </a:p>
@@ -34268,8 +34268,8 @@
           </a:p>
         </p:txBody>
       </p:sp>
-      <mc:AlternateContent xmlns:mc="http://schemas.openxmlformats.org/markup-compatibility/2006">
-        <mc:Choice xmlns:a14="http://schemas.microsoft.com/office/drawing/2010/main" Requires="a14">
+      <mc:AlternateContent xmlns:mc="http://schemas.openxmlformats.org/markup-compatibility/2006" xmlns:a14="http://schemas.microsoft.com/office/drawing/2010/main">
+        <mc:Choice Requires="a14">
           <p:sp>
             <p:nvSpPr>
               <p:cNvPr id="3" name="Content Placeholder 2">
@@ -34308,13 +34308,7 @@
                           <a:rPr lang="en-US" b="0" i="1" smtClean="0">
                             <a:latin typeface="Cambria Math" panose="02040503050406030204" pitchFamily="18" charset="0"/>
                           </a:rPr>
-                          <m:t>&gt;</m:t>
-                        </m:r>
-                        <m:r>
-                          <a:rPr lang="en-US" b="0" i="1" smtClean="0">
-                            <a:latin typeface="Cambria Math" panose="02040503050406030204" pitchFamily="18" charset="0"/>
-                          </a:rPr>
-                          <m:t>10</m:t>
+                          <m:t>&gt;10</m:t>
                         </m:r>
                       </m:e>
                       <m:sup>
@@ -34700,7 +34694,7 @@
             </p:txBody>
           </p:sp>
         </mc:Choice>
-        <mc:Fallback>
+        <mc:Fallback xmlns="">
           <p:sp>
             <p:nvSpPr>
               <p:cNvPr id="3" name="Content Placeholder 2">

</xml_diff>

<commit_message>
Add slide on fine-tuning
</commit_message>
<xml_diff>
--- a/local_LLMs.pptx
+++ b/local_LLMs.pptx
@@ -6,7 +6,7 @@
     <p:sldMasterId id="2147483660" r:id="rId2"/>
   </p:sldMasterIdLst>
   <p:notesMasterIdLst>
-    <p:notesMasterId r:id="rId52"/>
+    <p:notesMasterId r:id="rId54"/>
   </p:notesMasterIdLst>
   <p:sldIdLst>
     <p:sldId id="268" r:id="rId3"/>
@@ -57,7 +57,9 @@
     <p:sldId id="820" r:id="rId48"/>
     <p:sldId id="822" r:id="rId49"/>
     <p:sldId id="823" r:id="rId50"/>
-    <p:sldId id="821" r:id="rId51"/>
+    <p:sldId id="824" r:id="rId51"/>
+    <p:sldId id="825" r:id="rId52"/>
+    <p:sldId id="821" r:id="rId53"/>
   </p:sldIdLst>
   <p:sldSz cx="12192000" cy="6858000"/>
   <p:notesSz cx="6858000" cy="9144000"/>
@@ -233,6 +235,8 @@
             <p14:sldId id="820"/>
             <p14:sldId id="822"/>
             <p14:sldId id="823"/>
+            <p14:sldId id="824"/>
+            <p14:sldId id="825"/>
             <p14:sldId id="821"/>
           </p14:sldIdLst>
         </p14:section>
@@ -29251,10 +29255,9 @@
           </a:p>
           <a:p>
             <a:r>
-              <a:rPr lang="en-US" dirty="0" err="1"/>
-              <a:t>Disadvantates</a:t>
-            </a:r>
-            <a:endParaRPr lang="en-US" dirty="0"/>
+              <a:rPr lang="en-US" dirty="0"/>
+              <a:t>Disadvantages</a:t>
+            </a:r>
           </a:p>
           <a:p>
             <a:pPr lvl="1"/>
@@ -29317,6 +29320,9 @@
                     <p:cTn id="3" fill="hold">
                       <p:stCondLst>
                         <p:cond delay="indefinite"/>
+                        <p:cond evt="onBegin" delay="0">
+                          <p:tn val="2"/>
+                        </p:cond>
                       </p:stCondLst>
                       <p:childTnLst>
                         <p:par>
@@ -29326,7 +29332,7 @@
                             </p:stCondLst>
                             <p:childTnLst>
                               <p:par>
-                                <p:cTn id="5" presetID="1" presetClass="entr" presetSubtype="0" fill="hold" grpId="0" nodeType="clickEffect">
+                                <p:cTn id="5" presetID="1" presetClass="entr" presetSubtype="0" fill="hold" grpId="0" nodeType="withEffect">
                                   <p:stCondLst>
                                     <p:cond delay="0"/>
                                   </p:stCondLst>
@@ -33890,7 +33896,7 @@
           <p:cNvPr id="2" name="Title 1">
             <a:extLst>
               <a:ext uri="{FF2B5EF4-FFF2-40B4-BE49-F238E27FC236}">
-                <a16:creationId xmlns:a16="http://schemas.microsoft.com/office/drawing/2014/main" id="{72028046-D717-4D03-68B6-24F62F8E8C66}"/>
+                <a16:creationId xmlns:a16="http://schemas.microsoft.com/office/drawing/2014/main" id="{52ABB501-F68B-B187-0E1B-0F5BB3F948C8}"/>
               </a:ext>
             </a:extLst>
           </p:cNvPr>
@@ -33908,7 +33914,7 @@
           <a:p>
             <a:r>
               <a:rPr lang="en-US" dirty="0"/>
-              <a:t>References</a:t>
+              <a:t>Fine tuning</a:t>
             </a:r>
             <a:endParaRPr lang="LID4096" dirty="0"/>
           </a:p>
@@ -33916,10 +33922,10 @@
       </p:sp>
       <p:sp>
         <p:nvSpPr>
-          <p:cNvPr id="3" name="Content Placeholder 2">
+          <p:cNvPr id="3" name="Text Placeholder 2">
             <a:extLst>
               <a:ext uri="{FF2B5EF4-FFF2-40B4-BE49-F238E27FC236}">
-                <a16:creationId xmlns:a16="http://schemas.microsoft.com/office/drawing/2014/main" id="{9149B4B1-BF0F-03F7-F1C2-183824AE90E6}"/>
+                <a16:creationId xmlns:a16="http://schemas.microsoft.com/office/drawing/2014/main" id="{53237F62-2B24-1963-6787-038104F9711F}"/>
               </a:ext>
             </a:extLst>
           </p:cNvPr>
@@ -33927,7 +33933,7 @@
             <a:spLocks noGrp="1"/>
           </p:cNvSpPr>
           <p:nvPr>
-            <p:ph idx="1"/>
+            <p:ph type="body" idx="1"/>
           </p:nvPr>
         </p:nvSpPr>
         <p:spPr/>
@@ -33935,22 +33941,7 @@
           <a:bodyPr/>
           <a:lstStyle/>
           <a:p>
-            <a:r>
-              <a:rPr lang="en-US" i="1" dirty="0">
-                <a:hlinkClick r:id="rId2"/>
-              </a:rPr>
-              <a:t>Understanding mathematics behind floating point precision</a:t>
-            </a:r>
-            <a:r>
-              <a:rPr lang="en-US" dirty="0"/>
-              <a:t>, Prabhu Raghav</a:t>
-            </a:r>
-          </a:p>
-          <a:p>
-            <a:endParaRPr lang="en-US" dirty="0"/>
-          </a:p>
-          <a:p>
-            <a:endParaRPr lang="LID4096" dirty="0"/>
+            <a:endParaRPr lang="LID4096"/>
           </a:p>
         </p:txBody>
       </p:sp>
@@ -33959,7 +33950,7 @@
           <p:cNvPr id="4" name="Slide Number Placeholder 3">
             <a:extLst>
               <a:ext uri="{FF2B5EF4-FFF2-40B4-BE49-F238E27FC236}">
-                <a16:creationId xmlns:a16="http://schemas.microsoft.com/office/drawing/2014/main" id="{4B63AC12-F433-5474-8AC9-46ECB0618018}"/>
+                <a16:creationId xmlns:a16="http://schemas.microsoft.com/office/drawing/2014/main" id="{4A02859C-649C-C525-95C1-325A5F84C66C}"/>
               </a:ext>
             </a:extLst>
           </p:cNvPr>
@@ -33986,7 +33977,7 @@
     </p:spTree>
     <p:extLst>
       <p:ext uri="{BB962C8B-B14F-4D97-AF65-F5344CB8AC3E}">
-        <p14:creationId xmlns:p14="http://schemas.microsoft.com/office/powerpoint/2010/main" val="3567151682"/>
+        <p14:creationId xmlns:p14="http://schemas.microsoft.com/office/powerpoint/2010/main" val="591192624"/>
       </p:ext>
     </p:extLst>
   </p:cSld>
@@ -34100,6 +34091,263 @@
     <p:extLst>
       <p:ext uri="{BB962C8B-B14F-4D97-AF65-F5344CB8AC3E}">
         <p14:creationId xmlns:p14="http://schemas.microsoft.com/office/powerpoint/2010/main" val="686227983"/>
+      </p:ext>
+    </p:extLst>
+  </p:cSld>
+  <p:clrMapOvr>
+    <a:masterClrMapping/>
+  </p:clrMapOvr>
+</p:sld>
+</file>
+
+<file path=ppt/slides/slide50.xml><?xml version="1.0" encoding="utf-8"?>
+<p:sld xmlns:a="http://schemas.openxmlformats.org/drawingml/2006/main" xmlns:r="http://schemas.openxmlformats.org/officeDocument/2006/relationships" xmlns:p="http://schemas.openxmlformats.org/presentationml/2006/main">
+  <p:cSld>
+    <p:spTree>
+      <p:nvGrpSpPr>
+        <p:cNvPr id="1" name=""/>
+        <p:cNvGrpSpPr/>
+        <p:nvPr/>
+      </p:nvGrpSpPr>
+      <p:grpSpPr>
+        <a:xfrm>
+          <a:off x="0" y="0"/>
+          <a:ext cx="0" cy="0"/>
+          <a:chOff x="0" y="0"/>
+          <a:chExt cx="0" cy="0"/>
+        </a:xfrm>
+      </p:grpSpPr>
+      <p:sp>
+        <p:nvSpPr>
+          <p:cNvPr id="2" name="Title 1">
+            <a:extLst>
+              <a:ext uri="{FF2B5EF4-FFF2-40B4-BE49-F238E27FC236}">
+                <a16:creationId xmlns:a16="http://schemas.microsoft.com/office/drawing/2014/main" id="{CB8D7FC1-EE04-108A-B308-8D66A7979CD2}"/>
+              </a:ext>
+            </a:extLst>
+          </p:cNvPr>
+          <p:cNvSpPr>
+            <a:spLocks noGrp="1"/>
+          </p:cNvSpPr>
+          <p:nvPr>
+            <p:ph type="title"/>
+          </p:nvPr>
+        </p:nvSpPr>
+        <p:spPr/>
+        <p:txBody>
+          <a:bodyPr/>
+          <a:lstStyle/>
+          <a:p>
+            <a:r>
+              <a:rPr lang="en-US" dirty="0"/>
+              <a:t>Types of fine tuning</a:t>
+            </a:r>
+            <a:endParaRPr lang="LID4096" dirty="0"/>
+          </a:p>
+        </p:txBody>
+      </p:sp>
+      <p:sp>
+        <p:nvSpPr>
+          <p:cNvPr id="3" name="Content Placeholder 2">
+            <a:extLst>
+              <a:ext uri="{FF2B5EF4-FFF2-40B4-BE49-F238E27FC236}">
+                <a16:creationId xmlns:a16="http://schemas.microsoft.com/office/drawing/2014/main" id="{1ED06324-2C17-10C1-1F44-72C1C939D0AC}"/>
+              </a:ext>
+            </a:extLst>
+          </p:cNvPr>
+          <p:cNvSpPr>
+            <a:spLocks noGrp="1"/>
+          </p:cNvSpPr>
+          <p:nvPr>
+            <p:ph idx="1"/>
+          </p:nvPr>
+        </p:nvSpPr>
+        <p:spPr/>
+        <p:txBody>
+          <a:bodyPr/>
+          <a:lstStyle/>
+          <a:p>
+            <a:r>
+              <a:rPr lang="en-US" dirty="0"/>
+              <a:t>Supervised Fine-Tuning</a:t>
+            </a:r>
+          </a:p>
+          <a:p>
+            <a:r>
+              <a:rPr lang="en-US" dirty="0"/>
+              <a:t>Odds Ratio Policy Optimization</a:t>
+            </a:r>
+          </a:p>
+          <a:p>
+            <a:r>
+              <a:rPr lang="en-US" dirty="0"/>
+              <a:t>Direct Preference Optimization</a:t>
+            </a:r>
+            <a:endParaRPr lang="LID4096" dirty="0"/>
+          </a:p>
+        </p:txBody>
+      </p:sp>
+      <p:sp>
+        <p:nvSpPr>
+          <p:cNvPr id="4" name="Slide Number Placeholder 3">
+            <a:extLst>
+              <a:ext uri="{FF2B5EF4-FFF2-40B4-BE49-F238E27FC236}">
+                <a16:creationId xmlns:a16="http://schemas.microsoft.com/office/drawing/2014/main" id="{9B7C9BDE-E6CE-8CFA-1538-4345DEEC11AE}"/>
+              </a:ext>
+            </a:extLst>
+          </p:cNvPr>
+          <p:cNvSpPr>
+            <a:spLocks noGrp="1"/>
+          </p:cNvSpPr>
+          <p:nvPr>
+            <p:ph type="sldNum" sz="quarter" idx="12"/>
+          </p:nvPr>
+        </p:nvSpPr>
+        <p:spPr/>
+        <p:txBody>
+          <a:bodyPr/>
+          <a:lstStyle/>
+          <a:p>
+            <a:fld id="{6A9C7FA6-5826-4EA5-8536-11A903012ABC}" type="slidenum">
+              <a:rPr lang="LID4096" smtClean="0"/>
+              <a:t>50</a:t>
+            </a:fld>
+            <a:endParaRPr lang="LID4096"/>
+          </a:p>
+        </p:txBody>
+      </p:sp>
+    </p:spTree>
+    <p:extLst>
+      <p:ext uri="{BB962C8B-B14F-4D97-AF65-F5344CB8AC3E}">
+        <p14:creationId xmlns:p14="http://schemas.microsoft.com/office/powerpoint/2010/main" val="2265958564"/>
+      </p:ext>
+    </p:extLst>
+  </p:cSld>
+  <p:clrMapOvr>
+    <a:masterClrMapping/>
+  </p:clrMapOvr>
+</p:sld>
+</file>
+
+<file path=ppt/slides/slide51.xml><?xml version="1.0" encoding="utf-8"?>
+<p:sld xmlns:a="http://schemas.openxmlformats.org/drawingml/2006/main" xmlns:r="http://schemas.openxmlformats.org/officeDocument/2006/relationships" xmlns:p="http://schemas.openxmlformats.org/presentationml/2006/main">
+  <p:cSld>
+    <p:spTree>
+      <p:nvGrpSpPr>
+        <p:cNvPr id="1" name=""/>
+        <p:cNvGrpSpPr/>
+        <p:nvPr/>
+      </p:nvGrpSpPr>
+      <p:grpSpPr>
+        <a:xfrm>
+          <a:off x="0" y="0"/>
+          <a:ext cx="0" cy="0"/>
+          <a:chOff x="0" y="0"/>
+          <a:chExt cx="0" cy="0"/>
+        </a:xfrm>
+      </p:grpSpPr>
+      <p:sp>
+        <p:nvSpPr>
+          <p:cNvPr id="2" name="Title 1">
+            <a:extLst>
+              <a:ext uri="{FF2B5EF4-FFF2-40B4-BE49-F238E27FC236}">
+                <a16:creationId xmlns:a16="http://schemas.microsoft.com/office/drawing/2014/main" id="{72028046-D717-4D03-68B6-24F62F8E8C66}"/>
+              </a:ext>
+            </a:extLst>
+          </p:cNvPr>
+          <p:cNvSpPr>
+            <a:spLocks noGrp="1"/>
+          </p:cNvSpPr>
+          <p:nvPr>
+            <p:ph type="title"/>
+          </p:nvPr>
+        </p:nvSpPr>
+        <p:spPr/>
+        <p:txBody>
+          <a:bodyPr/>
+          <a:lstStyle/>
+          <a:p>
+            <a:r>
+              <a:rPr lang="en-US" dirty="0"/>
+              <a:t>References</a:t>
+            </a:r>
+            <a:endParaRPr lang="LID4096" dirty="0"/>
+          </a:p>
+        </p:txBody>
+      </p:sp>
+      <p:sp>
+        <p:nvSpPr>
+          <p:cNvPr id="3" name="Content Placeholder 2">
+            <a:extLst>
+              <a:ext uri="{FF2B5EF4-FFF2-40B4-BE49-F238E27FC236}">
+                <a16:creationId xmlns:a16="http://schemas.microsoft.com/office/drawing/2014/main" id="{9149B4B1-BF0F-03F7-F1C2-183824AE90E6}"/>
+              </a:ext>
+            </a:extLst>
+          </p:cNvPr>
+          <p:cNvSpPr>
+            <a:spLocks noGrp="1"/>
+          </p:cNvSpPr>
+          <p:nvPr>
+            <p:ph idx="1"/>
+          </p:nvPr>
+        </p:nvSpPr>
+        <p:spPr/>
+        <p:txBody>
+          <a:bodyPr/>
+          <a:lstStyle/>
+          <a:p>
+            <a:r>
+              <a:rPr lang="en-US" i="1" dirty="0">
+                <a:hlinkClick r:id="rId2"/>
+              </a:rPr>
+              <a:t>Understanding mathematics behind floating point precision</a:t>
+            </a:r>
+            <a:r>
+              <a:rPr lang="en-US" dirty="0"/>
+              <a:t>, Prabhu Raghav</a:t>
+            </a:r>
+          </a:p>
+          <a:p>
+            <a:endParaRPr lang="en-US" dirty="0"/>
+          </a:p>
+          <a:p>
+            <a:endParaRPr lang="LID4096" dirty="0"/>
+          </a:p>
+        </p:txBody>
+      </p:sp>
+      <p:sp>
+        <p:nvSpPr>
+          <p:cNvPr id="4" name="Slide Number Placeholder 3">
+            <a:extLst>
+              <a:ext uri="{FF2B5EF4-FFF2-40B4-BE49-F238E27FC236}">
+                <a16:creationId xmlns:a16="http://schemas.microsoft.com/office/drawing/2014/main" id="{4B63AC12-F433-5474-8AC9-46ECB0618018}"/>
+              </a:ext>
+            </a:extLst>
+          </p:cNvPr>
+          <p:cNvSpPr>
+            <a:spLocks noGrp="1"/>
+          </p:cNvSpPr>
+          <p:nvPr>
+            <p:ph type="sldNum" sz="quarter" idx="12"/>
+          </p:nvPr>
+        </p:nvSpPr>
+        <p:spPr/>
+        <p:txBody>
+          <a:bodyPr/>
+          <a:lstStyle/>
+          <a:p>
+            <a:fld id="{6A9C7FA6-5826-4EA5-8536-11A903012ABC}" type="slidenum">
+              <a:rPr lang="LID4096" smtClean="0"/>
+              <a:t>51</a:t>
+            </a:fld>
+            <a:endParaRPr lang="LID4096"/>
+          </a:p>
+        </p:txBody>
+      </p:sp>
+    </p:spTree>
+    <p:extLst>
+      <p:ext uri="{BB962C8B-B14F-4D97-AF65-F5344CB8AC3E}">
+        <p14:creationId xmlns:p14="http://schemas.microsoft.com/office/powerpoint/2010/main" val="3567151682"/>
       </p:ext>
     </p:extLst>
   </p:cSld>

</xml_diff>

<commit_message>
Add Gemma 2 sizes
</commit_message>
<xml_diff>
--- a/local_LLMs.pptx
+++ b/local_LLMs.pptx
@@ -13601,7 +13601,7 @@
             <p:ph idx="1"/>
             <p:extLst>
               <p:ext uri="{D42A27DB-BD31-4B8C-83A1-F6EECF244321}">
-                <p14:modId xmlns:p14="http://schemas.microsoft.com/office/powerpoint/2010/main" val="3990308038"/>
+                <p14:modId xmlns:p14="http://schemas.microsoft.com/office/powerpoint/2010/main" val="2175918370"/>
               </p:ext>
             </p:extLst>
           </p:nvPr>
@@ -14011,7 +14011,7 @@
                       <a:pPr algn="r"/>
                       <a:r>
                         <a:rPr lang="en-US" dirty="0"/>
-                        <a:t>16.0</a:t>
+                        <a:t>15.0</a:t>
                       </a:r>
                       <a:endParaRPr lang="LID4096" dirty="0"/>
                     </a:p>
@@ -14026,7 +14026,7 @@
                       <a:pPr algn="r"/>
                       <a:r>
                         <a:rPr lang="en-US" dirty="0"/>
-                        <a:t>17.6</a:t>
+                        <a:t>18.0</a:t>
                       </a:r>
                       <a:endParaRPr lang="LID4096" dirty="0"/>
                     </a:p>
@@ -14139,9 +14139,9 @@
         <p:grpSpPr>
           <a:xfrm>
             <a:off x="965576" y="4285168"/>
-            <a:ext cx="10058401" cy="2071182"/>
+            <a:ext cx="10520748" cy="2071182"/>
             <a:chOff x="965576" y="4285168"/>
-            <a:chExt cx="10058401" cy="2071182"/>
+            <a:chExt cx="10520748" cy="2071182"/>
           </a:xfrm>
         </p:grpSpPr>
         <p:sp>
@@ -14159,7 +14159,7 @@
           <p:spPr>
             <a:xfrm>
               <a:off x="3215149" y="5833130"/>
-              <a:ext cx="6033383" cy="523220"/>
+              <a:ext cx="8271175" cy="523220"/>
             </a:xfrm>
             <a:prstGeom prst="rect">
               <a:avLst/>
@@ -14179,7 +14179,7 @@
             <a:p>
               <a:r>
                 <a:rPr lang="en-US" sz="2800" dirty="0"/>
-                <a:t>Model should fit in device + host RAM!</a:t>
+                <a:t>Model should fit in device (6 GB) + host RAM (16 GB)!</a:t>
               </a:r>
               <a:endParaRPr lang="LID4096" sz="2800" dirty="0"/>
             </a:p>
@@ -34516,8 +34516,8 @@
           </a:p>
         </p:txBody>
       </p:sp>
-      <mc:AlternateContent xmlns:mc="http://schemas.openxmlformats.org/markup-compatibility/2006">
-        <mc:Choice xmlns:a14="http://schemas.microsoft.com/office/drawing/2010/main" Requires="a14">
+      <mc:AlternateContent xmlns:mc="http://schemas.openxmlformats.org/markup-compatibility/2006" xmlns:a14="http://schemas.microsoft.com/office/drawing/2010/main">
+        <mc:Choice Requires="a14">
           <p:sp>
             <p:nvSpPr>
               <p:cNvPr id="3" name="Content Placeholder 2">
@@ -34556,13 +34556,7 @@
                           <a:rPr lang="en-US" b="0" i="1" smtClean="0">
                             <a:latin typeface="Cambria Math" panose="02040503050406030204" pitchFamily="18" charset="0"/>
                           </a:rPr>
-                          <m:t>&gt;</m:t>
-                        </m:r>
-                        <m:r>
-                          <a:rPr lang="en-US" b="0" i="1" smtClean="0">
-                            <a:latin typeface="Cambria Math" panose="02040503050406030204" pitchFamily="18" charset="0"/>
-                          </a:rPr>
-                          <m:t>10</m:t>
+                          <m:t>&gt;10</m:t>
                         </m:r>
                       </m:e>
                       <m:sup>
@@ -34948,7 +34942,7 @@
             </p:txBody>
           </p:sp>
         </mc:Choice>
-        <mc:Fallback>
+        <mc:Fallback xmlns="">
           <p:sp>
             <p:nvSpPr>
               <p:cNvPr id="3" name="Content Placeholder 2">

</xml_diff>

<commit_message>
Add slides on transformer architecture
</commit_message>
<xml_diff>
--- a/local_LLMs.pptx
+++ b/local_LLMs.pptx
@@ -6,7 +6,7 @@
     <p:sldMasterId id="2147483660" r:id="rId2"/>
   </p:sldMasterIdLst>
   <p:notesMasterIdLst>
-    <p:notesMasterId r:id="rId54"/>
+    <p:notesMasterId r:id="rId57"/>
   </p:notesMasterIdLst>
   <p:sldIdLst>
     <p:sldId id="268" r:id="rId3"/>
@@ -20,46 +20,49 @@
     <p:sldId id="270" r:id="rId11"/>
     <p:sldId id="271" r:id="rId12"/>
     <p:sldId id="272" r:id="rId13"/>
-    <p:sldId id="260" r:id="rId14"/>
-    <p:sldId id="792" r:id="rId15"/>
-    <p:sldId id="261" r:id="rId16"/>
-    <p:sldId id="786" r:id="rId17"/>
-    <p:sldId id="787" r:id="rId18"/>
-    <p:sldId id="788" r:id="rId19"/>
-    <p:sldId id="789" r:id="rId20"/>
-    <p:sldId id="790" r:id="rId21"/>
-    <p:sldId id="796" r:id="rId22"/>
-    <p:sldId id="801" r:id="rId23"/>
-    <p:sldId id="802" r:id="rId24"/>
-    <p:sldId id="805" r:id="rId25"/>
-    <p:sldId id="813" r:id="rId26"/>
-    <p:sldId id="807" r:id="rId27"/>
-    <p:sldId id="811" r:id="rId28"/>
-    <p:sldId id="791" r:id="rId29"/>
-    <p:sldId id="808" r:id="rId30"/>
-    <p:sldId id="793" r:id="rId31"/>
-    <p:sldId id="263" r:id="rId32"/>
-    <p:sldId id="262" r:id="rId33"/>
-    <p:sldId id="265" r:id="rId34"/>
-    <p:sldId id="266" r:id="rId35"/>
-    <p:sldId id="799" r:id="rId36"/>
-    <p:sldId id="794" r:id="rId37"/>
-    <p:sldId id="785" r:id="rId38"/>
-    <p:sldId id="797" r:id="rId39"/>
-    <p:sldId id="795" r:id="rId40"/>
-    <p:sldId id="800" r:id="rId41"/>
-    <p:sldId id="814" r:id="rId42"/>
-    <p:sldId id="816" r:id="rId43"/>
-    <p:sldId id="815" r:id="rId44"/>
-    <p:sldId id="817" r:id="rId45"/>
-    <p:sldId id="818" r:id="rId46"/>
-    <p:sldId id="819" r:id="rId47"/>
-    <p:sldId id="820" r:id="rId48"/>
-    <p:sldId id="822" r:id="rId49"/>
-    <p:sldId id="823" r:id="rId50"/>
-    <p:sldId id="824" r:id="rId51"/>
-    <p:sldId id="825" r:id="rId52"/>
-    <p:sldId id="821" r:id="rId53"/>
+    <p:sldId id="826" r:id="rId14"/>
+    <p:sldId id="827" r:id="rId15"/>
+    <p:sldId id="828" r:id="rId16"/>
+    <p:sldId id="260" r:id="rId17"/>
+    <p:sldId id="792" r:id="rId18"/>
+    <p:sldId id="261" r:id="rId19"/>
+    <p:sldId id="786" r:id="rId20"/>
+    <p:sldId id="787" r:id="rId21"/>
+    <p:sldId id="788" r:id="rId22"/>
+    <p:sldId id="789" r:id="rId23"/>
+    <p:sldId id="790" r:id="rId24"/>
+    <p:sldId id="796" r:id="rId25"/>
+    <p:sldId id="801" r:id="rId26"/>
+    <p:sldId id="802" r:id="rId27"/>
+    <p:sldId id="805" r:id="rId28"/>
+    <p:sldId id="813" r:id="rId29"/>
+    <p:sldId id="807" r:id="rId30"/>
+    <p:sldId id="811" r:id="rId31"/>
+    <p:sldId id="791" r:id="rId32"/>
+    <p:sldId id="808" r:id="rId33"/>
+    <p:sldId id="793" r:id="rId34"/>
+    <p:sldId id="263" r:id="rId35"/>
+    <p:sldId id="262" r:id="rId36"/>
+    <p:sldId id="265" r:id="rId37"/>
+    <p:sldId id="266" r:id="rId38"/>
+    <p:sldId id="799" r:id="rId39"/>
+    <p:sldId id="794" r:id="rId40"/>
+    <p:sldId id="785" r:id="rId41"/>
+    <p:sldId id="797" r:id="rId42"/>
+    <p:sldId id="795" r:id="rId43"/>
+    <p:sldId id="800" r:id="rId44"/>
+    <p:sldId id="814" r:id="rId45"/>
+    <p:sldId id="816" r:id="rId46"/>
+    <p:sldId id="815" r:id="rId47"/>
+    <p:sldId id="817" r:id="rId48"/>
+    <p:sldId id="818" r:id="rId49"/>
+    <p:sldId id="819" r:id="rId50"/>
+    <p:sldId id="820" r:id="rId51"/>
+    <p:sldId id="822" r:id="rId52"/>
+    <p:sldId id="823" r:id="rId53"/>
+    <p:sldId id="824" r:id="rId54"/>
+    <p:sldId id="825" r:id="rId55"/>
+    <p:sldId id="821" r:id="rId56"/>
   </p:sldIdLst>
   <p:sldSz cx="12192000" cy="6858000"/>
   <p:notesSz cx="6858000" cy="9144000"/>
@@ -182,6 +185,9 @@
             <p14:sldId id="270"/>
             <p14:sldId id="271"/>
             <p14:sldId id="272"/>
+            <p14:sldId id="826"/>
+            <p14:sldId id="827"/>
+            <p14:sldId id="828"/>
             <p14:sldId id="260"/>
             <p14:sldId id="792"/>
           </p14:sldIdLst>
@@ -331,7 +337,7 @@
           <a:p>
             <a:fld id="{AFF6CA10-77A8-48CF-B8BB-9A6F09EF999A}" type="datetimeFigureOut">
               <a:rPr lang="LID4096" smtClean="0"/>
-              <a:t>11/08/2024</a:t>
+              <a:t>11/12/2024</a:t>
             </a:fld>
             <a:endParaRPr lang="LID4096"/>
           </a:p>
@@ -664,7 +670,7 @@
           <a:p>
             <a:fld id="{AD7CCFB3-7F5B-4C65-BBB5-73724EC28DC4}" type="slidenum">
               <a:rPr lang="LID4096" smtClean="0"/>
-              <a:t>35</a:t>
+              <a:t>38</a:t>
             </a:fld>
             <a:endParaRPr lang="LID4096"/>
           </a:p>
@@ -772,7 +778,7 @@
           <a:p>
             <a:fld id="{AD7CCFB3-7F5B-4C65-BBB5-73724EC28DC4}" type="slidenum">
               <a:rPr lang="LID4096" smtClean="0"/>
-              <a:t>38</a:t>
+              <a:t>41</a:t>
             </a:fld>
             <a:endParaRPr lang="LID4096"/>
           </a:p>
@@ -940,7 +946,7 @@
           <a:p>
             <a:fld id="{83023F2C-B818-4B8C-9AC9-F1F58AFDE7C6}" type="datetime1">
               <a:rPr lang="LID4096" smtClean="0"/>
-              <a:t>11/08/2024</a:t>
+              <a:t>11/12/2024</a:t>
             </a:fld>
             <a:endParaRPr lang="LID4096"/>
           </a:p>
@@ -1140,7 +1146,7 @@
           <a:p>
             <a:fld id="{75EE8536-8941-4A8C-86FC-1079B35B0344}" type="datetime1">
               <a:rPr lang="LID4096" smtClean="0"/>
-              <a:t>11/08/2024</a:t>
+              <a:t>11/12/2024</a:t>
             </a:fld>
             <a:endParaRPr lang="LID4096"/>
           </a:p>
@@ -1350,7 +1356,7 @@
           <a:p>
             <a:fld id="{E4BC0863-424E-47F8-A54B-EC4DEC67C244}" type="datetime1">
               <a:rPr lang="LID4096" smtClean="0"/>
-              <a:t>11/08/2024</a:t>
+              <a:t>11/12/2024</a:t>
             </a:fld>
             <a:endParaRPr lang="LID4096"/>
           </a:p>
@@ -1620,7 +1626,7 @@
           <a:p>
             <a:fld id="{12D417FB-DB75-4510-8AD7-5416595AADD8}" type="datetime1">
               <a:rPr lang="en-US" smtClean="0"/>
-              <a:t>2024-11-08</a:t>
+              <a:t>2024-11-12</a:t>
             </a:fld>
             <a:endParaRPr lang="en-US"/>
           </a:p>
@@ -3106,7 +3112,7 @@
           <a:p>
             <a:fld id="{3FCCD84F-F300-485B-A204-781A035BF124}" type="datetime1">
               <a:rPr lang="LID4096" smtClean="0"/>
-              <a:t>11/08/2024</a:t>
+              <a:t>11/12/2024</a:t>
             </a:fld>
             <a:endParaRPr lang="LID4096"/>
           </a:p>
@@ -5260,7 +5266,7 @@
           <a:p>
             <a:fld id="{3F2499A6-9F54-4C9F-A94C-BFA7D4FBB21B}" type="datetime1">
               <a:rPr lang="LID4096" smtClean="0"/>
-              <a:t>11/08/2024</a:t>
+              <a:t>11/12/2024</a:t>
             </a:fld>
             <a:endParaRPr lang="LID4096"/>
           </a:p>
@@ -5473,7 +5479,7 @@
           <a:p>
             <a:fld id="{EC448E59-F64F-416B-85C7-F58EA54BAF31}" type="datetime1">
               <a:rPr lang="nl-BE" smtClean="0"/>
-              <a:t>8/11/2024</a:t>
+              <a:t>12/11/2024</a:t>
             </a:fld>
             <a:endParaRPr lang="nl-BE"/>
           </a:p>
@@ -5719,7 +5725,7 @@
           <a:p>
             <a:fld id="{9ED5C3B5-60AD-4494-9CFA-8B02B158E887}" type="datetime1">
               <a:rPr lang="nl-BE" smtClean="0"/>
-              <a:t>8/11/2024</a:t>
+              <a:t>12/11/2024</a:t>
             </a:fld>
             <a:endParaRPr lang="nl-BE"/>
           </a:p>
@@ -5837,7 +5843,7 @@
           <a:p>
             <a:fld id="{1E4894A8-27B8-4F4D-B345-90FD4A1447E9}" type="datetime1">
               <a:rPr lang="nl-BE" smtClean="0"/>
-              <a:t>8/11/2024</a:t>
+              <a:t>12/11/2024</a:t>
             </a:fld>
             <a:endParaRPr lang="nl-BE"/>
           </a:p>
@@ -6125,7 +6131,7 @@
           <a:p>
             <a:fld id="{44F0EF99-E673-4972-A23A-EB3FD1F7D254}" type="datetime1">
               <a:rPr lang="nl-BE" smtClean="0"/>
-              <a:t>8/11/2024</a:t>
+              <a:t>12/11/2024</a:t>
             </a:fld>
             <a:endParaRPr lang="nl-BE"/>
           </a:p>
@@ -6381,7 +6387,7 @@
           <a:p>
             <a:fld id="{64574D85-C055-49FC-B1C7-71CF589CD3BE}" type="datetime1">
               <a:rPr lang="LID4096" smtClean="0"/>
-              <a:t>11/08/2024</a:t>
+              <a:t>11/12/2024</a:t>
             </a:fld>
             <a:endParaRPr lang="LID4096"/>
           </a:p>
@@ -6796,7 +6802,7 @@
           <a:p>
             <a:fld id="{57F7C621-78E4-474C-B522-F9EAB1322641}" type="datetime1">
               <a:rPr lang="LID4096" smtClean="0"/>
-              <a:t>11/08/2024</a:t>
+              <a:t>11/12/2024</a:t>
             </a:fld>
             <a:endParaRPr lang="LID4096"/>
           </a:p>
@@ -6938,7 +6944,7 @@
           <a:p>
             <a:fld id="{66184A1E-04A4-4E65-A600-394CD1772B64}" type="datetime1">
               <a:rPr lang="LID4096" smtClean="0"/>
-              <a:t>11/08/2024</a:t>
+              <a:t>11/12/2024</a:t>
             </a:fld>
             <a:endParaRPr lang="LID4096"/>
           </a:p>
@@ -7051,7 +7057,7 @@
           <a:p>
             <a:fld id="{446470D2-0C90-42ED-AA66-9B8CBA5C543D}" type="datetime1">
               <a:rPr lang="LID4096" smtClean="0"/>
-              <a:t>11/08/2024</a:t>
+              <a:t>11/12/2024</a:t>
             </a:fld>
             <a:endParaRPr lang="LID4096"/>
           </a:p>
@@ -7364,7 +7370,7 @@
           <a:p>
             <a:fld id="{CDEFDBDB-5E8E-4B83-805E-D72602863BC8}" type="datetime1">
               <a:rPr lang="LID4096" smtClean="0"/>
-              <a:t>11/08/2024</a:t>
+              <a:t>11/12/2024</a:t>
             </a:fld>
             <a:endParaRPr lang="LID4096"/>
           </a:p>
@@ -7653,7 +7659,7 @@
           <a:p>
             <a:fld id="{F3766E00-DB4B-44DD-8B2F-5EA95B528F60}" type="datetime1">
               <a:rPr lang="LID4096" smtClean="0"/>
-              <a:t>11/08/2024</a:t>
+              <a:t>11/12/2024</a:t>
             </a:fld>
             <a:endParaRPr lang="LID4096"/>
           </a:p>
@@ -7896,7 +7902,7 @@
           <a:p>
             <a:fld id="{BA09C617-5B96-4D55-A102-97077179EF1D}" type="datetime1">
               <a:rPr lang="LID4096" smtClean="0"/>
-              <a:t>11/08/2024</a:t>
+              <a:t>11/12/2024</a:t>
             </a:fld>
             <a:endParaRPr lang="LID4096"/>
           </a:p>
@@ -10235,6 +10241,1362 @@
           <p:cNvPr id="2" name="Title 1">
             <a:extLst>
               <a:ext uri="{FF2B5EF4-FFF2-40B4-BE49-F238E27FC236}">
+                <a16:creationId xmlns:a16="http://schemas.microsoft.com/office/drawing/2014/main" id="{64BA6922-CD59-FE21-F906-E45D6EC6C44C}"/>
+              </a:ext>
+            </a:extLst>
+          </p:cNvPr>
+          <p:cNvSpPr>
+            <a:spLocks noGrp="1"/>
+          </p:cNvSpPr>
+          <p:nvPr>
+            <p:ph type="title"/>
+          </p:nvPr>
+        </p:nvSpPr>
+        <p:spPr/>
+        <p:txBody>
+          <a:bodyPr/>
+          <a:lstStyle/>
+          <a:p>
+            <a:r>
+              <a:rPr lang="en-US" dirty="0"/>
+              <a:t>Transformers</a:t>
+            </a:r>
+            <a:endParaRPr lang="LID4096" dirty="0"/>
+          </a:p>
+        </p:txBody>
+      </p:sp>
+      <p:sp>
+        <p:nvSpPr>
+          <p:cNvPr id="3" name="Content Placeholder 2">
+            <a:extLst>
+              <a:ext uri="{FF2B5EF4-FFF2-40B4-BE49-F238E27FC236}">
+                <a16:creationId xmlns:a16="http://schemas.microsoft.com/office/drawing/2014/main" id="{C9638707-45ED-3C52-6A4E-1F277D87A10E}"/>
+              </a:ext>
+            </a:extLst>
+          </p:cNvPr>
+          <p:cNvSpPr>
+            <a:spLocks noGrp="1"/>
+          </p:cNvSpPr>
+          <p:nvPr>
+            <p:ph idx="1"/>
+          </p:nvPr>
+        </p:nvSpPr>
+        <p:spPr>
+          <a:xfrm>
+            <a:off x="838200" y="1825625"/>
+            <a:ext cx="6486144" cy="4351338"/>
+          </a:xfrm>
+        </p:spPr>
+        <p:txBody>
+          <a:bodyPr/>
+          <a:lstStyle/>
+          <a:p>
+            <a:r>
+              <a:rPr lang="en-US" i="1" dirty="0">
+                <a:hlinkClick r:id="rId2"/>
+              </a:rPr>
+              <a:t>Attention is all you need</a:t>
+            </a:r>
+            <a:r>
+              <a:rPr lang="en-US" dirty="0"/>
+              <a:t>, Vaswani et al., NIPS 2017</a:t>
+            </a:r>
+          </a:p>
+          <a:p>
+            <a:pPr lvl="1"/>
+            <a:r>
+              <a:rPr lang="en-US" dirty="0"/>
+              <a:t>Embedding</a:t>
+            </a:r>
+          </a:p>
+          <a:p>
+            <a:pPr lvl="1"/>
+            <a:r>
+              <a:rPr lang="en-US" dirty="0"/>
+              <a:t>Positional encoding</a:t>
+            </a:r>
+          </a:p>
+          <a:p>
+            <a:pPr lvl="1"/>
+            <a:r>
+              <a:rPr lang="en-US" dirty="0"/>
+              <a:t>Multi-head attention</a:t>
+            </a:r>
+          </a:p>
+          <a:p>
+            <a:pPr lvl="1"/>
+            <a:r>
+              <a:rPr lang="en-US" dirty="0"/>
+              <a:t>Layer normalization</a:t>
+            </a:r>
+          </a:p>
+          <a:p>
+            <a:pPr lvl="1"/>
+            <a:r>
+              <a:rPr lang="en-US" dirty="0" err="1"/>
+              <a:t>Softmax</a:t>
+            </a:r>
+            <a:endParaRPr lang="LID4096" dirty="0"/>
+          </a:p>
+        </p:txBody>
+      </p:sp>
+      <p:sp>
+        <p:nvSpPr>
+          <p:cNvPr id="4" name="Slide Number Placeholder 3">
+            <a:extLst>
+              <a:ext uri="{FF2B5EF4-FFF2-40B4-BE49-F238E27FC236}">
+                <a16:creationId xmlns:a16="http://schemas.microsoft.com/office/drawing/2014/main" id="{4DAF2791-A232-52BB-2045-6D2124AA0AA5}"/>
+              </a:ext>
+            </a:extLst>
+          </p:cNvPr>
+          <p:cNvSpPr>
+            <a:spLocks noGrp="1"/>
+          </p:cNvSpPr>
+          <p:nvPr>
+            <p:ph type="sldNum" sz="quarter" idx="12"/>
+          </p:nvPr>
+        </p:nvSpPr>
+        <p:spPr/>
+        <p:txBody>
+          <a:bodyPr/>
+          <a:lstStyle/>
+          <a:p>
+            <a:fld id="{6A9C7FA6-5826-4EA5-8536-11A903012ABC}" type="slidenum">
+              <a:rPr lang="LID4096" smtClean="0"/>
+              <a:t>12</a:t>
+            </a:fld>
+            <a:endParaRPr lang="LID4096"/>
+          </a:p>
+        </p:txBody>
+      </p:sp>
+      <p:pic>
+        <p:nvPicPr>
+          <p:cNvPr id="1026" name="Picture 2">
+            <a:extLst>
+              <a:ext uri="{FF2B5EF4-FFF2-40B4-BE49-F238E27FC236}">
+                <a16:creationId xmlns:a16="http://schemas.microsoft.com/office/drawing/2014/main" id="{6FDC2759-9114-B46F-9C55-64696EC900A6}"/>
+              </a:ext>
+            </a:extLst>
+          </p:cNvPr>
+          <p:cNvPicPr>
+            <a:picLocks noChangeAspect="1" noChangeArrowheads="1"/>
+          </p:cNvPicPr>
+          <p:nvPr/>
+        </p:nvPicPr>
+        <p:blipFill rotWithShape="1">
+          <a:blip r:embed="rId3">
+            <a:extLst>
+              <a:ext uri="{28A0092B-C50C-407E-A947-70E740481C1C}">
+                <a14:useLocalDpi xmlns:a14="http://schemas.microsoft.com/office/drawing/2010/main" val="0"/>
+              </a:ext>
+            </a:extLst>
+          </a:blip>
+          <a:srcRect l="9361" t="3066" r="12063" b="8267"/>
+          <a:stretch/>
+        </p:blipFill>
+        <p:spPr bwMode="auto">
+          <a:xfrm>
+            <a:off x="7214616" y="275590"/>
+            <a:ext cx="4343400" cy="6080760"/>
+          </a:xfrm>
+          <a:prstGeom prst="rect">
+            <a:avLst/>
+          </a:prstGeom>
+          <a:noFill/>
+          <a:extLst>
+            <a:ext uri="{909E8E84-426E-40DD-AFC4-6F175D3DCCD1}">
+              <a14:hiddenFill xmlns:a14="http://schemas.microsoft.com/office/drawing/2010/main">
+                <a:solidFill>
+                  <a:srgbClr val="FFFFFF"/>
+                </a:solidFill>
+              </a14:hiddenFill>
+            </a:ext>
+          </a:extLst>
+        </p:spPr>
+      </p:pic>
+    </p:spTree>
+    <p:extLst>
+      <p:ext uri="{BB962C8B-B14F-4D97-AF65-F5344CB8AC3E}">
+        <p14:creationId xmlns:p14="http://schemas.microsoft.com/office/powerpoint/2010/main" val="4013153450"/>
+      </p:ext>
+    </p:extLst>
+  </p:cSld>
+  <p:clrMapOvr>
+    <a:masterClrMapping/>
+  </p:clrMapOvr>
+</p:sld>
+</file>
+
+<file path=ppt/slides/slide13.xml><?xml version="1.0" encoding="utf-8"?>
+<p:sld xmlns:a="http://schemas.openxmlformats.org/drawingml/2006/main" xmlns:r="http://schemas.openxmlformats.org/officeDocument/2006/relationships" xmlns:p="http://schemas.openxmlformats.org/presentationml/2006/main">
+  <p:cSld>
+    <p:spTree>
+      <p:nvGrpSpPr>
+        <p:cNvPr id="1" name="">
+          <a:extLst>
+            <a:ext uri="{FF2B5EF4-FFF2-40B4-BE49-F238E27FC236}">
+              <a16:creationId xmlns:a16="http://schemas.microsoft.com/office/drawing/2014/main" id="{ADA34B44-E047-8E3D-8F37-2E08AFF4071D}"/>
+            </a:ext>
+          </a:extLst>
+        </p:cNvPr>
+        <p:cNvGrpSpPr/>
+        <p:nvPr/>
+      </p:nvGrpSpPr>
+      <p:grpSpPr>
+        <a:xfrm>
+          <a:off x="0" y="0"/>
+          <a:ext cx="0" cy="0"/>
+          <a:chOff x="0" y="0"/>
+          <a:chExt cx="0" cy="0"/>
+        </a:xfrm>
+      </p:grpSpPr>
+      <p:sp>
+        <p:nvSpPr>
+          <p:cNvPr id="2" name="Title 1">
+            <a:extLst>
+              <a:ext uri="{FF2B5EF4-FFF2-40B4-BE49-F238E27FC236}">
+                <a16:creationId xmlns:a16="http://schemas.microsoft.com/office/drawing/2014/main" id="{41B11BA9-CC9B-489C-BC4B-9D0C8F7C8E0F}"/>
+              </a:ext>
+            </a:extLst>
+          </p:cNvPr>
+          <p:cNvSpPr>
+            <a:spLocks noGrp="1"/>
+          </p:cNvSpPr>
+          <p:nvPr>
+            <p:ph type="title"/>
+          </p:nvPr>
+        </p:nvSpPr>
+        <p:spPr/>
+        <p:txBody>
+          <a:bodyPr/>
+          <a:lstStyle/>
+          <a:p>
+            <a:r>
+              <a:rPr lang="en-US" dirty="0"/>
+              <a:t>Embeddings</a:t>
+            </a:r>
+            <a:endParaRPr lang="LID4096" dirty="0"/>
+          </a:p>
+        </p:txBody>
+      </p:sp>
+      <p:sp>
+        <p:nvSpPr>
+          <p:cNvPr id="3" name="Content Placeholder 2">
+            <a:extLst>
+              <a:ext uri="{FF2B5EF4-FFF2-40B4-BE49-F238E27FC236}">
+                <a16:creationId xmlns:a16="http://schemas.microsoft.com/office/drawing/2014/main" id="{1249A7E1-7829-E72F-E68A-E5F0D432ABAE}"/>
+              </a:ext>
+            </a:extLst>
+          </p:cNvPr>
+          <p:cNvSpPr>
+            <a:spLocks noGrp="1"/>
+          </p:cNvSpPr>
+          <p:nvPr>
+            <p:ph idx="1"/>
+          </p:nvPr>
+        </p:nvSpPr>
+        <p:spPr>
+          <a:xfrm>
+            <a:off x="838200" y="1825625"/>
+            <a:ext cx="5178552" cy="4351338"/>
+          </a:xfrm>
+        </p:spPr>
+        <p:txBody>
+          <a:bodyPr>
+            <a:normAutofit fontScale="92500" lnSpcReduction="20000"/>
+          </a:bodyPr>
+          <a:lstStyle/>
+          <a:p>
+            <a:pPr marL="285750" indent="-285750">
+              <a:buFont typeface="Arial" panose="020B0604020202020204" pitchFamily="34" charset="0"/>
+              <a:buChar char="•"/>
+            </a:pPr>
+            <a:r>
+              <a:rPr lang="en-US" dirty="0"/>
+              <a:t>Represent words as one-hot vectors</a:t>
+            </a:r>
+            <a:br>
+              <a:rPr lang="en-US" dirty="0"/>
+            </a:br>
+            <a:r>
+              <a:rPr lang="en-US" dirty="0"/>
+              <a:t>length = vocabulary size</a:t>
+            </a:r>
+          </a:p>
+          <a:p>
+            <a:pPr marL="742950" lvl="1" indent="-285750"/>
+            <a:r>
+              <a:rPr lang="en-US" dirty="0"/>
+              <a:t>Issues</a:t>
+            </a:r>
+          </a:p>
+          <a:p>
+            <a:pPr marL="1200150" lvl="2" indent="-285750"/>
+            <a:r>
+              <a:rPr lang="en-US" dirty="0"/>
+              <a:t>Unwieldy</a:t>
+            </a:r>
+          </a:p>
+          <a:p>
+            <a:pPr marL="1200150" lvl="2" indent="-285750"/>
+            <a:r>
+              <a:rPr lang="en-US" dirty="0"/>
+              <a:t>No semantics</a:t>
+            </a:r>
+          </a:p>
+          <a:p>
+            <a:pPr marL="285750" indent="-285750">
+              <a:buFont typeface="Arial" panose="020B0604020202020204" pitchFamily="34" charset="0"/>
+              <a:buChar char="•"/>
+            </a:pPr>
+            <a:r>
+              <a:rPr lang="en-US" dirty="0"/>
+              <a:t>Word embeddings</a:t>
+            </a:r>
+          </a:p>
+          <a:p>
+            <a:pPr marL="742950" lvl="1" indent="-285750">
+              <a:buFont typeface="Arial" panose="020B0604020202020204" pitchFamily="34" charset="0"/>
+              <a:buChar char="•"/>
+            </a:pPr>
+            <a:r>
+              <a:rPr lang="en-US" dirty="0"/>
+              <a:t>dense vector</a:t>
+            </a:r>
+          </a:p>
+          <a:p>
+            <a:pPr marL="742950" lvl="1" indent="-285750">
+              <a:buFont typeface="Arial" panose="020B0604020202020204" pitchFamily="34" charset="0"/>
+              <a:buChar char="•"/>
+            </a:pPr>
+            <a:r>
+              <a:rPr lang="en-US" dirty="0"/>
+              <a:t>vector distance </a:t>
+            </a:r>
+            <a:r>
+              <a:rPr lang="en-US" dirty="0">
+                <a:sym typeface="Symbol" panose="05050102010706020507" pitchFamily="18" charset="2"/>
+              </a:rPr>
+              <a:t></a:t>
+            </a:r>
+            <a:r>
+              <a:rPr lang="en-US" dirty="0"/>
+              <a:t> semantic distance</a:t>
+            </a:r>
+          </a:p>
+          <a:p>
+            <a:pPr marL="285750" indent="-285750">
+              <a:buFont typeface="Arial" panose="020B0604020202020204" pitchFamily="34" charset="0"/>
+              <a:buChar char="•"/>
+            </a:pPr>
+            <a:r>
+              <a:rPr lang="en-US" dirty="0"/>
+              <a:t>Training</a:t>
+            </a:r>
+          </a:p>
+          <a:p>
+            <a:pPr marL="742950" lvl="1" indent="-285750">
+              <a:buFont typeface="Arial" panose="020B0604020202020204" pitchFamily="34" charset="0"/>
+              <a:buChar char="•"/>
+            </a:pPr>
+            <a:r>
+              <a:rPr lang="en-US" dirty="0"/>
+              <a:t>use context</a:t>
+            </a:r>
+          </a:p>
+          <a:p>
+            <a:pPr marL="742950" lvl="1" indent="-285750">
+              <a:buFont typeface="Arial" panose="020B0604020202020204" pitchFamily="34" charset="0"/>
+              <a:buChar char="•"/>
+            </a:pPr>
+            <a:r>
+              <a:rPr lang="en-US" dirty="0"/>
+              <a:t>discover relations with surrounding words</a:t>
+            </a:r>
+          </a:p>
+          <a:p>
+            <a:endParaRPr lang="LID4096" dirty="0"/>
+          </a:p>
+        </p:txBody>
+      </p:sp>
+      <p:sp>
+        <p:nvSpPr>
+          <p:cNvPr id="4" name="Slide Number Placeholder 3">
+            <a:extLst>
+              <a:ext uri="{FF2B5EF4-FFF2-40B4-BE49-F238E27FC236}">
+                <a16:creationId xmlns:a16="http://schemas.microsoft.com/office/drawing/2014/main" id="{8F3EAAC1-58F4-89F9-5348-02F4492C7907}"/>
+              </a:ext>
+            </a:extLst>
+          </p:cNvPr>
+          <p:cNvSpPr>
+            <a:spLocks noGrp="1"/>
+          </p:cNvSpPr>
+          <p:nvPr>
+            <p:ph type="sldNum" sz="quarter" idx="12"/>
+          </p:nvPr>
+        </p:nvSpPr>
+        <p:spPr/>
+        <p:txBody>
+          <a:bodyPr/>
+          <a:lstStyle/>
+          <a:p>
+            <a:fld id="{6A9C7FA6-5826-4EA5-8536-11A903012ABC}" type="slidenum">
+              <a:rPr lang="LID4096" smtClean="0"/>
+              <a:t>13</a:t>
+            </a:fld>
+            <a:endParaRPr lang="LID4096"/>
+          </a:p>
+        </p:txBody>
+      </p:sp>
+      <p:pic>
+        <p:nvPicPr>
+          <p:cNvPr id="5" name="Picture 4" descr="wmd - Copy">
+            <a:extLst>
+              <a:ext uri="{FF2B5EF4-FFF2-40B4-BE49-F238E27FC236}">
+                <a16:creationId xmlns:a16="http://schemas.microsoft.com/office/drawing/2014/main" id="{57CC1682-7333-8E3E-81AB-B0FEDF890969}"/>
+              </a:ext>
+            </a:extLst>
+          </p:cNvPr>
+          <p:cNvPicPr>
+            <a:picLocks noChangeAspect="1" noChangeArrowheads="1"/>
+          </p:cNvPicPr>
+          <p:nvPr/>
+        </p:nvPicPr>
+        <p:blipFill>
+          <a:blip r:embed="rId2">
+            <a:extLst>
+              <a:ext uri="{28A0092B-C50C-407E-A947-70E740481C1C}">
+                <a14:useLocalDpi xmlns:a14="http://schemas.microsoft.com/office/drawing/2010/main" val="0"/>
+              </a:ext>
+            </a:extLst>
+          </a:blip>
+          <a:srcRect/>
+          <a:stretch>
+            <a:fillRect/>
+          </a:stretch>
+        </p:blipFill>
+        <p:spPr bwMode="auto">
+          <a:xfrm>
+            <a:off x="5507866" y="1825625"/>
+            <a:ext cx="6684134" cy="3210598"/>
+          </a:xfrm>
+          <a:prstGeom prst="rect">
+            <a:avLst/>
+          </a:prstGeom>
+          <a:noFill/>
+          <a:extLst>
+            <a:ext uri="{909E8E84-426E-40DD-AFC4-6F175D3DCCD1}">
+              <a14:hiddenFill xmlns:a14="http://schemas.microsoft.com/office/drawing/2010/main">
+                <a:solidFill>
+                  <a:srgbClr val="FFFFFF"/>
+                </a:solidFill>
+              </a14:hiddenFill>
+            </a:ext>
+          </a:extLst>
+        </p:spPr>
+      </p:pic>
+      <p:grpSp>
+        <p:nvGrpSpPr>
+          <p:cNvPr id="11" name="Group 10">
+            <a:extLst>
+              <a:ext uri="{FF2B5EF4-FFF2-40B4-BE49-F238E27FC236}">
+                <a16:creationId xmlns:a16="http://schemas.microsoft.com/office/drawing/2014/main" id="{EE893293-3DE8-34BD-A65A-6D72C5E0DED9}"/>
+              </a:ext>
+            </a:extLst>
+          </p:cNvPr>
+          <p:cNvGrpSpPr/>
+          <p:nvPr/>
+        </p:nvGrpSpPr>
+        <p:grpSpPr>
+          <a:xfrm>
+            <a:off x="943897" y="1690688"/>
+            <a:ext cx="4218038" cy="1839093"/>
+            <a:chOff x="943897" y="1690688"/>
+            <a:chExt cx="4218038" cy="1839093"/>
+          </a:xfrm>
+        </p:grpSpPr>
+        <p:cxnSp>
+          <p:nvCxnSpPr>
+            <p:cNvPr id="7" name="Straight Connector 6">
+              <a:extLst>
+                <a:ext uri="{FF2B5EF4-FFF2-40B4-BE49-F238E27FC236}">
+                  <a16:creationId xmlns:a16="http://schemas.microsoft.com/office/drawing/2014/main" id="{E20A1E70-C239-B2CF-E3B8-647C39AC2ECF}"/>
+                </a:ext>
+              </a:extLst>
+            </p:cNvPr>
+            <p:cNvCxnSpPr/>
+            <p:nvPr/>
+          </p:nvCxnSpPr>
+          <p:spPr>
+            <a:xfrm>
+              <a:off x="1052052" y="1690688"/>
+              <a:ext cx="3785419" cy="1839093"/>
+            </a:xfrm>
+            <a:prstGeom prst="line">
+              <a:avLst/>
+            </a:prstGeom>
+            <a:ln w="38100">
+              <a:solidFill>
+                <a:srgbClr val="C00000"/>
+              </a:solidFill>
+            </a:ln>
+          </p:spPr>
+          <p:style>
+            <a:lnRef idx="2">
+              <a:schemeClr val="accent1"/>
+            </a:lnRef>
+            <a:fillRef idx="0">
+              <a:schemeClr val="accent1"/>
+            </a:fillRef>
+            <a:effectRef idx="1">
+              <a:schemeClr val="accent1"/>
+            </a:effectRef>
+            <a:fontRef idx="minor">
+              <a:schemeClr val="tx1"/>
+            </a:fontRef>
+          </p:style>
+        </p:cxnSp>
+        <p:cxnSp>
+          <p:nvCxnSpPr>
+            <p:cNvPr id="8" name="Straight Connector 7">
+              <a:extLst>
+                <a:ext uri="{FF2B5EF4-FFF2-40B4-BE49-F238E27FC236}">
+                  <a16:creationId xmlns:a16="http://schemas.microsoft.com/office/drawing/2014/main" id="{D8BD1D29-B4D4-EBF5-2C01-09F7D4B85E3E}"/>
+                </a:ext>
+              </a:extLst>
+            </p:cNvPr>
+            <p:cNvCxnSpPr>
+              <a:cxnSpLocks/>
+            </p:cNvCxnSpPr>
+            <p:nvPr/>
+          </p:nvCxnSpPr>
+          <p:spPr>
+            <a:xfrm flipV="1">
+              <a:off x="943897" y="1843088"/>
+              <a:ext cx="4218038" cy="1585912"/>
+            </a:xfrm>
+            <a:prstGeom prst="line">
+              <a:avLst/>
+            </a:prstGeom>
+            <a:ln w="38100">
+              <a:solidFill>
+                <a:srgbClr val="C00000"/>
+              </a:solidFill>
+            </a:ln>
+          </p:spPr>
+          <p:style>
+            <a:lnRef idx="2">
+              <a:schemeClr val="accent1"/>
+            </a:lnRef>
+            <a:fillRef idx="0">
+              <a:schemeClr val="accent1"/>
+            </a:fillRef>
+            <a:effectRef idx="1">
+              <a:schemeClr val="accent1"/>
+            </a:effectRef>
+            <a:fontRef idx="minor">
+              <a:schemeClr val="tx1"/>
+            </a:fontRef>
+          </p:style>
+        </p:cxnSp>
+      </p:grpSp>
+    </p:spTree>
+    <p:extLst>
+      <p:ext uri="{BB962C8B-B14F-4D97-AF65-F5344CB8AC3E}">
+        <p14:creationId xmlns:p14="http://schemas.microsoft.com/office/powerpoint/2010/main" val="1006123618"/>
+      </p:ext>
+    </p:extLst>
+  </p:cSld>
+  <p:clrMapOvr>
+    <a:masterClrMapping/>
+  </p:clrMapOvr>
+  <p:timing>
+    <p:tnLst>
+      <p:par>
+        <p:cTn id="1" dur="indefinite" restart="never" nodeType="tmRoot">
+          <p:childTnLst>
+            <p:seq concurrent="1" nextAc="seek">
+              <p:cTn id="2" dur="indefinite" nodeType="mainSeq">
+                <p:childTnLst>
+                  <p:par>
+                    <p:cTn id="3" fill="hold">
+                      <p:stCondLst>
+                        <p:cond delay="indefinite"/>
+                        <p:cond evt="onBegin" delay="0">
+                          <p:tn val="2"/>
+                        </p:cond>
+                      </p:stCondLst>
+                      <p:childTnLst>
+                        <p:par>
+                          <p:cTn id="4" fill="hold">
+                            <p:stCondLst>
+                              <p:cond delay="0"/>
+                            </p:stCondLst>
+                            <p:childTnLst>
+                              <p:par>
+                                <p:cTn id="5" presetID="1" presetClass="entr" presetSubtype="0" fill="hold" grpId="0" nodeType="withEffect">
+                                  <p:stCondLst>
+                                    <p:cond delay="0"/>
+                                  </p:stCondLst>
+                                  <p:childTnLst>
+                                    <p:set>
+                                      <p:cBhvr>
+                                        <p:cTn id="6" dur="1" fill="hold">
+                                          <p:stCondLst>
+                                            <p:cond delay="0"/>
+                                          </p:stCondLst>
+                                        </p:cTn>
+                                        <p:tgtEl>
+                                          <p:spTgt spid="3">
+                                            <p:txEl>
+                                              <p:pRg st="0" end="0"/>
+                                            </p:txEl>
+                                          </p:spTgt>
+                                        </p:tgtEl>
+                                        <p:attrNameLst>
+                                          <p:attrName>style.visibility</p:attrName>
+                                        </p:attrNameLst>
+                                      </p:cBhvr>
+                                      <p:to>
+                                        <p:strVal val="visible"/>
+                                      </p:to>
+                                    </p:set>
+                                  </p:childTnLst>
+                                </p:cTn>
+                              </p:par>
+                              <p:par>
+                                <p:cTn id="7" presetID="1" presetClass="entr" presetSubtype="0" fill="hold" grpId="0" nodeType="withEffect">
+                                  <p:stCondLst>
+                                    <p:cond delay="0"/>
+                                  </p:stCondLst>
+                                  <p:childTnLst>
+                                    <p:set>
+                                      <p:cBhvr>
+                                        <p:cTn id="8" dur="1" fill="hold">
+                                          <p:stCondLst>
+                                            <p:cond delay="0"/>
+                                          </p:stCondLst>
+                                        </p:cTn>
+                                        <p:tgtEl>
+                                          <p:spTgt spid="3">
+                                            <p:txEl>
+                                              <p:pRg st="1" end="1"/>
+                                            </p:txEl>
+                                          </p:spTgt>
+                                        </p:tgtEl>
+                                        <p:attrNameLst>
+                                          <p:attrName>style.visibility</p:attrName>
+                                        </p:attrNameLst>
+                                      </p:cBhvr>
+                                      <p:to>
+                                        <p:strVal val="visible"/>
+                                      </p:to>
+                                    </p:set>
+                                  </p:childTnLst>
+                                </p:cTn>
+                              </p:par>
+                              <p:par>
+                                <p:cTn id="9" presetID="1" presetClass="entr" presetSubtype="0" fill="hold" grpId="0" nodeType="withEffect">
+                                  <p:stCondLst>
+                                    <p:cond delay="0"/>
+                                  </p:stCondLst>
+                                  <p:childTnLst>
+                                    <p:set>
+                                      <p:cBhvr>
+                                        <p:cTn id="10" dur="1" fill="hold">
+                                          <p:stCondLst>
+                                            <p:cond delay="0"/>
+                                          </p:stCondLst>
+                                        </p:cTn>
+                                        <p:tgtEl>
+                                          <p:spTgt spid="3">
+                                            <p:txEl>
+                                              <p:pRg st="2" end="2"/>
+                                            </p:txEl>
+                                          </p:spTgt>
+                                        </p:tgtEl>
+                                        <p:attrNameLst>
+                                          <p:attrName>style.visibility</p:attrName>
+                                        </p:attrNameLst>
+                                      </p:cBhvr>
+                                      <p:to>
+                                        <p:strVal val="visible"/>
+                                      </p:to>
+                                    </p:set>
+                                  </p:childTnLst>
+                                </p:cTn>
+                              </p:par>
+                              <p:par>
+                                <p:cTn id="11" presetID="1" presetClass="entr" presetSubtype="0" fill="hold" grpId="0" nodeType="withEffect">
+                                  <p:stCondLst>
+                                    <p:cond delay="0"/>
+                                  </p:stCondLst>
+                                  <p:childTnLst>
+                                    <p:set>
+                                      <p:cBhvr>
+                                        <p:cTn id="12" dur="1" fill="hold">
+                                          <p:stCondLst>
+                                            <p:cond delay="0"/>
+                                          </p:stCondLst>
+                                        </p:cTn>
+                                        <p:tgtEl>
+                                          <p:spTgt spid="3">
+                                            <p:txEl>
+                                              <p:pRg st="3" end="3"/>
+                                            </p:txEl>
+                                          </p:spTgt>
+                                        </p:tgtEl>
+                                        <p:attrNameLst>
+                                          <p:attrName>style.visibility</p:attrName>
+                                        </p:attrNameLst>
+                                      </p:cBhvr>
+                                      <p:to>
+                                        <p:strVal val="visible"/>
+                                      </p:to>
+                                    </p:set>
+                                  </p:childTnLst>
+                                </p:cTn>
+                              </p:par>
+                            </p:childTnLst>
+                          </p:cTn>
+                        </p:par>
+                      </p:childTnLst>
+                    </p:cTn>
+                  </p:par>
+                  <p:par>
+                    <p:cTn id="13" fill="hold">
+                      <p:stCondLst>
+                        <p:cond delay="indefinite"/>
+                      </p:stCondLst>
+                      <p:childTnLst>
+                        <p:par>
+                          <p:cTn id="14" fill="hold">
+                            <p:stCondLst>
+                              <p:cond delay="0"/>
+                            </p:stCondLst>
+                            <p:childTnLst>
+                              <p:par>
+                                <p:cTn id="15" presetID="1" presetClass="entr" presetSubtype="0" fill="hold" nodeType="clickEffect">
+                                  <p:stCondLst>
+                                    <p:cond delay="0"/>
+                                  </p:stCondLst>
+                                  <p:childTnLst>
+                                    <p:set>
+                                      <p:cBhvr>
+                                        <p:cTn id="16" dur="1" fill="hold">
+                                          <p:stCondLst>
+                                            <p:cond delay="0"/>
+                                          </p:stCondLst>
+                                        </p:cTn>
+                                        <p:tgtEl>
+                                          <p:spTgt spid="11"/>
+                                        </p:tgtEl>
+                                        <p:attrNameLst>
+                                          <p:attrName>style.visibility</p:attrName>
+                                        </p:attrNameLst>
+                                      </p:cBhvr>
+                                      <p:to>
+                                        <p:strVal val="visible"/>
+                                      </p:to>
+                                    </p:set>
+                                  </p:childTnLst>
+                                </p:cTn>
+                              </p:par>
+                            </p:childTnLst>
+                          </p:cTn>
+                        </p:par>
+                      </p:childTnLst>
+                    </p:cTn>
+                  </p:par>
+                  <p:par>
+                    <p:cTn id="17" fill="hold">
+                      <p:stCondLst>
+                        <p:cond delay="indefinite"/>
+                      </p:stCondLst>
+                      <p:childTnLst>
+                        <p:par>
+                          <p:cTn id="18" fill="hold">
+                            <p:stCondLst>
+                              <p:cond delay="0"/>
+                            </p:stCondLst>
+                            <p:childTnLst>
+                              <p:par>
+                                <p:cTn id="19" presetID="1" presetClass="entr" presetSubtype="0" fill="hold" grpId="0" nodeType="clickEffect">
+                                  <p:stCondLst>
+                                    <p:cond delay="0"/>
+                                  </p:stCondLst>
+                                  <p:childTnLst>
+                                    <p:set>
+                                      <p:cBhvr>
+                                        <p:cTn id="20" dur="1" fill="hold">
+                                          <p:stCondLst>
+                                            <p:cond delay="0"/>
+                                          </p:stCondLst>
+                                        </p:cTn>
+                                        <p:tgtEl>
+                                          <p:spTgt spid="3">
+                                            <p:txEl>
+                                              <p:pRg st="4" end="4"/>
+                                            </p:txEl>
+                                          </p:spTgt>
+                                        </p:tgtEl>
+                                        <p:attrNameLst>
+                                          <p:attrName>style.visibility</p:attrName>
+                                        </p:attrNameLst>
+                                      </p:cBhvr>
+                                      <p:to>
+                                        <p:strVal val="visible"/>
+                                      </p:to>
+                                    </p:set>
+                                  </p:childTnLst>
+                                </p:cTn>
+                              </p:par>
+                              <p:par>
+                                <p:cTn id="21" presetID="1" presetClass="entr" presetSubtype="0" fill="hold" grpId="0" nodeType="withEffect">
+                                  <p:stCondLst>
+                                    <p:cond delay="0"/>
+                                  </p:stCondLst>
+                                  <p:childTnLst>
+                                    <p:set>
+                                      <p:cBhvr>
+                                        <p:cTn id="22" dur="1" fill="hold">
+                                          <p:stCondLst>
+                                            <p:cond delay="0"/>
+                                          </p:stCondLst>
+                                        </p:cTn>
+                                        <p:tgtEl>
+                                          <p:spTgt spid="3">
+                                            <p:txEl>
+                                              <p:pRg st="5" end="5"/>
+                                            </p:txEl>
+                                          </p:spTgt>
+                                        </p:tgtEl>
+                                        <p:attrNameLst>
+                                          <p:attrName>style.visibility</p:attrName>
+                                        </p:attrNameLst>
+                                      </p:cBhvr>
+                                      <p:to>
+                                        <p:strVal val="visible"/>
+                                      </p:to>
+                                    </p:set>
+                                  </p:childTnLst>
+                                </p:cTn>
+                              </p:par>
+                              <p:par>
+                                <p:cTn id="23" presetID="1" presetClass="entr" presetSubtype="0" fill="hold" grpId="0" nodeType="withEffect">
+                                  <p:stCondLst>
+                                    <p:cond delay="0"/>
+                                  </p:stCondLst>
+                                  <p:childTnLst>
+                                    <p:set>
+                                      <p:cBhvr>
+                                        <p:cTn id="24" dur="1" fill="hold">
+                                          <p:stCondLst>
+                                            <p:cond delay="0"/>
+                                          </p:stCondLst>
+                                        </p:cTn>
+                                        <p:tgtEl>
+                                          <p:spTgt spid="3">
+                                            <p:txEl>
+                                              <p:pRg st="6" end="6"/>
+                                            </p:txEl>
+                                          </p:spTgt>
+                                        </p:tgtEl>
+                                        <p:attrNameLst>
+                                          <p:attrName>style.visibility</p:attrName>
+                                        </p:attrNameLst>
+                                      </p:cBhvr>
+                                      <p:to>
+                                        <p:strVal val="visible"/>
+                                      </p:to>
+                                    </p:set>
+                                  </p:childTnLst>
+                                </p:cTn>
+                              </p:par>
+                            </p:childTnLst>
+                          </p:cTn>
+                        </p:par>
+                      </p:childTnLst>
+                    </p:cTn>
+                  </p:par>
+                  <p:par>
+                    <p:cTn id="25" fill="hold">
+                      <p:stCondLst>
+                        <p:cond delay="indefinite"/>
+                      </p:stCondLst>
+                      <p:childTnLst>
+                        <p:par>
+                          <p:cTn id="26" fill="hold">
+                            <p:stCondLst>
+                              <p:cond delay="0"/>
+                            </p:stCondLst>
+                            <p:childTnLst>
+                              <p:par>
+                                <p:cTn id="27" presetID="1" presetClass="entr" presetSubtype="0" fill="hold" grpId="0" nodeType="clickEffect">
+                                  <p:stCondLst>
+                                    <p:cond delay="0"/>
+                                  </p:stCondLst>
+                                  <p:childTnLst>
+                                    <p:set>
+                                      <p:cBhvr>
+                                        <p:cTn id="28" dur="1" fill="hold">
+                                          <p:stCondLst>
+                                            <p:cond delay="0"/>
+                                          </p:stCondLst>
+                                        </p:cTn>
+                                        <p:tgtEl>
+                                          <p:spTgt spid="3">
+                                            <p:txEl>
+                                              <p:pRg st="7" end="7"/>
+                                            </p:txEl>
+                                          </p:spTgt>
+                                        </p:tgtEl>
+                                        <p:attrNameLst>
+                                          <p:attrName>style.visibility</p:attrName>
+                                        </p:attrNameLst>
+                                      </p:cBhvr>
+                                      <p:to>
+                                        <p:strVal val="visible"/>
+                                      </p:to>
+                                    </p:set>
+                                  </p:childTnLst>
+                                </p:cTn>
+                              </p:par>
+                              <p:par>
+                                <p:cTn id="29" presetID="1" presetClass="entr" presetSubtype="0" fill="hold" grpId="0" nodeType="withEffect">
+                                  <p:stCondLst>
+                                    <p:cond delay="0"/>
+                                  </p:stCondLst>
+                                  <p:childTnLst>
+                                    <p:set>
+                                      <p:cBhvr>
+                                        <p:cTn id="30" dur="1" fill="hold">
+                                          <p:stCondLst>
+                                            <p:cond delay="0"/>
+                                          </p:stCondLst>
+                                        </p:cTn>
+                                        <p:tgtEl>
+                                          <p:spTgt spid="3">
+                                            <p:txEl>
+                                              <p:pRg st="8" end="8"/>
+                                            </p:txEl>
+                                          </p:spTgt>
+                                        </p:tgtEl>
+                                        <p:attrNameLst>
+                                          <p:attrName>style.visibility</p:attrName>
+                                        </p:attrNameLst>
+                                      </p:cBhvr>
+                                      <p:to>
+                                        <p:strVal val="visible"/>
+                                      </p:to>
+                                    </p:set>
+                                  </p:childTnLst>
+                                </p:cTn>
+                              </p:par>
+                              <p:par>
+                                <p:cTn id="31" presetID="1" presetClass="entr" presetSubtype="0" fill="hold" grpId="0" nodeType="withEffect">
+                                  <p:stCondLst>
+                                    <p:cond delay="0"/>
+                                  </p:stCondLst>
+                                  <p:childTnLst>
+                                    <p:set>
+                                      <p:cBhvr>
+                                        <p:cTn id="32" dur="1" fill="hold">
+                                          <p:stCondLst>
+                                            <p:cond delay="0"/>
+                                          </p:stCondLst>
+                                        </p:cTn>
+                                        <p:tgtEl>
+                                          <p:spTgt spid="3">
+                                            <p:txEl>
+                                              <p:pRg st="9" end="9"/>
+                                            </p:txEl>
+                                          </p:spTgt>
+                                        </p:tgtEl>
+                                        <p:attrNameLst>
+                                          <p:attrName>style.visibility</p:attrName>
+                                        </p:attrNameLst>
+                                      </p:cBhvr>
+                                      <p:to>
+                                        <p:strVal val="visible"/>
+                                      </p:to>
+                                    </p:set>
+                                  </p:childTnLst>
+                                </p:cTn>
+                              </p:par>
+                            </p:childTnLst>
+                          </p:cTn>
+                        </p:par>
+                      </p:childTnLst>
+                    </p:cTn>
+                  </p:par>
+                  <p:par>
+                    <p:cTn id="33" fill="hold">
+                      <p:stCondLst>
+                        <p:cond delay="indefinite"/>
+                      </p:stCondLst>
+                      <p:childTnLst>
+                        <p:par>
+                          <p:cTn id="34" fill="hold">
+                            <p:stCondLst>
+                              <p:cond delay="0"/>
+                            </p:stCondLst>
+                            <p:childTnLst>
+                              <p:par>
+                                <p:cTn id="35" presetID="1" presetClass="entr" presetSubtype="0" fill="hold" nodeType="clickEffect">
+                                  <p:stCondLst>
+                                    <p:cond delay="0"/>
+                                  </p:stCondLst>
+                                  <p:childTnLst>
+                                    <p:set>
+                                      <p:cBhvr>
+                                        <p:cTn id="36" dur="1" fill="hold">
+                                          <p:stCondLst>
+                                            <p:cond delay="0"/>
+                                          </p:stCondLst>
+                                        </p:cTn>
+                                        <p:tgtEl>
+                                          <p:spTgt spid="5"/>
+                                        </p:tgtEl>
+                                        <p:attrNameLst>
+                                          <p:attrName>style.visibility</p:attrName>
+                                        </p:attrNameLst>
+                                      </p:cBhvr>
+                                      <p:to>
+                                        <p:strVal val="visible"/>
+                                      </p:to>
+                                    </p:set>
+                                  </p:childTnLst>
+                                </p:cTn>
+                              </p:par>
+                            </p:childTnLst>
+                          </p:cTn>
+                        </p:par>
+                      </p:childTnLst>
+                    </p:cTn>
+                  </p:par>
+                </p:childTnLst>
+              </p:cTn>
+              <p:prevCondLst>
+                <p:cond evt="onPrev" delay="0">
+                  <p:tgtEl>
+                    <p:sldTgt/>
+                  </p:tgtEl>
+                </p:cond>
+              </p:prevCondLst>
+              <p:nextCondLst>
+                <p:cond evt="onNext" delay="0">
+                  <p:tgtEl>
+                    <p:sldTgt/>
+                  </p:tgtEl>
+                </p:cond>
+              </p:nextCondLst>
+            </p:seq>
+          </p:childTnLst>
+        </p:cTn>
+      </p:par>
+    </p:tnLst>
+    <p:bldLst>
+      <p:bldP spid="3" grpId="0" uiExpand="1" build="p"/>
+    </p:bldLst>
+  </p:timing>
+</p:sld>
+</file>
+
+<file path=ppt/slides/slide14.xml><?xml version="1.0" encoding="utf-8"?>
+<p:sld xmlns:a="http://schemas.openxmlformats.org/drawingml/2006/main" xmlns:r="http://schemas.openxmlformats.org/officeDocument/2006/relationships" xmlns:p="http://schemas.openxmlformats.org/presentationml/2006/main">
+  <p:cSld>
+    <p:spTree>
+      <p:nvGrpSpPr>
+        <p:cNvPr id="1" name=""/>
+        <p:cNvGrpSpPr/>
+        <p:nvPr/>
+      </p:nvGrpSpPr>
+      <p:grpSpPr>
+        <a:xfrm>
+          <a:off x="0" y="0"/>
+          <a:ext cx="0" cy="0"/>
+          <a:chOff x="0" y="0"/>
+          <a:chExt cx="0" cy="0"/>
+        </a:xfrm>
+      </p:grpSpPr>
+      <p:sp>
+        <p:nvSpPr>
+          <p:cNvPr id="2" name="Title 1">
+            <a:extLst>
+              <a:ext uri="{FF2B5EF4-FFF2-40B4-BE49-F238E27FC236}">
+                <a16:creationId xmlns:a16="http://schemas.microsoft.com/office/drawing/2014/main" id="{EFA622ED-F9D5-905A-72D2-458CC6EF29E5}"/>
+              </a:ext>
+            </a:extLst>
+          </p:cNvPr>
+          <p:cNvSpPr>
+            <a:spLocks noGrp="1"/>
+          </p:cNvSpPr>
+          <p:nvPr>
+            <p:ph type="title"/>
+          </p:nvPr>
+        </p:nvSpPr>
+        <p:spPr/>
+        <p:txBody>
+          <a:bodyPr/>
+          <a:lstStyle/>
+          <a:p>
+            <a:r>
+              <a:rPr lang="en-US" dirty="0"/>
+              <a:t>Positional encoding: motivation</a:t>
+            </a:r>
+            <a:endParaRPr lang="LID4096" dirty="0"/>
+          </a:p>
+        </p:txBody>
+      </p:sp>
+      <p:sp>
+        <p:nvSpPr>
+          <p:cNvPr id="3" name="Content Placeholder 2">
+            <a:extLst>
+              <a:ext uri="{FF2B5EF4-FFF2-40B4-BE49-F238E27FC236}">
+                <a16:creationId xmlns:a16="http://schemas.microsoft.com/office/drawing/2014/main" id="{149F39BE-3268-C8EA-2CA9-FECB142EA825}"/>
+              </a:ext>
+            </a:extLst>
+          </p:cNvPr>
+          <p:cNvSpPr>
+            <a:spLocks noGrp="1"/>
+          </p:cNvSpPr>
+          <p:nvPr>
+            <p:ph idx="1"/>
+          </p:nvPr>
+        </p:nvSpPr>
+        <p:spPr/>
+        <p:txBody>
+          <a:bodyPr/>
+          <a:lstStyle/>
+          <a:p>
+            <a:r>
+              <a:rPr lang="en-US" dirty="0"/>
+              <a:t>Position of token in sequence is important</a:t>
+            </a:r>
+          </a:p>
+          <a:p>
+            <a:pPr lvl="1"/>
+            <a:r>
+              <a:rPr lang="en-US" dirty="0"/>
+              <a:t>Absolute position</a:t>
+            </a:r>
+          </a:p>
+          <a:p>
+            <a:pPr lvl="1"/>
+            <a:r>
+              <a:rPr lang="en-US" dirty="0"/>
+              <a:t>Relative position</a:t>
+            </a:r>
+          </a:p>
+          <a:p>
+            <a:r>
+              <a:rPr lang="en-US" dirty="0"/>
+              <a:t>Provides context, e.g.,</a:t>
+            </a:r>
+            <a:endParaRPr lang="LID4096" dirty="0"/>
+          </a:p>
+        </p:txBody>
+      </p:sp>
+      <p:sp>
+        <p:nvSpPr>
+          <p:cNvPr id="4" name="Slide Number Placeholder 3">
+            <a:extLst>
+              <a:ext uri="{FF2B5EF4-FFF2-40B4-BE49-F238E27FC236}">
+                <a16:creationId xmlns:a16="http://schemas.microsoft.com/office/drawing/2014/main" id="{CB291AFF-67BC-2B11-5385-E89883E19CD6}"/>
+              </a:ext>
+            </a:extLst>
+          </p:cNvPr>
+          <p:cNvSpPr>
+            <a:spLocks noGrp="1"/>
+          </p:cNvSpPr>
+          <p:nvPr>
+            <p:ph type="sldNum" sz="quarter" idx="12"/>
+          </p:nvPr>
+        </p:nvSpPr>
+        <p:spPr/>
+        <p:txBody>
+          <a:bodyPr/>
+          <a:lstStyle/>
+          <a:p>
+            <a:fld id="{6A9C7FA6-5826-4EA5-8536-11A903012ABC}" type="slidenum">
+              <a:rPr lang="LID4096" smtClean="0"/>
+              <a:t>14</a:t>
+            </a:fld>
+            <a:endParaRPr lang="LID4096"/>
+          </a:p>
+        </p:txBody>
+      </p:sp>
+      <p:sp>
+        <p:nvSpPr>
+          <p:cNvPr id="5" name="TextBox 4">
+            <a:extLst>
+              <a:ext uri="{FF2B5EF4-FFF2-40B4-BE49-F238E27FC236}">
+                <a16:creationId xmlns:a16="http://schemas.microsoft.com/office/drawing/2014/main" id="{5CF04945-92AF-4EF9-0540-AD45A527A58A}"/>
+              </a:ext>
+            </a:extLst>
+          </p:cNvPr>
+          <p:cNvSpPr txBox="1"/>
+          <p:nvPr/>
+        </p:nvSpPr>
+        <p:spPr>
+          <a:xfrm>
+            <a:off x="1399032" y="3772694"/>
+            <a:ext cx="9749015" cy="461665"/>
+          </a:xfrm>
+          <a:prstGeom prst="rect">
+            <a:avLst/>
+          </a:prstGeom>
+          <a:noFill/>
+        </p:spPr>
+        <p:txBody>
+          <a:bodyPr wrap="none" rtlCol="0">
+            <a:spAutoFit/>
+          </a:bodyPr>
+          <a:lstStyle/>
+          <a:p>
+            <a:r>
+              <a:rPr lang="en-US" sz="2400" b="0" i="0" dirty="0">
+                <a:solidFill>
+                  <a:srgbClr val="202122"/>
+                </a:solidFill>
+                <a:effectLst/>
+                <a:latin typeface="Arial" panose="020B0604020202020204" pitchFamily="34" charset="0"/>
+              </a:rPr>
+              <a:t>George Floyd was murdered by Officer Derek Chauvin in Minneapolis</a:t>
+            </a:r>
+            <a:endParaRPr lang="LID4096" sz="2400" dirty="0"/>
+          </a:p>
+        </p:txBody>
+      </p:sp>
+      <p:sp>
+        <p:nvSpPr>
+          <p:cNvPr id="6" name="TextBox 5">
+            <a:extLst>
+              <a:ext uri="{FF2B5EF4-FFF2-40B4-BE49-F238E27FC236}">
+                <a16:creationId xmlns:a16="http://schemas.microsoft.com/office/drawing/2014/main" id="{E0DE7781-734F-A026-0388-50898A2637EB}"/>
+              </a:ext>
+            </a:extLst>
+          </p:cNvPr>
+          <p:cNvSpPr txBox="1"/>
+          <p:nvPr/>
+        </p:nvSpPr>
+        <p:spPr>
+          <a:xfrm>
+            <a:off x="1441511" y="4985798"/>
+            <a:ext cx="9664056" cy="461665"/>
+          </a:xfrm>
+          <a:prstGeom prst="rect">
+            <a:avLst/>
+          </a:prstGeom>
+          <a:noFill/>
+        </p:spPr>
+        <p:txBody>
+          <a:bodyPr wrap="none" rtlCol="0">
+            <a:spAutoFit/>
+          </a:bodyPr>
+          <a:lstStyle/>
+          <a:p>
+            <a:r>
+              <a:rPr lang="en-US" sz="2400" b="0" i="0" dirty="0">
+                <a:solidFill>
+                  <a:srgbClr val="202122"/>
+                </a:solidFill>
+                <a:effectLst/>
+                <a:latin typeface="Arial" panose="020B0604020202020204" pitchFamily="34" charset="0"/>
+              </a:rPr>
+              <a:t>Officer Derek Chauvin was murdered by George Floyd in Minneapolis</a:t>
+            </a:r>
+            <a:endParaRPr lang="LID4096" sz="2400" dirty="0"/>
+          </a:p>
+        </p:txBody>
+      </p:sp>
+      <p:sp>
+        <p:nvSpPr>
+          <p:cNvPr id="7" name="TextBox 6">
+            <a:extLst>
+              <a:ext uri="{FF2B5EF4-FFF2-40B4-BE49-F238E27FC236}">
+                <a16:creationId xmlns:a16="http://schemas.microsoft.com/office/drawing/2014/main" id="{A390C169-9C51-C4A7-C816-3BC735E1EE6C}"/>
+              </a:ext>
+            </a:extLst>
+          </p:cNvPr>
+          <p:cNvSpPr txBox="1"/>
+          <p:nvPr/>
+        </p:nvSpPr>
+        <p:spPr>
+          <a:xfrm>
+            <a:off x="5727556" y="4348468"/>
+            <a:ext cx="1244251" cy="523220"/>
+          </a:xfrm>
+          <a:prstGeom prst="rect">
+            <a:avLst/>
+          </a:prstGeom>
+          <a:noFill/>
+        </p:spPr>
+        <p:txBody>
+          <a:bodyPr wrap="none" rtlCol="0">
+            <a:spAutoFit/>
+          </a:bodyPr>
+          <a:lstStyle/>
+          <a:p>
+            <a:r>
+              <a:rPr lang="en-US" sz="2800" dirty="0">
+                <a:solidFill>
+                  <a:srgbClr val="202122"/>
+                </a:solidFill>
+                <a:latin typeface="Arial" panose="020B0604020202020204" pitchFamily="34" charset="0"/>
+              </a:rPr>
+              <a:t>versu</a:t>
+            </a:r>
+            <a:r>
+              <a:rPr lang="en-US" sz="2800" b="0" i="0" dirty="0">
+                <a:solidFill>
+                  <a:srgbClr val="202122"/>
+                </a:solidFill>
+                <a:effectLst/>
+                <a:latin typeface="Arial" panose="020B0604020202020204" pitchFamily="34" charset="0"/>
+              </a:rPr>
+              <a:t>s</a:t>
+            </a:r>
+            <a:endParaRPr lang="LID4096" sz="2400" dirty="0"/>
+          </a:p>
+        </p:txBody>
+      </p:sp>
+    </p:spTree>
+    <p:extLst>
+      <p:ext uri="{BB962C8B-B14F-4D97-AF65-F5344CB8AC3E}">
+        <p14:creationId xmlns:p14="http://schemas.microsoft.com/office/powerpoint/2010/main" val="2804506509"/>
+      </p:ext>
+    </p:extLst>
+  </p:cSld>
+  <p:clrMapOvr>
+    <a:masterClrMapping/>
+  </p:clrMapOvr>
+</p:sld>
+</file>
+
+<file path=ppt/slides/slide15.xml><?xml version="1.0" encoding="utf-8"?>
+<p:sld xmlns:a="http://schemas.openxmlformats.org/drawingml/2006/main" xmlns:r="http://schemas.openxmlformats.org/officeDocument/2006/relationships" xmlns:p="http://schemas.openxmlformats.org/presentationml/2006/main">
+  <p:cSld>
+    <p:spTree>
+      <p:nvGrpSpPr>
+        <p:cNvPr id="1" name=""/>
+        <p:cNvGrpSpPr/>
+        <p:nvPr/>
+      </p:nvGrpSpPr>
+      <p:grpSpPr>
+        <a:xfrm>
+          <a:off x="0" y="0"/>
+          <a:ext cx="0" cy="0"/>
+          <a:chOff x="0" y="0"/>
+          <a:chExt cx="0" cy="0"/>
+        </a:xfrm>
+      </p:grpSpPr>
+      <p:sp>
+        <p:nvSpPr>
+          <p:cNvPr id="2" name="Title 1">
+            <a:extLst>
+              <a:ext uri="{FF2B5EF4-FFF2-40B4-BE49-F238E27FC236}">
                 <a16:creationId xmlns:a16="http://schemas.microsoft.com/office/drawing/2014/main" id="{4C5F3A2A-0389-9236-30B5-7197A74E4C8B}"/>
               </a:ext>
             </a:extLst>
@@ -10307,7 +11669,7 @@
           <a:p>
             <a:fld id="{6A9C7FA6-5826-4EA5-8536-11A903012ABC}" type="slidenum">
               <a:rPr lang="LID4096" smtClean="0"/>
-              <a:t>12</a:t>
+              <a:t>15</a:t>
             </a:fld>
             <a:endParaRPr lang="LID4096"/>
           </a:p>
@@ -10326,7 +11688,7 @@
 </p:sld>
 </file>
 
-<file path=ppt/slides/slide13.xml><?xml version="1.0" encoding="utf-8"?>
+<file path=ppt/slides/slide16.xml><?xml version="1.0" encoding="utf-8"?>
 <p:sld xmlns:a="http://schemas.openxmlformats.org/drawingml/2006/main" xmlns:r="http://schemas.openxmlformats.org/officeDocument/2006/relationships" xmlns:p="http://schemas.openxmlformats.org/presentationml/2006/main">
   <p:cSld>
     <p:spTree>
@@ -10426,7 +11788,7 @@
           <a:p>
             <a:fld id="{6A9C7FA6-5826-4EA5-8536-11A903012ABC}" type="slidenum">
               <a:rPr lang="LID4096" smtClean="0"/>
-              <a:t>13</a:t>
+              <a:t>16</a:t>
             </a:fld>
             <a:endParaRPr lang="LID4096"/>
           </a:p>
@@ -10445,7 +11807,7 @@
 </p:sld>
 </file>
 
-<file path=ppt/slides/slide14.xml><?xml version="1.0" encoding="utf-8"?>
+<file path=ppt/slides/slide17.xml><?xml version="1.0" encoding="utf-8"?>
 <p:sld xmlns:a="http://schemas.openxmlformats.org/drawingml/2006/main" xmlns:r="http://schemas.openxmlformats.org/officeDocument/2006/relationships" xmlns:p="http://schemas.openxmlformats.org/presentationml/2006/main">
   <p:cSld>
     <p:spTree>
@@ -10539,7 +11901,7 @@
           <a:p>
             <a:fld id="{6A9C7FA6-5826-4EA5-8536-11A903012ABC}" type="slidenum">
               <a:rPr lang="LID4096" smtClean="0"/>
-              <a:t>14</a:t>
+              <a:t>17</a:t>
             </a:fld>
             <a:endParaRPr lang="LID4096"/>
           </a:p>
@@ -10558,7 +11920,7 @@
 </p:sld>
 </file>
 
-<file path=ppt/slides/slide15.xml><?xml version="1.0" encoding="utf-8"?>
+<file path=ppt/slides/slide18.xml><?xml version="1.0" encoding="utf-8"?>
 <p:sld xmlns:a="http://schemas.openxmlformats.org/drawingml/2006/main" xmlns:r="http://schemas.openxmlformats.org/officeDocument/2006/relationships" xmlns:p="http://schemas.openxmlformats.org/presentationml/2006/main">
   <p:cSld>
     <p:spTree>
@@ -10711,7 +12073,7 @@
           <a:p>
             <a:fld id="{6A9C7FA6-5826-4EA5-8536-11A903012ABC}" type="slidenum">
               <a:rPr lang="LID4096" smtClean="0"/>
-              <a:t>15</a:t>
+              <a:t>18</a:t>
             </a:fld>
             <a:endParaRPr lang="LID4096"/>
           </a:p>
@@ -11114,7 +12476,7 @@
 </p:sld>
 </file>
 
-<file path=ppt/slides/slide16.xml><?xml version="1.0" encoding="utf-8"?>
+<file path=ppt/slides/slide19.xml><?xml version="1.0" encoding="utf-8"?>
 <p:sld xmlns:a="http://schemas.openxmlformats.org/drawingml/2006/main" xmlns:r="http://schemas.openxmlformats.org/officeDocument/2006/relationships" xmlns:p="http://schemas.openxmlformats.org/presentationml/2006/main">
   <p:cSld>
     <p:spTree>
@@ -11254,7 +12616,7 @@
           <a:p>
             <a:fld id="{6A9C7FA6-5826-4EA5-8536-11A903012ABC}" type="slidenum">
               <a:rPr lang="LID4096" smtClean="0"/>
-              <a:t>16</a:t>
+              <a:t>19</a:t>
             </a:fld>
             <a:endParaRPr lang="LID4096"/>
           </a:p>
@@ -11449,7 +12811,102 @@
 </p:sld>
 </file>
 
-<file path=ppt/slides/slide17.xml><?xml version="1.0" encoding="utf-8"?>
+<file path=ppt/slides/slide2.xml><?xml version="1.0" encoding="utf-8"?>
+<p:sld xmlns:a="http://schemas.openxmlformats.org/drawingml/2006/main" xmlns:r="http://schemas.openxmlformats.org/officeDocument/2006/relationships" xmlns:p="http://schemas.openxmlformats.org/presentationml/2006/main">
+  <p:cSld>
+    <p:spTree>
+      <p:nvGrpSpPr>
+        <p:cNvPr id="1" name=""/>
+        <p:cNvGrpSpPr/>
+        <p:nvPr/>
+      </p:nvGrpSpPr>
+      <p:grpSpPr>
+        <a:xfrm>
+          <a:off x="0" y="0"/>
+          <a:ext cx="0" cy="0"/>
+          <a:chOff x="0" y="0"/>
+          <a:chExt cx="0" cy="0"/>
+        </a:xfrm>
+      </p:grpSpPr>
+      <p:sp>
+        <p:nvSpPr>
+          <p:cNvPr id="4" name="Slide Number Placeholder 3"/>
+          <p:cNvSpPr>
+            <a:spLocks noGrp="1"/>
+          </p:cNvSpPr>
+          <p:nvPr>
+            <p:ph type="sldNum" sz="quarter" idx="12"/>
+          </p:nvPr>
+        </p:nvSpPr>
+        <p:spPr/>
+        <p:txBody>
+          <a:bodyPr/>
+          <a:lstStyle/>
+          <a:p>
+            <a:fld id="{5A209D72-2E9D-49B0-8977-41DCCC66C0BB}" type="slidenum">
+              <a:rPr lang="nl-BE" smtClean="0"/>
+              <a:t>2</a:t>
+            </a:fld>
+            <a:endParaRPr lang="nl-BE"/>
+          </a:p>
+        </p:txBody>
+      </p:sp>
+      <p:sp>
+        <p:nvSpPr>
+          <p:cNvPr id="6" name="TextBox 5">
+            <a:extLst>
+              <a:ext uri="{FF2B5EF4-FFF2-40B4-BE49-F238E27FC236}">
+                <a16:creationId xmlns:a16="http://schemas.microsoft.com/office/drawing/2014/main" id="{15121924-8AEA-4C8F-95FA-4768DA10573C}"/>
+              </a:ext>
+            </a:extLst>
+          </p:cNvPr>
+          <p:cNvSpPr txBox="1"/>
+          <p:nvPr/>
+        </p:nvSpPr>
+        <p:spPr>
+          <a:xfrm>
+            <a:off x="4048805" y="5244860"/>
+            <a:ext cx="4094391" cy="584775"/>
+          </a:xfrm>
+          <a:prstGeom prst="rect">
+            <a:avLst/>
+          </a:prstGeom>
+          <a:noFill/>
+        </p:spPr>
+        <p:txBody>
+          <a:bodyPr wrap="none" rtlCol="0">
+            <a:spAutoFit/>
+          </a:bodyPr>
+          <a:lstStyle/>
+          <a:p>
+            <a:r>
+              <a:rPr lang="en-GB" sz="3200" dirty="0">
+                <a:hlinkClick r:id="rId2"/>
+              </a:rPr>
+              <a:t>http://bit.ly/2RYQvSX</a:t>
+            </a:r>
+            <a:r>
+              <a:rPr lang="en-GB" sz="3200" dirty="0"/>
+              <a:t> </a:t>
+            </a:r>
+            <a:endParaRPr lang="en-BE" sz="3200" dirty="0"/>
+          </a:p>
+        </p:txBody>
+      </p:sp>
+    </p:spTree>
+    <p:extLst>
+      <p:ext uri="{BB962C8B-B14F-4D97-AF65-F5344CB8AC3E}">
+        <p14:creationId xmlns:p14="http://schemas.microsoft.com/office/powerpoint/2010/main" val="2028728043"/>
+      </p:ext>
+    </p:extLst>
+  </p:cSld>
+  <p:clrMapOvr>
+    <a:masterClrMapping/>
+  </p:clrMapOvr>
+</p:sld>
+</file>
+
+<file path=ppt/slides/slide20.xml><?xml version="1.0" encoding="utf-8"?>
 <p:sld xmlns:a="http://schemas.openxmlformats.org/drawingml/2006/main" xmlns:r="http://schemas.openxmlformats.org/officeDocument/2006/relationships" xmlns:p="http://schemas.openxmlformats.org/presentationml/2006/main">
   <p:cSld>
     <p:spTree>
@@ -11581,7 +13038,7 @@
           <a:p>
             <a:fld id="{6A9C7FA6-5826-4EA5-8536-11A903012ABC}" type="slidenum">
               <a:rPr lang="LID4096" smtClean="0"/>
-              <a:t>17</a:t>
+              <a:t>20</a:t>
             </a:fld>
             <a:endParaRPr lang="LID4096"/>
           </a:p>
@@ -11942,7 +13399,7 @@
 </p:sld>
 </file>
 
-<file path=ppt/slides/slide18.xml><?xml version="1.0" encoding="utf-8"?>
+<file path=ppt/slides/slide21.xml><?xml version="1.0" encoding="utf-8"?>
 <p:sld xmlns:a="http://schemas.openxmlformats.org/drawingml/2006/main" xmlns:r="http://schemas.openxmlformats.org/officeDocument/2006/relationships" xmlns:p="http://schemas.openxmlformats.org/presentationml/2006/main">
   <p:cSld>
     <p:spTree>
@@ -12118,7 +13575,7 @@
           <a:p>
             <a:fld id="{6A9C7FA6-5826-4EA5-8536-11A903012ABC}" type="slidenum">
               <a:rPr lang="LID4096" smtClean="0"/>
-              <a:t>18</a:t>
+              <a:t>21</a:t>
             </a:fld>
             <a:endParaRPr lang="LID4096"/>
           </a:p>
@@ -12791,7 +14248,7 @@
 </p:sld>
 </file>
 
-<file path=ppt/slides/slide19.xml><?xml version="1.0" encoding="utf-8"?>
+<file path=ppt/slides/slide22.xml><?xml version="1.0" encoding="utf-8"?>
 <p:sld xmlns:a="http://schemas.openxmlformats.org/drawingml/2006/main" xmlns:r="http://schemas.openxmlformats.org/officeDocument/2006/relationships" xmlns:p="http://schemas.openxmlformats.org/presentationml/2006/main">
   <p:cSld>
     <p:spTree>
@@ -12938,7 +14395,7 @@
           <a:p>
             <a:fld id="{6A9C7FA6-5826-4EA5-8536-11A903012ABC}" type="slidenum">
               <a:rPr lang="LID4096" smtClean="0"/>
-              <a:t>19</a:t>
+              <a:t>22</a:t>
             </a:fld>
             <a:endParaRPr lang="LID4096"/>
           </a:p>
@@ -13444,102 +14901,7 @@
 </p:sld>
 </file>
 
-<file path=ppt/slides/slide2.xml><?xml version="1.0" encoding="utf-8"?>
-<p:sld xmlns:a="http://schemas.openxmlformats.org/drawingml/2006/main" xmlns:r="http://schemas.openxmlformats.org/officeDocument/2006/relationships" xmlns:p="http://schemas.openxmlformats.org/presentationml/2006/main">
-  <p:cSld>
-    <p:spTree>
-      <p:nvGrpSpPr>
-        <p:cNvPr id="1" name=""/>
-        <p:cNvGrpSpPr/>
-        <p:nvPr/>
-      </p:nvGrpSpPr>
-      <p:grpSpPr>
-        <a:xfrm>
-          <a:off x="0" y="0"/>
-          <a:ext cx="0" cy="0"/>
-          <a:chOff x="0" y="0"/>
-          <a:chExt cx="0" cy="0"/>
-        </a:xfrm>
-      </p:grpSpPr>
-      <p:sp>
-        <p:nvSpPr>
-          <p:cNvPr id="4" name="Slide Number Placeholder 3"/>
-          <p:cNvSpPr>
-            <a:spLocks noGrp="1"/>
-          </p:cNvSpPr>
-          <p:nvPr>
-            <p:ph type="sldNum" sz="quarter" idx="12"/>
-          </p:nvPr>
-        </p:nvSpPr>
-        <p:spPr/>
-        <p:txBody>
-          <a:bodyPr/>
-          <a:lstStyle/>
-          <a:p>
-            <a:fld id="{5A209D72-2E9D-49B0-8977-41DCCC66C0BB}" type="slidenum">
-              <a:rPr lang="nl-BE" smtClean="0"/>
-              <a:t>2</a:t>
-            </a:fld>
-            <a:endParaRPr lang="nl-BE"/>
-          </a:p>
-        </p:txBody>
-      </p:sp>
-      <p:sp>
-        <p:nvSpPr>
-          <p:cNvPr id="6" name="TextBox 5">
-            <a:extLst>
-              <a:ext uri="{FF2B5EF4-FFF2-40B4-BE49-F238E27FC236}">
-                <a16:creationId xmlns:a16="http://schemas.microsoft.com/office/drawing/2014/main" id="{15121924-8AEA-4C8F-95FA-4768DA10573C}"/>
-              </a:ext>
-            </a:extLst>
-          </p:cNvPr>
-          <p:cNvSpPr txBox="1"/>
-          <p:nvPr/>
-        </p:nvSpPr>
-        <p:spPr>
-          <a:xfrm>
-            <a:off x="4048805" y="5244860"/>
-            <a:ext cx="4094391" cy="584775"/>
-          </a:xfrm>
-          <a:prstGeom prst="rect">
-            <a:avLst/>
-          </a:prstGeom>
-          <a:noFill/>
-        </p:spPr>
-        <p:txBody>
-          <a:bodyPr wrap="none" rtlCol="0">
-            <a:spAutoFit/>
-          </a:bodyPr>
-          <a:lstStyle/>
-          <a:p>
-            <a:r>
-              <a:rPr lang="en-GB" sz="3200" dirty="0">
-                <a:hlinkClick r:id="rId2"/>
-              </a:rPr>
-              <a:t>http://bit.ly/2RYQvSX</a:t>
-            </a:r>
-            <a:r>
-              <a:rPr lang="en-GB" sz="3200" dirty="0"/>
-              <a:t> </a:t>
-            </a:r>
-            <a:endParaRPr lang="en-BE" sz="3200" dirty="0"/>
-          </a:p>
-        </p:txBody>
-      </p:sp>
-    </p:spTree>
-    <p:extLst>
-      <p:ext uri="{BB962C8B-B14F-4D97-AF65-F5344CB8AC3E}">
-        <p14:creationId xmlns:p14="http://schemas.microsoft.com/office/powerpoint/2010/main" val="2028728043"/>
-      </p:ext>
-    </p:extLst>
-  </p:cSld>
-  <p:clrMapOvr>
-    <a:masterClrMapping/>
-  </p:clrMapOvr>
-</p:sld>
-</file>
-
-<file path=ppt/slides/slide20.xml><?xml version="1.0" encoding="utf-8"?>
+<file path=ppt/slides/slide23.xml><?xml version="1.0" encoding="utf-8"?>
 <p:sld xmlns:a="http://schemas.openxmlformats.org/drawingml/2006/main" xmlns:r="http://schemas.openxmlformats.org/officeDocument/2006/relationships" xmlns:p="http://schemas.openxmlformats.org/presentationml/2006/main">
   <p:cSld>
     <p:spTree>
@@ -14066,7 +15428,7 @@
           <a:p>
             <a:fld id="{6A9C7FA6-5826-4EA5-8536-11A903012ABC}" type="slidenum">
               <a:rPr lang="LID4096" smtClean="0"/>
-              <a:t>20</a:t>
+              <a:t>23</a:t>
             </a:fld>
             <a:endParaRPr lang="LID4096"/>
           </a:p>
@@ -14416,7 +15778,7 @@
 </p:sld>
 </file>
 
-<file path=ppt/slides/slide21.xml><?xml version="1.0" encoding="utf-8"?>
+<file path=ppt/slides/slide24.xml><?xml version="1.0" encoding="utf-8"?>
 <p:sld xmlns:a="http://schemas.openxmlformats.org/drawingml/2006/main" xmlns:r="http://schemas.openxmlformats.org/officeDocument/2006/relationships" xmlns:p="http://schemas.openxmlformats.org/presentationml/2006/main">
   <p:cSld>
     <p:spTree>
@@ -14520,7 +15882,7 @@
           <a:p>
             <a:fld id="{6A9C7FA6-5826-4EA5-8536-11A903012ABC}" type="slidenum">
               <a:rPr lang="LID4096" smtClean="0"/>
-              <a:t>21</a:t>
+              <a:t>24</a:t>
             </a:fld>
             <a:endParaRPr lang="LID4096"/>
           </a:p>
@@ -14539,7 +15901,7 @@
 </p:sld>
 </file>
 
-<file path=ppt/slides/slide22.xml><?xml version="1.0" encoding="utf-8"?>
+<file path=ppt/slides/slide25.xml><?xml version="1.0" encoding="utf-8"?>
 <p:sld xmlns:a="http://schemas.openxmlformats.org/drawingml/2006/main" xmlns:r="http://schemas.openxmlformats.org/officeDocument/2006/relationships" xmlns:p="http://schemas.openxmlformats.org/presentationml/2006/main">
   <p:cSld>
     <p:spTree>
@@ -14614,7 +15976,7 @@
           <a:p>
             <a:fld id="{6A9C7FA6-5826-4EA5-8536-11A903012ABC}" type="slidenum">
               <a:rPr lang="LID4096" smtClean="0"/>
-              <a:t>22</a:t>
+              <a:t>25</a:t>
             </a:fld>
             <a:endParaRPr lang="LID4096"/>
           </a:p>
@@ -14905,7 +16267,7 @@
 </p:sld>
 </file>
 
-<file path=ppt/slides/slide23.xml><?xml version="1.0" encoding="utf-8"?>
+<file path=ppt/slides/slide26.xml><?xml version="1.0" encoding="utf-8"?>
 <p:sld xmlns:a="http://schemas.openxmlformats.org/drawingml/2006/main" xmlns:r="http://schemas.openxmlformats.org/officeDocument/2006/relationships" xmlns:p="http://schemas.openxmlformats.org/presentationml/2006/main">
   <p:cSld>
     <p:spTree>
@@ -14980,7 +16342,7 @@
           <a:p>
             <a:fld id="{6A9C7FA6-5826-4EA5-8536-11A903012ABC}" type="slidenum">
               <a:rPr lang="LID4096" smtClean="0"/>
-              <a:t>23</a:t>
+              <a:t>26</a:t>
             </a:fld>
             <a:endParaRPr lang="LID4096"/>
           </a:p>
@@ -15399,7 +16761,7 @@
 </p:sld>
 </file>
 
-<file path=ppt/slides/slide24.xml><?xml version="1.0" encoding="utf-8"?>
+<file path=ppt/slides/slide27.xml><?xml version="1.0" encoding="utf-8"?>
 <p:sld xmlns:a="http://schemas.openxmlformats.org/drawingml/2006/main" xmlns:r="http://schemas.openxmlformats.org/officeDocument/2006/relationships" xmlns:p="http://schemas.openxmlformats.org/presentationml/2006/main">
   <p:cSld>
     <p:spTree>
@@ -15468,7 +16830,7 @@
           <a:p>
             <a:fld id="{6A9C7FA6-5826-4EA5-8536-11A903012ABC}" type="slidenum">
               <a:rPr lang="LID4096" smtClean="0"/>
-              <a:t>24</a:t>
+              <a:t>27</a:t>
             </a:fld>
             <a:endParaRPr lang="LID4096"/>
           </a:p>
@@ -15577,7 +16939,7 @@
 </p:sld>
 </file>
 
-<file path=ppt/slides/slide25.xml><?xml version="1.0" encoding="utf-8"?>
+<file path=ppt/slides/slide28.xml><?xml version="1.0" encoding="utf-8"?>
 <p:sld xmlns:a="http://schemas.openxmlformats.org/drawingml/2006/main" xmlns:r="http://schemas.openxmlformats.org/officeDocument/2006/relationships" xmlns:p="http://schemas.openxmlformats.org/presentationml/2006/main">
   <p:cSld>
     <p:spTree>
@@ -15652,7 +17014,7 @@
           <a:p>
             <a:fld id="{6A9C7FA6-5826-4EA5-8536-11A903012ABC}" type="slidenum">
               <a:rPr lang="LID4096" smtClean="0"/>
-              <a:t>25</a:t>
+              <a:t>28</a:t>
             </a:fld>
             <a:endParaRPr lang="LID4096"/>
           </a:p>
@@ -16141,7 +17503,7 @@
 </p:sld>
 </file>
 
-<file path=ppt/slides/slide26.xml><?xml version="1.0" encoding="utf-8"?>
+<file path=ppt/slides/slide29.xml><?xml version="1.0" encoding="utf-8"?>
 <p:sld xmlns:a="http://schemas.openxmlformats.org/drawingml/2006/main" xmlns:r="http://schemas.openxmlformats.org/officeDocument/2006/relationships" xmlns:p="http://schemas.openxmlformats.org/presentationml/2006/main">
   <p:cSld>
     <p:spTree>
@@ -16210,7 +17572,7 @@
           <a:p>
             <a:fld id="{6A9C7FA6-5826-4EA5-8536-11A903012ABC}" type="slidenum">
               <a:rPr lang="LID4096" smtClean="0"/>
-              <a:t>26</a:t>
+              <a:t>29</a:t>
             </a:fld>
             <a:endParaRPr lang="LID4096"/>
           </a:p>
@@ -16319,7 +17681,102 @@
 </p:sld>
 </file>
 
-<file path=ppt/slides/slide27.xml><?xml version="1.0" encoding="utf-8"?>
+<file path=ppt/slides/slide3.xml><?xml version="1.0" encoding="utf-8"?>
+<p:sld xmlns:a="http://schemas.openxmlformats.org/drawingml/2006/main" xmlns:r="http://schemas.openxmlformats.org/officeDocument/2006/relationships" xmlns:p="http://schemas.openxmlformats.org/presentationml/2006/main">
+  <p:cSld>
+    <p:spTree>
+      <p:nvGrpSpPr>
+        <p:cNvPr id="1" name=""/>
+        <p:cNvGrpSpPr/>
+        <p:nvPr/>
+      </p:nvGrpSpPr>
+      <p:grpSpPr>
+        <a:xfrm>
+          <a:off x="0" y="0"/>
+          <a:ext cx="0" cy="0"/>
+          <a:chOff x="0" y="0"/>
+          <a:chExt cx="0" cy="0"/>
+        </a:xfrm>
+      </p:grpSpPr>
+      <p:sp>
+        <p:nvSpPr>
+          <p:cNvPr id="2" name="Slide Number Placeholder 1">
+            <a:extLst>
+              <a:ext uri="{FF2B5EF4-FFF2-40B4-BE49-F238E27FC236}">
+                <a16:creationId xmlns:a16="http://schemas.microsoft.com/office/drawing/2014/main" id="{CDE5F573-6165-481B-AC47-5C89E7A1B5EE}"/>
+              </a:ext>
+            </a:extLst>
+          </p:cNvPr>
+          <p:cNvSpPr>
+            <a:spLocks noGrp="1"/>
+          </p:cNvSpPr>
+          <p:nvPr>
+            <p:ph type="sldNum" sz="quarter" idx="12"/>
+          </p:nvPr>
+        </p:nvSpPr>
+        <p:spPr/>
+        <p:txBody>
+          <a:bodyPr/>
+          <a:lstStyle/>
+          <a:p>
+            <a:fld id="{A2912448-FEEC-49E8-9588-2DF1F90D57C2}" type="slidenum">
+              <a:rPr lang="en-US" smtClean="0"/>
+              <a:t>3</a:t>
+            </a:fld>
+            <a:endParaRPr lang="en-US"/>
+          </a:p>
+        </p:txBody>
+      </p:sp>
+      <p:pic>
+        <p:nvPicPr>
+          <p:cNvPr id="4" name="Picture 3" descr="Qr code&#10;&#10;Description automatically generated">
+            <a:extLst>
+              <a:ext uri="{FF2B5EF4-FFF2-40B4-BE49-F238E27FC236}">
+                <a16:creationId xmlns:a16="http://schemas.microsoft.com/office/drawing/2014/main" id="{78E97EA1-949E-42CD-9ADA-2D8F1E3284CB}"/>
+              </a:ext>
+            </a:extLst>
+          </p:cNvPr>
+          <p:cNvPicPr>
+            <a:picLocks noChangeAspect="1"/>
+          </p:cNvPicPr>
+          <p:nvPr/>
+        </p:nvPicPr>
+        <p:blipFill>
+          <a:blip r:embed="rId2">
+            <a:extLst>
+              <a:ext uri="{28A0092B-C50C-407E-A947-70E740481C1C}">
+                <a14:useLocalDpi xmlns:a14="http://schemas.microsoft.com/office/drawing/2010/main" val="0"/>
+              </a:ext>
+            </a:extLst>
+          </a:blip>
+          <a:stretch>
+            <a:fillRect/>
+          </a:stretch>
+        </p:blipFill>
+        <p:spPr>
+          <a:xfrm>
+            <a:off x="0" y="0"/>
+            <a:ext cx="12192000" cy="6858000"/>
+          </a:xfrm>
+          <a:prstGeom prst="rect">
+            <a:avLst/>
+          </a:prstGeom>
+        </p:spPr>
+      </p:pic>
+    </p:spTree>
+    <p:extLst>
+      <p:ext uri="{BB962C8B-B14F-4D97-AF65-F5344CB8AC3E}">
+        <p14:creationId xmlns:p14="http://schemas.microsoft.com/office/powerpoint/2010/main" val="102131432"/>
+      </p:ext>
+    </p:extLst>
+  </p:cSld>
+  <p:clrMapOvr>
+    <a:masterClrMapping/>
+  </p:clrMapOvr>
+</p:sld>
+</file>
+
+<file path=ppt/slides/slide30.xml><?xml version="1.0" encoding="utf-8"?>
 <p:sld xmlns:a="http://schemas.openxmlformats.org/drawingml/2006/main" xmlns:r="http://schemas.openxmlformats.org/officeDocument/2006/relationships" xmlns:p="http://schemas.openxmlformats.org/presentationml/2006/main">
   <p:cSld>
     <p:spTree>
@@ -16451,7 +17908,7 @@
           <a:p>
             <a:fld id="{6A9C7FA6-5826-4EA5-8536-11A903012ABC}" type="slidenum">
               <a:rPr lang="LID4096" smtClean="0"/>
-              <a:t>27</a:t>
+              <a:t>30</a:t>
             </a:fld>
             <a:endParaRPr lang="LID4096"/>
           </a:p>
@@ -17374,7 +18831,7 @@
 </p:sld>
 </file>
 
-<file path=ppt/slides/slide28.xml><?xml version="1.0" encoding="utf-8"?>
+<file path=ppt/slides/slide31.xml><?xml version="1.0" encoding="utf-8"?>
 <p:sld xmlns:a="http://schemas.openxmlformats.org/drawingml/2006/main" xmlns:r="http://schemas.openxmlformats.org/officeDocument/2006/relationships" xmlns:p="http://schemas.openxmlformats.org/presentationml/2006/main">
   <p:cSld>
     <p:spTree>
@@ -17449,7 +18906,7 @@
           <a:p>
             <a:fld id="{6A9C7FA6-5826-4EA5-8536-11A903012ABC}" type="slidenum">
               <a:rPr lang="LID4096" smtClean="0"/>
-              <a:t>28</a:t>
+              <a:t>31</a:t>
             </a:fld>
             <a:endParaRPr lang="LID4096"/>
           </a:p>
@@ -17924,7 +19381,7 @@
 </p:sld>
 </file>
 
-<file path=ppt/slides/slide29.xml><?xml version="1.0" encoding="utf-8"?>
+<file path=ppt/slides/slide32.xml><?xml version="1.0" encoding="utf-8"?>
 <p:sld xmlns:a="http://schemas.openxmlformats.org/drawingml/2006/main" xmlns:r="http://schemas.openxmlformats.org/officeDocument/2006/relationships" xmlns:p="http://schemas.openxmlformats.org/presentationml/2006/main">
   <p:cSld>
     <p:spTree>
@@ -18028,7 +19485,7 @@
           <a:p>
             <a:fld id="{6A9C7FA6-5826-4EA5-8536-11A903012ABC}" type="slidenum">
               <a:rPr lang="LID4096" smtClean="0"/>
-              <a:t>29</a:t>
+              <a:t>32</a:t>
             </a:fld>
             <a:endParaRPr lang="LID4096"/>
           </a:p>
@@ -18047,102 +19504,7 @@
 </p:sld>
 </file>
 
-<file path=ppt/slides/slide3.xml><?xml version="1.0" encoding="utf-8"?>
-<p:sld xmlns:a="http://schemas.openxmlformats.org/drawingml/2006/main" xmlns:r="http://schemas.openxmlformats.org/officeDocument/2006/relationships" xmlns:p="http://schemas.openxmlformats.org/presentationml/2006/main">
-  <p:cSld>
-    <p:spTree>
-      <p:nvGrpSpPr>
-        <p:cNvPr id="1" name=""/>
-        <p:cNvGrpSpPr/>
-        <p:nvPr/>
-      </p:nvGrpSpPr>
-      <p:grpSpPr>
-        <a:xfrm>
-          <a:off x="0" y="0"/>
-          <a:ext cx="0" cy="0"/>
-          <a:chOff x="0" y="0"/>
-          <a:chExt cx="0" cy="0"/>
-        </a:xfrm>
-      </p:grpSpPr>
-      <p:sp>
-        <p:nvSpPr>
-          <p:cNvPr id="2" name="Slide Number Placeholder 1">
-            <a:extLst>
-              <a:ext uri="{FF2B5EF4-FFF2-40B4-BE49-F238E27FC236}">
-                <a16:creationId xmlns:a16="http://schemas.microsoft.com/office/drawing/2014/main" id="{CDE5F573-6165-481B-AC47-5C89E7A1B5EE}"/>
-              </a:ext>
-            </a:extLst>
-          </p:cNvPr>
-          <p:cNvSpPr>
-            <a:spLocks noGrp="1"/>
-          </p:cNvSpPr>
-          <p:nvPr>
-            <p:ph type="sldNum" sz="quarter" idx="12"/>
-          </p:nvPr>
-        </p:nvSpPr>
-        <p:spPr/>
-        <p:txBody>
-          <a:bodyPr/>
-          <a:lstStyle/>
-          <a:p>
-            <a:fld id="{A2912448-FEEC-49E8-9588-2DF1F90D57C2}" type="slidenum">
-              <a:rPr lang="en-US" smtClean="0"/>
-              <a:t>3</a:t>
-            </a:fld>
-            <a:endParaRPr lang="en-US"/>
-          </a:p>
-        </p:txBody>
-      </p:sp>
-      <p:pic>
-        <p:nvPicPr>
-          <p:cNvPr id="4" name="Picture 3" descr="Qr code&#10;&#10;Description automatically generated">
-            <a:extLst>
-              <a:ext uri="{FF2B5EF4-FFF2-40B4-BE49-F238E27FC236}">
-                <a16:creationId xmlns:a16="http://schemas.microsoft.com/office/drawing/2014/main" id="{78E97EA1-949E-42CD-9ADA-2D8F1E3284CB}"/>
-              </a:ext>
-            </a:extLst>
-          </p:cNvPr>
-          <p:cNvPicPr>
-            <a:picLocks noChangeAspect="1"/>
-          </p:cNvPicPr>
-          <p:nvPr/>
-        </p:nvPicPr>
-        <p:blipFill>
-          <a:blip r:embed="rId2">
-            <a:extLst>
-              <a:ext uri="{28A0092B-C50C-407E-A947-70E740481C1C}">
-                <a14:useLocalDpi xmlns:a14="http://schemas.microsoft.com/office/drawing/2010/main" val="0"/>
-              </a:ext>
-            </a:extLst>
-          </a:blip>
-          <a:stretch>
-            <a:fillRect/>
-          </a:stretch>
-        </p:blipFill>
-        <p:spPr>
-          <a:xfrm>
-            <a:off x="0" y="0"/>
-            <a:ext cx="12192000" cy="6858000"/>
-          </a:xfrm>
-          <a:prstGeom prst="rect">
-            <a:avLst/>
-          </a:prstGeom>
-        </p:spPr>
-      </p:pic>
-    </p:spTree>
-    <p:extLst>
-      <p:ext uri="{BB962C8B-B14F-4D97-AF65-F5344CB8AC3E}">
-        <p14:creationId xmlns:p14="http://schemas.microsoft.com/office/powerpoint/2010/main" val="102131432"/>
-      </p:ext>
-    </p:extLst>
-  </p:cSld>
-  <p:clrMapOvr>
-    <a:masterClrMapping/>
-  </p:clrMapOvr>
-</p:sld>
-</file>
-
-<file path=ppt/slides/slide30.xml><?xml version="1.0" encoding="utf-8"?>
+<file path=ppt/slides/slide33.xml><?xml version="1.0" encoding="utf-8"?>
 <p:sld xmlns:a="http://schemas.openxmlformats.org/drawingml/2006/main" xmlns:r="http://schemas.openxmlformats.org/officeDocument/2006/relationships" xmlns:p="http://schemas.openxmlformats.org/presentationml/2006/main">
   <p:cSld>
     <p:spTree>
@@ -18264,7 +19626,7 @@
           <a:p>
             <a:fld id="{6A9C7FA6-5826-4EA5-8536-11A903012ABC}" type="slidenum">
               <a:rPr lang="LID4096" smtClean="0"/>
-              <a:t>30</a:t>
+              <a:t>33</a:t>
             </a:fld>
             <a:endParaRPr lang="LID4096"/>
           </a:p>
@@ -18610,7 +19972,7 @@
 </p:sld>
 </file>
 
-<file path=ppt/slides/slide31.xml><?xml version="1.0" encoding="utf-8"?>
+<file path=ppt/slides/slide34.xml><?xml version="1.0" encoding="utf-8"?>
 <p:sld xmlns:a="http://schemas.openxmlformats.org/drawingml/2006/main" xmlns:r="http://schemas.openxmlformats.org/officeDocument/2006/relationships" xmlns:p="http://schemas.openxmlformats.org/presentationml/2006/main">
   <p:cSld>
     <p:spTree>
@@ -19105,7 +20467,7 @@
           <a:p>
             <a:fld id="{6A9C7FA6-5826-4EA5-8536-11A903012ABC}" type="slidenum">
               <a:rPr lang="LID4096" smtClean="0"/>
-              <a:t>31</a:t>
+              <a:t>34</a:t>
             </a:fld>
             <a:endParaRPr lang="LID4096"/>
           </a:p>
@@ -19508,7 +20870,7 @@
 </p:sld>
 </file>
 
-<file path=ppt/slides/slide32.xml><?xml version="1.0" encoding="utf-8"?>
+<file path=ppt/slides/slide35.xml><?xml version="1.0" encoding="utf-8"?>
 <p:sld xmlns:a="http://schemas.openxmlformats.org/drawingml/2006/main" xmlns:r="http://schemas.openxmlformats.org/officeDocument/2006/relationships" xmlns:p="http://schemas.openxmlformats.org/presentationml/2006/main">
   <p:cSld>
     <p:spTree>
@@ -19647,7 +21009,7 @@
           <a:p>
             <a:fld id="{6A9C7FA6-5826-4EA5-8536-11A903012ABC}" type="slidenum">
               <a:rPr lang="LID4096" smtClean="0"/>
-              <a:t>32</a:t>
+              <a:t>35</a:t>
             </a:fld>
             <a:endParaRPr lang="LID4096"/>
           </a:p>
@@ -20009,7 +21371,7 @@
 </p:sld>
 </file>
 
-<file path=ppt/slides/slide33.xml><?xml version="1.0" encoding="utf-8"?>
+<file path=ppt/slides/slide36.xml><?xml version="1.0" encoding="utf-8"?>
 <p:sld xmlns:a="http://schemas.openxmlformats.org/drawingml/2006/main" xmlns:r="http://schemas.openxmlformats.org/officeDocument/2006/relationships" xmlns:p="http://schemas.openxmlformats.org/presentationml/2006/main">
   <p:cSld>
     <p:spTree>
@@ -20218,7 +21580,7 @@
           <a:p>
             <a:fld id="{6A9C7FA6-5826-4EA5-8536-11A903012ABC}" type="slidenum">
               <a:rPr lang="LID4096" smtClean="0"/>
-              <a:t>33</a:t>
+              <a:t>36</a:t>
             </a:fld>
             <a:endParaRPr lang="LID4096"/>
           </a:p>
@@ -20879,7 +22241,7 @@
 </p:sld>
 </file>
 
-<file path=ppt/slides/slide34.xml><?xml version="1.0" encoding="utf-8"?>
+<file path=ppt/slides/slide37.xml><?xml version="1.0" encoding="utf-8"?>
 <p:sld xmlns:a="http://schemas.openxmlformats.org/drawingml/2006/main" xmlns:r="http://schemas.openxmlformats.org/officeDocument/2006/relationships" xmlns:p="http://schemas.openxmlformats.org/presentationml/2006/main">
   <p:cSld>
     <p:spTree>
@@ -21022,7 +22384,7 @@
           <a:p>
             <a:fld id="{6A9C7FA6-5826-4EA5-8536-11A903012ABC}" type="slidenum">
               <a:rPr lang="LID4096" smtClean="0"/>
-              <a:t>34</a:t>
+              <a:t>37</a:t>
             </a:fld>
             <a:endParaRPr lang="LID4096"/>
           </a:p>
@@ -21417,7 +22779,7 @@
 </p:sld>
 </file>
 
-<file path=ppt/slides/slide35.xml><?xml version="1.0" encoding="utf-8"?>
+<file path=ppt/slides/slide38.xml><?xml version="1.0" encoding="utf-8"?>
 <p:sld xmlns:a="http://schemas.openxmlformats.org/drawingml/2006/main" xmlns:r="http://schemas.openxmlformats.org/officeDocument/2006/relationships" xmlns:p="http://schemas.openxmlformats.org/presentationml/2006/main">
   <p:cSld>
     <p:spTree>
@@ -21486,7 +22848,7 @@
           <a:p>
             <a:fld id="{6A9C7FA6-5826-4EA5-8536-11A903012ABC}" type="slidenum">
               <a:rPr lang="LID4096" smtClean="0"/>
-              <a:t>35</a:t>
+              <a:t>38</a:t>
             </a:fld>
             <a:endParaRPr lang="LID4096"/>
           </a:p>
@@ -22257,7 +23619,7 @@
 </p:sld>
 </file>
 
-<file path=ppt/slides/slide36.xml><?xml version="1.0" encoding="utf-8"?>
+<file path=ppt/slides/slide39.xml><?xml version="1.0" encoding="utf-8"?>
 <p:sld xmlns:a="http://schemas.openxmlformats.org/drawingml/2006/main" xmlns:r="http://schemas.openxmlformats.org/officeDocument/2006/relationships" xmlns:p="http://schemas.openxmlformats.org/presentationml/2006/main">
   <p:cSld>
     <p:spTree>
@@ -22406,7 +23768,7 @@
           <a:p>
             <a:fld id="{6A9C7FA6-5826-4EA5-8536-11A903012ABC}" type="slidenum">
               <a:rPr lang="LID4096" smtClean="0"/>
-              <a:t>36</a:t>
+              <a:t>39</a:t>
             </a:fld>
             <a:endParaRPr lang="LID4096"/>
           </a:p>
@@ -23036,7 +24398,176 @@
 </p:sld>
 </file>
 
-<file path=ppt/slides/slide37.xml><?xml version="1.0" encoding="utf-8"?>
+<file path=ppt/slides/slide4.xml><?xml version="1.0" encoding="utf-8"?>
+<p:sld xmlns:a="http://schemas.openxmlformats.org/drawingml/2006/main" xmlns:r="http://schemas.openxmlformats.org/officeDocument/2006/relationships" xmlns:p="http://schemas.openxmlformats.org/presentationml/2006/main">
+  <p:cSld>
+    <p:spTree>
+      <p:nvGrpSpPr>
+        <p:cNvPr id="1" name=""/>
+        <p:cNvGrpSpPr/>
+        <p:nvPr/>
+      </p:nvGrpSpPr>
+      <p:grpSpPr>
+        <a:xfrm>
+          <a:off x="0" y="0"/>
+          <a:ext cx="0" cy="0"/>
+          <a:chOff x="0" y="0"/>
+          <a:chExt cx="0" cy="0"/>
+        </a:xfrm>
+      </p:grpSpPr>
+      <p:sp>
+        <p:nvSpPr>
+          <p:cNvPr id="2" name="Title 1">
+            <a:extLst>
+              <a:ext uri="{FF2B5EF4-FFF2-40B4-BE49-F238E27FC236}">
+                <a16:creationId xmlns:a16="http://schemas.microsoft.com/office/drawing/2014/main" id="{A1164017-F076-5AC8-6D58-808BBB91C60E}"/>
+              </a:ext>
+            </a:extLst>
+          </p:cNvPr>
+          <p:cNvSpPr>
+            <a:spLocks noGrp="1"/>
+          </p:cNvSpPr>
+          <p:nvPr>
+            <p:ph type="title"/>
+          </p:nvPr>
+        </p:nvSpPr>
+        <p:spPr/>
+        <p:txBody>
+          <a:bodyPr/>
+          <a:lstStyle/>
+          <a:p>
+            <a:r>
+              <a:rPr lang="en-US" dirty="0"/>
+              <a:t>Overview</a:t>
+            </a:r>
+            <a:endParaRPr lang="LID4096" dirty="0"/>
+          </a:p>
+        </p:txBody>
+      </p:sp>
+      <p:sp>
+        <p:nvSpPr>
+          <p:cNvPr id="3" name="Content Placeholder 2">
+            <a:extLst>
+              <a:ext uri="{FF2B5EF4-FFF2-40B4-BE49-F238E27FC236}">
+                <a16:creationId xmlns:a16="http://schemas.microsoft.com/office/drawing/2014/main" id="{DB79678D-314F-8C1A-787F-AD46B653F18C}"/>
+              </a:ext>
+            </a:extLst>
+          </p:cNvPr>
+          <p:cNvSpPr>
+            <a:spLocks noGrp="1"/>
+          </p:cNvSpPr>
+          <p:nvPr>
+            <p:ph idx="1"/>
+          </p:nvPr>
+        </p:nvSpPr>
+        <p:spPr/>
+        <p:txBody>
+          <a:bodyPr>
+            <a:normAutofit lnSpcReduction="10000"/>
+          </a:bodyPr>
+          <a:lstStyle/>
+          <a:p>
+            <a:r>
+              <a:rPr lang="en-US" dirty="0"/>
+              <a:t>Why LLMs?</a:t>
+            </a:r>
+          </a:p>
+          <a:p>
+            <a:r>
+              <a:rPr lang="en-US" dirty="0"/>
+              <a:t>What are LLMs?</a:t>
+            </a:r>
+          </a:p>
+          <a:p>
+            <a:r>
+              <a:rPr lang="en-US" dirty="0"/>
+              <a:t>Can I run an LLM on my laptop?</a:t>
+            </a:r>
+          </a:p>
+          <a:p>
+            <a:r>
+              <a:rPr lang="en-US" dirty="0"/>
+              <a:t>How can I use LLMs?</a:t>
+            </a:r>
+          </a:p>
+          <a:p>
+            <a:r>
+              <a:rPr lang="en-US" dirty="0"/>
+              <a:t>Can I chat with my data?</a:t>
+            </a:r>
+          </a:p>
+          <a:p>
+            <a:r>
+              <a:rPr lang="en-US" dirty="0"/>
+              <a:t>Fine-tuning models</a:t>
+            </a:r>
+          </a:p>
+          <a:p>
+            <a:r>
+              <a:rPr lang="en-US" dirty="0"/>
+              <a:t>Computing on the edge: quantization</a:t>
+            </a:r>
+          </a:p>
+          <a:p>
+            <a:r>
+              <a:rPr lang="en-US" dirty="0"/>
+              <a:t>Can I start from scratch?</a:t>
+            </a:r>
+          </a:p>
+          <a:p>
+            <a:r>
+              <a:rPr lang="en-US" dirty="0"/>
+              <a:t>Conclusions</a:t>
+            </a:r>
+          </a:p>
+          <a:p>
+            <a:endParaRPr lang="LID4096" dirty="0"/>
+          </a:p>
+        </p:txBody>
+      </p:sp>
+      <p:sp>
+        <p:nvSpPr>
+          <p:cNvPr id="4" name="Slide Number Placeholder 3">
+            <a:extLst>
+              <a:ext uri="{FF2B5EF4-FFF2-40B4-BE49-F238E27FC236}">
+                <a16:creationId xmlns:a16="http://schemas.microsoft.com/office/drawing/2014/main" id="{332C299C-7A95-6176-DD20-F8EBDED7FF85}"/>
+              </a:ext>
+            </a:extLst>
+          </p:cNvPr>
+          <p:cNvSpPr>
+            <a:spLocks noGrp="1"/>
+          </p:cNvSpPr>
+          <p:nvPr>
+            <p:ph type="sldNum" sz="quarter" idx="12"/>
+          </p:nvPr>
+        </p:nvSpPr>
+        <p:spPr/>
+        <p:txBody>
+          <a:bodyPr/>
+          <a:lstStyle/>
+          <a:p>
+            <a:fld id="{6A9C7FA6-5826-4EA5-8536-11A903012ABC}" type="slidenum">
+              <a:rPr lang="LID4096" smtClean="0"/>
+              <a:t>4</a:t>
+            </a:fld>
+            <a:endParaRPr lang="LID4096"/>
+          </a:p>
+        </p:txBody>
+      </p:sp>
+    </p:spTree>
+    <p:extLst>
+      <p:ext uri="{BB962C8B-B14F-4D97-AF65-F5344CB8AC3E}">
+        <p14:creationId xmlns:p14="http://schemas.microsoft.com/office/powerpoint/2010/main" val="3356400016"/>
+      </p:ext>
+    </p:extLst>
+  </p:cSld>
+  <p:clrMapOvr>
+    <a:masterClrMapping/>
+  </p:clrMapOvr>
+</p:sld>
+</file>
+
+<file path=ppt/slides/slide40.xml><?xml version="1.0" encoding="utf-8"?>
 <p:sld xmlns:a="http://schemas.openxmlformats.org/drawingml/2006/main" xmlns:r="http://schemas.openxmlformats.org/officeDocument/2006/relationships" xmlns:p="http://schemas.openxmlformats.org/presentationml/2006/main">
   <p:cSld>
     <p:spTree>
@@ -23278,7 +24809,7 @@
           <a:p>
             <a:fld id="{6A9C7FA6-5826-4EA5-8536-11A903012ABC}" type="slidenum">
               <a:rPr lang="LID4096" smtClean="0"/>
-              <a:t>37</a:t>
+              <a:t>40</a:t>
             </a:fld>
             <a:endParaRPr lang="LID4096"/>
           </a:p>
@@ -24354,7 +25885,7 @@
 </p:sld>
 </file>
 
-<file path=ppt/slides/slide38.xml><?xml version="1.0" encoding="utf-8"?>
+<file path=ppt/slides/slide41.xml><?xml version="1.0" encoding="utf-8"?>
 <p:sld xmlns:a="http://schemas.openxmlformats.org/drawingml/2006/main" xmlns:r="http://schemas.openxmlformats.org/officeDocument/2006/relationships" xmlns:p="http://schemas.openxmlformats.org/presentationml/2006/main">
   <p:cSld>
     <p:spTree>
@@ -24429,7 +25960,7 @@
           <a:p>
             <a:fld id="{6A9C7FA6-5826-4EA5-8536-11A903012ABC}" type="slidenum">
               <a:rPr lang="LID4096" smtClean="0"/>
-              <a:t>38</a:t>
+              <a:t>41</a:t>
             </a:fld>
             <a:endParaRPr lang="LID4096"/>
           </a:p>
@@ -25177,7 +26708,7 @@
 </p:sld>
 </file>
 
-<file path=ppt/slides/slide39.xml><?xml version="1.0" encoding="utf-8"?>
+<file path=ppt/slides/slide42.xml><?xml version="1.0" encoding="utf-8"?>
 <p:sld xmlns:a="http://schemas.openxmlformats.org/drawingml/2006/main" xmlns:r="http://schemas.openxmlformats.org/officeDocument/2006/relationships" xmlns:p="http://schemas.openxmlformats.org/presentationml/2006/main">
   <p:cSld>
     <p:spTree>
@@ -25326,7 +26857,7 @@
           <a:p>
             <a:fld id="{6A9C7FA6-5826-4EA5-8536-11A903012ABC}" type="slidenum">
               <a:rPr lang="LID4096" smtClean="0"/>
-              <a:t>39</a:t>
+              <a:t>42</a:t>
             </a:fld>
             <a:endParaRPr lang="LID4096"/>
           </a:p>
@@ -25738,176 +27269,7 @@
 </p:sld>
 </file>
 
-<file path=ppt/slides/slide4.xml><?xml version="1.0" encoding="utf-8"?>
-<p:sld xmlns:a="http://schemas.openxmlformats.org/drawingml/2006/main" xmlns:r="http://schemas.openxmlformats.org/officeDocument/2006/relationships" xmlns:p="http://schemas.openxmlformats.org/presentationml/2006/main">
-  <p:cSld>
-    <p:spTree>
-      <p:nvGrpSpPr>
-        <p:cNvPr id="1" name=""/>
-        <p:cNvGrpSpPr/>
-        <p:nvPr/>
-      </p:nvGrpSpPr>
-      <p:grpSpPr>
-        <a:xfrm>
-          <a:off x="0" y="0"/>
-          <a:ext cx="0" cy="0"/>
-          <a:chOff x="0" y="0"/>
-          <a:chExt cx="0" cy="0"/>
-        </a:xfrm>
-      </p:grpSpPr>
-      <p:sp>
-        <p:nvSpPr>
-          <p:cNvPr id="2" name="Title 1">
-            <a:extLst>
-              <a:ext uri="{FF2B5EF4-FFF2-40B4-BE49-F238E27FC236}">
-                <a16:creationId xmlns:a16="http://schemas.microsoft.com/office/drawing/2014/main" id="{A1164017-F076-5AC8-6D58-808BBB91C60E}"/>
-              </a:ext>
-            </a:extLst>
-          </p:cNvPr>
-          <p:cNvSpPr>
-            <a:spLocks noGrp="1"/>
-          </p:cNvSpPr>
-          <p:nvPr>
-            <p:ph type="title"/>
-          </p:nvPr>
-        </p:nvSpPr>
-        <p:spPr/>
-        <p:txBody>
-          <a:bodyPr/>
-          <a:lstStyle/>
-          <a:p>
-            <a:r>
-              <a:rPr lang="en-US" dirty="0"/>
-              <a:t>Overview</a:t>
-            </a:r>
-            <a:endParaRPr lang="LID4096" dirty="0"/>
-          </a:p>
-        </p:txBody>
-      </p:sp>
-      <p:sp>
-        <p:nvSpPr>
-          <p:cNvPr id="3" name="Content Placeholder 2">
-            <a:extLst>
-              <a:ext uri="{FF2B5EF4-FFF2-40B4-BE49-F238E27FC236}">
-                <a16:creationId xmlns:a16="http://schemas.microsoft.com/office/drawing/2014/main" id="{DB79678D-314F-8C1A-787F-AD46B653F18C}"/>
-              </a:ext>
-            </a:extLst>
-          </p:cNvPr>
-          <p:cNvSpPr>
-            <a:spLocks noGrp="1"/>
-          </p:cNvSpPr>
-          <p:nvPr>
-            <p:ph idx="1"/>
-          </p:nvPr>
-        </p:nvSpPr>
-        <p:spPr/>
-        <p:txBody>
-          <a:bodyPr>
-            <a:normAutofit lnSpcReduction="10000"/>
-          </a:bodyPr>
-          <a:lstStyle/>
-          <a:p>
-            <a:r>
-              <a:rPr lang="en-US" dirty="0"/>
-              <a:t>Why LLMs?</a:t>
-            </a:r>
-          </a:p>
-          <a:p>
-            <a:r>
-              <a:rPr lang="en-US" dirty="0"/>
-              <a:t>What are LLMs?</a:t>
-            </a:r>
-          </a:p>
-          <a:p>
-            <a:r>
-              <a:rPr lang="en-US" dirty="0"/>
-              <a:t>Can I run an LLM on my laptop?</a:t>
-            </a:r>
-          </a:p>
-          <a:p>
-            <a:r>
-              <a:rPr lang="en-US" dirty="0"/>
-              <a:t>How can I use LLMs?</a:t>
-            </a:r>
-          </a:p>
-          <a:p>
-            <a:r>
-              <a:rPr lang="en-US" dirty="0"/>
-              <a:t>Can I chat with my data?</a:t>
-            </a:r>
-          </a:p>
-          <a:p>
-            <a:r>
-              <a:rPr lang="en-US" dirty="0"/>
-              <a:t>Fine-tuning models</a:t>
-            </a:r>
-          </a:p>
-          <a:p>
-            <a:r>
-              <a:rPr lang="en-US" dirty="0"/>
-              <a:t>Computing on the edge: quantization</a:t>
-            </a:r>
-          </a:p>
-          <a:p>
-            <a:r>
-              <a:rPr lang="en-US" dirty="0"/>
-              <a:t>Can I start from scratch?</a:t>
-            </a:r>
-          </a:p>
-          <a:p>
-            <a:r>
-              <a:rPr lang="en-US" dirty="0"/>
-              <a:t>Conclusions</a:t>
-            </a:r>
-          </a:p>
-          <a:p>
-            <a:endParaRPr lang="LID4096" dirty="0"/>
-          </a:p>
-        </p:txBody>
-      </p:sp>
-      <p:sp>
-        <p:nvSpPr>
-          <p:cNvPr id="4" name="Slide Number Placeholder 3">
-            <a:extLst>
-              <a:ext uri="{FF2B5EF4-FFF2-40B4-BE49-F238E27FC236}">
-                <a16:creationId xmlns:a16="http://schemas.microsoft.com/office/drawing/2014/main" id="{332C299C-7A95-6176-DD20-F8EBDED7FF85}"/>
-              </a:ext>
-            </a:extLst>
-          </p:cNvPr>
-          <p:cNvSpPr>
-            <a:spLocks noGrp="1"/>
-          </p:cNvSpPr>
-          <p:nvPr>
-            <p:ph type="sldNum" sz="quarter" idx="12"/>
-          </p:nvPr>
-        </p:nvSpPr>
-        <p:spPr/>
-        <p:txBody>
-          <a:bodyPr/>
-          <a:lstStyle/>
-          <a:p>
-            <a:fld id="{6A9C7FA6-5826-4EA5-8536-11A903012ABC}" type="slidenum">
-              <a:rPr lang="LID4096" smtClean="0"/>
-              <a:t>4</a:t>
-            </a:fld>
-            <a:endParaRPr lang="LID4096"/>
-          </a:p>
-        </p:txBody>
-      </p:sp>
-    </p:spTree>
-    <p:extLst>
-      <p:ext uri="{BB962C8B-B14F-4D97-AF65-F5344CB8AC3E}">
-        <p14:creationId xmlns:p14="http://schemas.microsoft.com/office/powerpoint/2010/main" val="3356400016"/>
-      </p:ext>
-    </p:extLst>
-  </p:cSld>
-  <p:clrMapOvr>
-    <a:masterClrMapping/>
-  </p:clrMapOvr>
-</p:sld>
-</file>
-
-<file path=ppt/slides/slide40.xml><?xml version="1.0" encoding="utf-8"?>
+<file path=ppt/slides/slide43.xml><?xml version="1.0" encoding="utf-8"?>
 <p:sld xmlns:a="http://schemas.openxmlformats.org/drawingml/2006/main" xmlns:r="http://schemas.openxmlformats.org/officeDocument/2006/relationships" xmlns:p="http://schemas.openxmlformats.org/presentationml/2006/main">
   <p:cSld>
     <p:spTree>
@@ -26001,7 +27363,7 @@
           <a:p>
             <a:fld id="{6A9C7FA6-5826-4EA5-8536-11A903012ABC}" type="slidenum">
               <a:rPr lang="LID4096" smtClean="0"/>
-              <a:t>40</a:t>
+              <a:t>43</a:t>
             </a:fld>
             <a:endParaRPr lang="LID4096"/>
           </a:p>
@@ -26020,7 +27382,7 @@
 </p:sld>
 </file>
 
-<file path=ppt/slides/slide41.xml><?xml version="1.0" encoding="utf-8"?>
+<file path=ppt/slides/slide44.xml><?xml version="1.0" encoding="utf-8"?>
 <p:sld xmlns:a="http://schemas.openxmlformats.org/drawingml/2006/main" xmlns:r="http://schemas.openxmlformats.org/officeDocument/2006/relationships" xmlns:p="http://schemas.openxmlformats.org/presentationml/2006/main">
   <p:cSld>
     <p:spTree>
@@ -26094,7 +27456,7 @@
           <a:p>
             <a:fld id="{A2912448-FEEC-49E8-9588-2DF1F90D57C2}" type="slidenum">
               <a:rPr lang="en-US" smtClean="0"/>
-              <a:t>41</a:t>
+              <a:t>44</a:t>
             </a:fld>
             <a:endParaRPr lang="en-US"/>
           </a:p>
@@ -29127,7 +30489,7 @@
 </p:sld>
 </file>
 
-<file path=ppt/slides/slide42.xml><?xml version="1.0" encoding="utf-8"?>
+<file path=ppt/slides/slide45.xml><?xml version="1.0" encoding="utf-8"?>
 <p:sld xmlns:a="http://schemas.openxmlformats.org/drawingml/2006/main" xmlns:r="http://schemas.openxmlformats.org/officeDocument/2006/relationships" xmlns:p="http://schemas.openxmlformats.org/presentationml/2006/main">
   <p:cSld>
     <p:spTree>
@@ -29292,7 +30654,7 @@
           <a:p>
             <a:fld id="{6A9C7FA6-5826-4EA5-8536-11A903012ABC}" type="slidenum">
               <a:rPr lang="LID4096" smtClean="0"/>
-              <a:t>42</a:t>
+              <a:t>45</a:t>
             </a:fld>
             <a:endParaRPr lang="LID4096"/>
           </a:p>
@@ -29765,7 +31127,7 @@
 </p:sld>
 </file>
 
-<file path=ppt/slides/slide43.xml><?xml version="1.0" encoding="utf-8"?>
+<file path=ppt/slides/slide46.xml><?xml version="1.0" encoding="utf-8"?>
 <p:sld xmlns:a="http://schemas.openxmlformats.org/drawingml/2006/main" xmlns:r="http://schemas.openxmlformats.org/officeDocument/2006/relationships" xmlns:p="http://schemas.openxmlformats.org/presentationml/2006/main">
   <p:cSld>
     <p:spTree>
@@ -29936,7 +31298,7 @@
           <a:p>
             <a:fld id="{6A9C7FA6-5826-4EA5-8536-11A903012ABC}" type="slidenum">
               <a:rPr lang="LID4096" smtClean="0"/>
-              <a:t>43</a:t>
+              <a:t>46</a:t>
             </a:fld>
             <a:endParaRPr lang="LID4096"/>
           </a:p>
@@ -30810,7 +32172,7 @@
 </p:sld>
 </file>
 
-<file path=ppt/slides/slide44.xml><?xml version="1.0" encoding="utf-8"?>
+<file path=ppt/slides/slide47.xml><?xml version="1.0" encoding="utf-8"?>
 <p:sld xmlns:a="http://schemas.openxmlformats.org/drawingml/2006/main" xmlns:r="http://schemas.openxmlformats.org/officeDocument/2006/relationships" xmlns:p="http://schemas.openxmlformats.org/presentationml/2006/main">
   <p:cSld>
     <p:spTree>
@@ -30987,7 +32349,7 @@
           <a:p>
             <a:fld id="{6A9C7FA6-5826-4EA5-8536-11A903012ABC}" type="slidenum">
               <a:rPr lang="LID4096" smtClean="0"/>
-              <a:t>44</a:t>
+              <a:t>47</a:t>
             </a:fld>
             <a:endParaRPr lang="LID4096"/>
           </a:p>
@@ -31798,7 +33160,7 @@
 </p:sld>
 </file>
 
-<file path=ppt/slides/slide45.xml><?xml version="1.0" encoding="utf-8"?>
+<file path=ppt/slides/slide48.xml><?xml version="1.0" encoding="utf-8"?>
 <p:sld xmlns:a="http://schemas.openxmlformats.org/drawingml/2006/main" xmlns:r="http://schemas.openxmlformats.org/officeDocument/2006/relationships" xmlns:p="http://schemas.openxmlformats.org/presentationml/2006/main">
   <p:cSld>
     <p:spTree>
@@ -31975,7 +33337,7 @@
           <a:p>
             <a:fld id="{6A9C7FA6-5826-4EA5-8536-11A903012ABC}" type="slidenum">
               <a:rPr lang="LID4096" smtClean="0"/>
-              <a:t>45</a:t>
+              <a:t>48</a:t>
             </a:fld>
             <a:endParaRPr lang="LID4096"/>
           </a:p>
@@ -32849,7 +34211,7 @@
 </p:sld>
 </file>
 
-<file path=ppt/slides/slide46.xml><?xml version="1.0" encoding="utf-8"?>
+<file path=ppt/slides/slide49.xml><?xml version="1.0" encoding="utf-8"?>
 <p:sld xmlns:a="http://schemas.openxmlformats.org/drawingml/2006/main" xmlns:r="http://schemas.openxmlformats.org/officeDocument/2006/relationships" xmlns:p="http://schemas.openxmlformats.org/presentationml/2006/main">
   <p:cSld>
     <p:spTree>
@@ -32994,7 +34356,7 @@
           <a:p>
             <a:fld id="{6A9C7FA6-5826-4EA5-8536-11A903012ABC}" type="slidenum">
               <a:rPr lang="LID4096" smtClean="0"/>
-              <a:t>46</a:t>
+              <a:t>49</a:t>
             </a:fld>
             <a:endParaRPr lang="LID4096"/>
           </a:p>
@@ -33278,7 +34640,120 @@
 </p:sld>
 </file>
 
-<file path=ppt/slides/slide47.xml><?xml version="1.0" encoding="utf-8"?>
+<file path=ppt/slides/slide5.xml><?xml version="1.0" encoding="utf-8"?>
+<p:sld xmlns:a="http://schemas.openxmlformats.org/drawingml/2006/main" xmlns:r="http://schemas.openxmlformats.org/officeDocument/2006/relationships" xmlns:p="http://schemas.openxmlformats.org/presentationml/2006/main">
+  <p:cSld>
+    <p:spTree>
+      <p:nvGrpSpPr>
+        <p:cNvPr id="1" name=""/>
+        <p:cNvGrpSpPr/>
+        <p:nvPr/>
+      </p:nvGrpSpPr>
+      <p:grpSpPr>
+        <a:xfrm>
+          <a:off x="0" y="0"/>
+          <a:ext cx="0" cy="0"/>
+          <a:chOff x="0" y="0"/>
+          <a:chExt cx="0" cy="0"/>
+        </a:xfrm>
+      </p:grpSpPr>
+      <p:sp>
+        <p:nvSpPr>
+          <p:cNvPr id="2" name="Title 1">
+            <a:extLst>
+              <a:ext uri="{FF2B5EF4-FFF2-40B4-BE49-F238E27FC236}">
+                <a16:creationId xmlns:a16="http://schemas.microsoft.com/office/drawing/2014/main" id="{0F3BB12D-F062-DA50-AC3E-DA2FC6733465}"/>
+              </a:ext>
+            </a:extLst>
+          </p:cNvPr>
+          <p:cNvSpPr>
+            <a:spLocks noGrp="1"/>
+          </p:cNvSpPr>
+          <p:nvPr>
+            <p:ph type="title"/>
+          </p:nvPr>
+        </p:nvSpPr>
+        <p:spPr/>
+        <p:txBody>
+          <a:bodyPr/>
+          <a:lstStyle/>
+          <a:p>
+            <a:r>
+              <a:rPr lang="en-US" dirty="0"/>
+              <a:t>Why LLMs?</a:t>
+            </a:r>
+            <a:endParaRPr lang="LID4096" dirty="0"/>
+          </a:p>
+        </p:txBody>
+      </p:sp>
+      <p:sp>
+        <p:nvSpPr>
+          <p:cNvPr id="3" name="Text Placeholder 2">
+            <a:extLst>
+              <a:ext uri="{FF2B5EF4-FFF2-40B4-BE49-F238E27FC236}">
+                <a16:creationId xmlns:a16="http://schemas.microsoft.com/office/drawing/2014/main" id="{E0B8DDA5-1BB0-E027-8D9E-8B30FFE88E6A}"/>
+              </a:ext>
+            </a:extLst>
+          </p:cNvPr>
+          <p:cNvSpPr>
+            <a:spLocks noGrp="1"/>
+          </p:cNvSpPr>
+          <p:nvPr>
+            <p:ph type="body" idx="1"/>
+          </p:nvPr>
+        </p:nvSpPr>
+        <p:spPr/>
+        <p:txBody>
+          <a:bodyPr/>
+          <a:lstStyle/>
+          <a:p>
+            <a:endParaRPr lang="LID4096"/>
+          </a:p>
+        </p:txBody>
+      </p:sp>
+      <p:sp>
+        <p:nvSpPr>
+          <p:cNvPr id="4" name="Slide Number Placeholder 3">
+            <a:extLst>
+              <a:ext uri="{FF2B5EF4-FFF2-40B4-BE49-F238E27FC236}">
+                <a16:creationId xmlns:a16="http://schemas.microsoft.com/office/drawing/2014/main" id="{6688DF8A-9260-ED5B-9CBE-87ED21D5F594}"/>
+              </a:ext>
+            </a:extLst>
+          </p:cNvPr>
+          <p:cNvSpPr>
+            <a:spLocks noGrp="1"/>
+          </p:cNvSpPr>
+          <p:nvPr>
+            <p:ph type="sldNum" sz="quarter" idx="12"/>
+          </p:nvPr>
+        </p:nvSpPr>
+        <p:spPr/>
+        <p:txBody>
+          <a:bodyPr/>
+          <a:lstStyle/>
+          <a:p>
+            <a:fld id="{6A9C7FA6-5826-4EA5-8536-11A903012ABC}" type="slidenum">
+              <a:rPr lang="LID4096" smtClean="0"/>
+              <a:t>5</a:t>
+            </a:fld>
+            <a:endParaRPr lang="LID4096"/>
+          </a:p>
+        </p:txBody>
+      </p:sp>
+    </p:spTree>
+    <p:extLst>
+      <p:ext uri="{BB962C8B-B14F-4D97-AF65-F5344CB8AC3E}">
+        <p14:creationId xmlns:p14="http://schemas.microsoft.com/office/powerpoint/2010/main" val="686227983"/>
+      </p:ext>
+    </p:extLst>
+  </p:cSld>
+  <p:clrMapOvr>
+    <a:masterClrMapping/>
+  </p:clrMapOvr>
+</p:sld>
+</file>
+
+<file path=ppt/slides/slide50.xml><?xml version="1.0" encoding="utf-8"?>
 <p:sld xmlns:a="http://schemas.openxmlformats.org/drawingml/2006/main" xmlns:r="http://schemas.openxmlformats.org/officeDocument/2006/relationships" xmlns:p="http://schemas.openxmlformats.org/presentationml/2006/main">
   <p:cSld>
     <p:spTree>
@@ -33416,7 +34891,7 @@
           <a:p>
             <a:fld id="{6A9C7FA6-5826-4EA5-8536-11A903012ABC}" type="slidenum">
               <a:rPr lang="LID4096" smtClean="0"/>
-              <a:t>47</a:t>
+              <a:t>50</a:t>
             </a:fld>
             <a:endParaRPr lang="LID4096"/>
           </a:p>
@@ -33739,7 +35214,7 @@
 </p:sld>
 </file>
 
-<file path=ppt/slides/slide48.xml><?xml version="1.0" encoding="utf-8"?>
+<file path=ppt/slides/slide51.xml><?xml version="1.0" encoding="utf-8"?>
 <p:sld xmlns:a="http://schemas.openxmlformats.org/drawingml/2006/main" xmlns:r="http://schemas.openxmlformats.org/officeDocument/2006/relationships" xmlns:p="http://schemas.openxmlformats.org/presentationml/2006/main">
   <p:cSld>
     <p:spTree>
@@ -33808,7 +35283,7 @@
           <a:p>
             <a:fld id="{6A9C7FA6-5826-4EA5-8536-11A903012ABC}" type="slidenum">
               <a:rPr lang="LID4096" smtClean="0"/>
-              <a:t>48</a:t>
+              <a:t>51</a:t>
             </a:fld>
             <a:endParaRPr lang="LID4096"/>
           </a:p>
@@ -33874,7 +35349,7 @@
 </p:sld>
 </file>
 
-<file path=ppt/slides/slide49.xml><?xml version="1.0" encoding="utf-8"?>
+<file path=ppt/slides/slide52.xml><?xml version="1.0" encoding="utf-8"?>
 <p:sld xmlns:a="http://schemas.openxmlformats.org/drawingml/2006/main" xmlns:r="http://schemas.openxmlformats.org/officeDocument/2006/relationships" xmlns:p="http://schemas.openxmlformats.org/presentationml/2006/main">
   <p:cSld>
     <p:spTree>
@@ -33968,7 +35443,7 @@
           <a:p>
             <a:fld id="{6A9C7FA6-5826-4EA5-8536-11A903012ABC}" type="slidenum">
               <a:rPr lang="LID4096" smtClean="0"/>
-              <a:t>49</a:t>
+              <a:t>52</a:t>
             </a:fld>
             <a:endParaRPr lang="LID4096"/>
           </a:p>
@@ -33987,120 +35462,7 @@
 </p:sld>
 </file>
 
-<file path=ppt/slides/slide5.xml><?xml version="1.0" encoding="utf-8"?>
-<p:sld xmlns:a="http://schemas.openxmlformats.org/drawingml/2006/main" xmlns:r="http://schemas.openxmlformats.org/officeDocument/2006/relationships" xmlns:p="http://schemas.openxmlformats.org/presentationml/2006/main">
-  <p:cSld>
-    <p:spTree>
-      <p:nvGrpSpPr>
-        <p:cNvPr id="1" name=""/>
-        <p:cNvGrpSpPr/>
-        <p:nvPr/>
-      </p:nvGrpSpPr>
-      <p:grpSpPr>
-        <a:xfrm>
-          <a:off x="0" y="0"/>
-          <a:ext cx="0" cy="0"/>
-          <a:chOff x="0" y="0"/>
-          <a:chExt cx="0" cy="0"/>
-        </a:xfrm>
-      </p:grpSpPr>
-      <p:sp>
-        <p:nvSpPr>
-          <p:cNvPr id="2" name="Title 1">
-            <a:extLst>
-              <a:ext uri="{FF2B5EF4-FFF2-40B4-BE49-F238E27FC236}">
-                <a16:creationId xmlns:a16="http://schemas.microsoft.com/office/drawing/2014/main" id="{0F3BB12D-F062-DA50-AC3E-DA2FC6733465}"/>
-              </a:ext>
-            </a:extLst>
-          </p:cNvPr>
-          <p:cNvSpPr>
-            <a:spLocks noGrp="1"/>
-          </p:cNvSpPr>
-          <p:nvPr>
-            <p:ph type="title"/>
-          </p:nvPr>
-        </p:nvSpPr>
-        <p:spPr/>
-        <p:txBody>
-          <a:bodyPr/>
-          <a:lstStyle/>
-          <a:p>
-            <a:r>
-              <a:rPr lang="en-US" dirty="0"/>
-              <a:t>Why LLMs?</a:t>
-            </a:r>
-            <a:endParaRPr lang="LID4096" dirty="0"/>
-          </a:p>
-        </p:txBody>
-      </p:sp>
-      <p:sp>
-        <p:nvSpPr>
-          <p:cNvPr id="3" name="Text Placeholder 2">
-            <a:extLst>
-              <a:ext uri="{FF2B5EF4-FFF2-40B4-BE49-F238E27FC236}">
-                <a16:creationId xmlns:a16="http://schemas.microsoft.com/office/drawing/2014/main" id="{E0B8DDA5-1BB0-E027-8D9E-8B30FFE88E6A}"/>
-              </a:ext>
-            </a:extLst>
-          </p:cNvPr>
-          <p:cNvSpPr>
-            <a:spLocks noGrp="1"/>
-          </p:cNvSpPr>
-          <p:nvPr>
-            <p:ph type="body" idx="1"/>
-          </p:nvPr>
-        </p:nvSpPr>
-        <p:spPr/>
-        <p:txBody>
-          <a:bodyPr/>
-          <a:lstStyle/>
-          <a:p>
-            <a:endParaRPr lang="LID4096"/>
-          </a:p>
-        </p:txBody>
-      </p:sp>
-      <p:sp>
-        <p:nvSpPr>
-          <p:cNvPr id="4" name="Slide Number Placeholder 3">
-            <a:extLst>
-              <a:ext uri="{FF2B5EF4-FFF2-40B4-BE49-F238E27FC236}">
-                <a16:creationId xmlns:a16="http://schemas.microsoft.com/office/drawing/2014/main" id="{6688DF8A-9260-ED5B-9CBE-87ED21D5F594}"/>
-              </a:ext>
-            </a:extLst>
-          </p:cNvPr>
-          <p:cNvSpPr>
-            <a:spLocks noGrp="1"/>
-          </p:cNvSpPr>
-          <p:nvPr>
-            <p:ph type="sldNum" sz="quarter" idx="12"/>
-          </p:nvPr>
-        </p:nvSpPr>
-        <p:spPr/>
-        <p:txBody>
-          <a:bodyPr/>
-          <a:lstStyle/>
-          <a:p>
-            <a:fld id="{6A9C7FA6-5826-4EA5-8536-11A903012ABC}" type="slidenum">
-              <a:rPr lang="LID4096" smtClean="0"/>
-              <a:t>5</a:t>
-            </a:fld>
-            <a:endParaRPr lang="LID4096"/>
-          </a:p>
-        </p:txBody>
-      </p:sp>
-    </p:spTree>
-    <p:extLst>
-      <p:ext uri="{BB962C8B-B14F-4D97-AF65-F5344CB8AC3E}">
-        <p14:creationId xmlns:p14="http://schemas.microsoft.com/office/powerpoint/2010/main" val="686227983"/>
-      </p:ext>
-    </p:extLst>
-  </p:cSld>
-  <p:clrMapOvr>
-    <a:masterClrMapping/>
-  </p:clrMapOvr>
-</p:sld>
-</file>
-
-<file path=ppt/slides/slide50.xml><?xml version="1.0" encoding="utf-8"?>
+<file path=ppt/slides/slide53.xml><?xml version="1.0" encoding="utf-8"?>
 <p:sld xmlns:a="http://schemas.openxmlformats.org/drawingml/2006/main" xmlns:r="http://schemas.openxmlformats.org/officeDocument/2006/relationships" xmlns:p="http://schemas.openxmlformats.org/presentationml/2006/main">
   <p:cSld>
     <p:spTree>
@@ -34210,7 +35572,7 @@
           <a:p>
             <a:fld id="{6A9C7FA6-5826-4EA5-8536-11A903012ABC}" type="slidenum">
               <a:rPr lang="LID4096" smtClean="0"/>
-              <a:t>50</a:t>
+              <a:t>53</a:t>
             </a:fld>
             <a:endParaRPr lang="LID4096"/>
           </a:p>
@@ -34229,7 +35591,7 @@
 </p:sld>
 </file>
 
-<file path=ppt/slides/slide51.xml><?xml version="1.0" encoding="utf-8"?>
+<file path=ppt/slides/slide54.xml><?xml version="1.0" encoding="utf-8"?>
 <p:sld xmlns:a="http://schemas.openxmlformats.org/drawingml/2006/main" xmlns:r="http://schemas.openxmlformats.org/officeDocument/2006/relationships" xmlns:p="http://schemas.openxmlformats.org/presentationml/2006/main">
   <p:cSld>
     <p:spTree>
@@ -34338,7 +35700,7 @@
           <a:p>
             <a:fld id="{6A9C7FA6-5826-4EA5-8536-11A903012ABC}" type="slidenum">
               <a:rPr lang="LID4096" smtClean="0"/>
-              <a:t>51</a:t>
+              <a:t>54</a:t>
             </a:fld>
             <a:endParaRPr lang="LID4096"/>
           </a:p>

</xml_diff>